<commit_message>
modified RMI学习分享.pptx on 2016.06.28
</commit_message>
<xml_diff>
--- a/RMI学习分享.pptx
+++ b/RMI学习分享.pptx
@@ -5,15 +5,21 @@
     <p:sldMasterId id="2147483648" r:id="rId1"/>
   </p:sldMasterIdLst>
   <p:sldIdLst>
-    <p:sldId id="256" r:id="rId3"/>
-    <p:sldId id="262" r:id="rId4"/>
-    <p:sldId id="263" r:id="rId5"/>
-    <p:sldId id="266" r:id="rId6"/>
-    <p:sldId id="264" r:id="rId7"/>
-    <p:sldId id="265" r:id="rId8"/>
-    <p:sldId id="267" r:id="rId9"/>
-    <p:sldId id="268" r:id="rId10"/>
-    <p:sldId id="259" r:id="rId11"/>
+    <p:sldId id="256" r:id="rId2"/>
+    <p:sldId id="262" r:id="rId3"/>
+    <p:sldId id="263" r:id="rId4"/>
+    <p:sldId id="266" r:id="rId5"/>
+    <p:sldId id="264" r:id="rId6"/>
+    <p:sldId id="265" r:id="rId7"/>
+    <p:sldId id="267" r:id="rId8"/>
+    <p:sldId id="268" r:id="rId9"/>
+    <p:sldId id="269" r:id="rId10"/>
+    <p:sldId id="270" r:id="rId11"/>
+    <p:sldId id="271" r:id="rId12"/>
+    <p:sldId id="272" r:id="rId13"/>
+    <p:sldId id="273" r:id="rId14"/>
+    <p:sldId id="274" r:id="rId15"/>
+    <p:sldId id="259" r:id="rId16"/>
   </p:sldIdLst>
   <p:sldSz cx="9144000" cy="6858000" type="screen4x3"/>
   <p:notesSz cx="6858000" cy="9144000"/>
@@ -331,6 +337,10 @@
             </a:pPr>
             <a:fld id="{4EA9BDBD-0208-4922-90CC-F15AC1351820}" type="slidenum">
               <a:rPr lang="en-US" altLang="zh-CN"/>
+              <a:pPr>
+                <a:defRPr/>
+              </a:pPr>
+              <a:t>‹#›</a:t>
             </a:fld>
             <a:endParaRPr lang="en-US" altLang="zh-CN"/>
           </a:p>
@@ -404,7 +414,6 @@
               <a:rPr lang="zh-CN" altLang="en-US" smtClean="0"/>
               <a:t>单击此处编辑母版文本样式</a:t>
             </a:r>
-            <a:endParaRPr lang="zh-CN" altLang="en-US" smtClean="0"/>
           </a:p>
           <a:p>
             <a:pPr lvl="1"/>
@@ -412,7 +421,6 @@
               <a:rPr lang="zh-CN" altLang="en-US" smtClean="0"/>
               <a:t>第二级</a:t>
             </a:r>
-            <a:endParaRPr lang="zh-CN" altLang="en-US" smtClean="0"/>
           </a:p>
           <a:p>
             <a:pPr lvl="2"/>
@@ -420,7 +428,6 @@
               <a:rPr lang="zh-CN" altLang="en-US" smtClean="0"/>
               <a:t>第三级</a:t>
             </a:r>
-            <a:endParaRPr lang="zh-CN" altLang="en-US" smtClean="0"/>
           </a:p>
           <a:p>
             <a:pPr lvl="3"/>
@@ -428,7 +435,6 @@
               <a:rPr lang="zh-CN" altLang="en-US" smtClean="0"/>
               <a:t>第四级</a:t>
             </a:r>
-            <a:endParaRPr lang="zh-CN" altLang="en-US" smtClean="0"/>
           </a:p>
           <a:p>
             <a:pPr lvl="4"/>
@@ -516,6 +522,10 @@
             </a:pPr>
             <a:fld id="{15526E3E-D7A6-48A4-AACA-3A054E72FE68}" type="slidenum">
               <a:rPr lang="en-US" altLang="zh-CN"/>
+              <a:pPr>
+                <a:defRPr/>
+              </a:pPr>
+              <a:t>‹#›</a:t>
             </a:fld>
             <a:endParaRPr lang="en-US" altLang="zh-CN"/>
           </a:p>
@@ -599,7 +609,6 @@
               <a:rPr lang="zh-CN" altLang="en-US" smtClean="0"/>
               <a:t>单击此处编辑母版文本样式</a:t>
             </a:r>
-            <a:endParaRPr lang="zh-CN" altLang="en-US" smtClean="0"/>
           </a:p>
           <a:p>
             <a:pPr lvl="1"/>
@@ -607,7 +616,6 @@
               <a:rPr lang="zh-CN" altLang="en-US" smtClean="0"/>
               <a:t>第二级</a:t>
             </a:r>
-            <a:endParaRPr lang="zh-CN" altLang="en-US" smtClean="0"/>
           </a:p>
           <a:p>
             <a:pPr lvl="2"/>
@@ -615,7 +623,6 @@
               <a:rPr lang="zh-CN" altLang="en-US" smtClean="0"/>
               <a:t>第三级</a:t>
             </a:r>
-            <a:endParaRPr lang="zh-CN" altLang="en-US" smtClean="0"/>
           </a:p>
           <a:p>
             <a:pPr lvl="3"/>
@@ -623,7 +630,6 @@
               <a:rPr lang="zh-CN" altLang="en-US" smtClean="0"/>
               <a:t>第四级</a:t>
             </a:r>
-            <a:endParaRPr lang="zh-CN" altLang="en-US" smtClean="0"/>
           </a:p>
           <a:p>
             <a:pPr lvl="4"/>
@@ -711,6 +717,10 @@
             </a:pPr>
             <a:fld id="{8BEE22B3-653A-43A5-ACA8-82F63D402463}" type="slidenum">
               <a:rPr lang="en-US" altLang="zh-CN"/>
+              <a:pPr>
+                <a:defRPr/>
+              </a:pPr>
+              <a:t>‹#›</a:t>
             </a:fld>
             <a:endParaRPr lang="en-US" altLang="zh-CN"/>
           </a:p>
@@ -784,7 +794,6 @@
               <a:rPr lang="zh-CN" altLang="en-US" smtClean="0"/>
               <a:t>单击此处编辑母版文本样式</a:t>
             </a:r>
-            <a:endParaRPr lang="zh-CN" altLang="en-US" smtClean="0"/>
           </a:p>
           <a:p>
             <a:pPr lvl="1"/>
@@ -792,7 +801,6 @@
               <a:rPr lang="zh-CN" altLang="en-US" smtClean="0"/>
               <a:t>第二级</a:t>
             </a:r>
-            <a:endParaRPr lang="zh-CN" altLang="en-US" smtClean="0"/>
           </a:p>
           <a:p>
             <a:pPr lvl="2"/>
@@ -800,7 +808,6 @@
               <a:rPr lang="zh-CN" altLang="en-US" smtClean="0"/>
               <a:t>第三级</a:t>
             </a:r>
-            <a:endParaRPr lang="zh-CN" altLang="en-US" smtClean="0"/>
           </a:p>
           <a:p>
             <a:pPr lvl="3"/>
@@ -808,7 +815,6 @@
               <a:rPr lang="zh-CN" altLang="en-US" smtClean="0"/>
               <a:t>第四级</a:t>
             </a:r>
-            <a:endParaRPr lang="zh-CN" altLang="en-US" smtClean="0"/>
           </a:p>
           <a:p>
             <a:pPr lvl="4"/>
@@ -896,6 +902,10 @@
             </a:pPr>
             <a:fld id="{618F89CA-4970-43DA-BA13-3B924B0DCF6B}" type="slidenum">
               <a:rPr lang="en-US" altLang="zh-CN"/>
+              <a:pPr>
+                <a:defRPr/>
+              </a:pPr>
+              <a:t>‹#›</a:t>
             </a:fld>
             <a:endParaRPr lang="en-US" altLang="zh-CN"/>
           </a:p>
@@ -1020,7 +1030,6 @@
               <a:rPr lang="zh-CN" altLang="en-US" smtClean="0"/>
               <a:t>单击此处编辑母版文本样式</a:t>
             </a:r>
-            <a:endParaRPr lang="zh-CN" altLang="en-US" smtClean="0"/>
           </a:p>
         </p:txBody>
       </p:sp>
@@ -1100,6 +1109,10 @@
             </a:pPr>
             <a:fld id="{823EA3C7-C320-4240-ABCB-367EA5A55A6A}" type="slidenum">
               <a:rPr lang="en-US" altLang="zh-CN"/>
+              <a:pPr>
+                <a:defRPr/>
+              </a:pPr>
+              <a:t>‹#›</a:t>
             </a:fld>
             <a:endParaRPr lang="en-US" altLang="zh-CN"/>
           </a:p>
@@ -1206,7 +1219,6 @@
               <a:rPr lang="zh-CN" altLang="en-US" smtClean="0"/>
               <a:t>单击此处编辑母版文本样式</a:t>
             </a:r>
-            <a:endParaRPr lang="zh-CN" altLang="en-US" smtClean="0"/>
           </a:p>
           <a:p>
             <a:pPr lvl="1"/>
@@ -1214,7 +1226,6 @@
               <a:rPr lang="zh-CN" altLang="en-US" smtClean="0"/>
               <a:t>第二级</a:t>
             </a:r>
-            <a:endParaRPr lang="zh-CN" altLang="en-US" smtClean="0"/>
           </a:p>
           <a:p>
             <a:pPr lvl="2"/>
@@ -1222,7 +1233,6 @@
               <a:rPr lang="zh-CN" altLang="en-US" smtClean="0"/>
               <a:t>第三级</a:t>
             </a:r>
-            <a:endParaRPr lang="zh-CN" altLang="en-US" smtClean="0"/>
           </a:p>
           <a:p>
             <a:pPr lvl="3"/>
@@ -1230,7 +1240,6 @@
               <a:rPr lang="zh-CN" altLang="en-US" smtClean="0"/>
               <a:t>第四级</a:t>
             </a:r>
-            <a:endParaRPr lang="zh-CN" altLang="en-US" smtClean="0"/>
           </a:p>
           <a:p>
             <a:pPr lvl="4"/>
@@ -1295,7 +1304,6 @@
               <a:rPr lang="zh-CN" altLang="en-US" smtClean="0"/>
               <a:t>单击此处编辑母版文本样式</a:t>
             </a:r>
-            <a:endParaRPr lang="zh-CN" altLang="en-US" smtClean="0"/>
           </a:p>
           <a:p>
             <a:pPr lvl="1"/>
@@ -1303,7 +1311,6 @@
               <a:rPr lang="zh-CN" altLang="en-US" smtClean="0"/>
               <a:t>第二级</a:t>
             </a:r>
-            <a:endParaRPr lang="zh-CN" altLang="en-US" smtClean="0"/>
           </a:p>
           <a:p>
             <a:pPr lvl="2"/>
@@ -1311,7 +1318,6 @@
               <a:rPr lang="zh-CN" altLang="en-US" smtClean="0"/>
               <a:t>第三级</a:t>
             </a:r>
-            <a:endParaRPr lang="zh-CN" altLang="en-US" smtClean="0"/>
           </a:p>
           <a:p>
             <a:pPr lvl="3"/>
@@ -1319,7 +1325,6 @@
               <a:rPr lang="zh-CN" altLang="en-US" smtClean="0"/>
               <a:t>第四级</a:t>
             </a:r>
-            <a:endParaRPr lang="zh-CN" altLang="en-US" smtClean="0"/>
           </a:p>
           <a:p>
             <a:pPr lvl="4"/>
@@ -1407,6 +1412,10 @@
             </a:pPr>
             <a:fld id="{BC48917B-0C62-41CB-97A8-4155D4C32494}" type="slidenum">
               <a:rPr lang="en-US" altLang="zh-CN"/>
+              <a:pPr>
+                <a:defRPr/>
+              </a:pPr>
+              <a:t>‹#›</a:t>
             </a:fld>
             <a:endParaRPr lang="en-US" altLang="zh-CN"/>
           </a:p>
@@ -1531,7 +1540,6 @@
               <a:rPr lang="zh-CN" altLang="en-US" smtClean="0"/>
               <a:t>单击此处编辑母版文本样式</a:t>
             </a:r>
-            <a:endParaRPr lang="zh-CN" altLang="en-US" smtClean="0"/>
           </a:p>
         </p:txBody>
       </p:sp>
@@ -1588,7 +1596,6 @@
               <a:rPr lang="zh-CN" altLang="en-US" smtClean="0"/>
               <a:t>单击此处编辑母版文本样式</a:t>
             </a:r>
-            <a:endParaRPr lang="zh-CN" altLang="en-US" smtClean="0"/>
           </a:p>
           <a:p>
             <a:pPr lvl="1"/>
@@ -1596,7 +1603,6 @@
               <a:rPr lang="zh-CN" altLang="en-US" smtClean="0"/>
               <a:t>第二级</a:t>
             </a:r>
-            <a:endParaRPr lang="zh-CN" altLang="en-US" smtClean="0"/>
           </a:p>
           <a:p>
             <a:pPr lvl="2"/>
@@ -1604,7 +1610,6 @@
               <a:rPr lang="zh-CN" altLang="en-US" smtClean="0"/>
               <a:t>第三级</a:t>
             </a:r>
-            <a:endParaRPr lang="zh-CN" altLang="en-US" smtClean="0"/>
           </a:p>
           <a:p>
             <a:pPr lvl="3"/>
@@ -1612,7 +1617,6 @@
               <a:rPr lang="zh-CN" altLang="en-US" smtClean="0"/>
               <a:t>第四级</a:t>
             </a:r>
-            <a:endParaRPr lang="zh-CN" altLang="en-US" smtClean="0"/>
           </a:p>
           <a:p>
             <a:pPr lvl="4"/>
@@ -1686,7 +1690,6 @@
               <a:rPr lang="zh-CN" altLang="en-US" smtClean="0"/>
               <a:t>单击此处编辑母版文本样式</a:t>
             </a:r>
-            <a:endParaRPr lang="zh-CN" altLang="en-US" smtClean="0"/>
           </a:p>
         </p:txBody>
       </p:sp>
@@ -1743,7 +1746,6 @@
               <a:rPr lang="zh-CN" altLang="en-US" smtClean="0"/>
               <a:t>单击此处编辑母版文本样式</a:t>
             </a:r>
-            <a:endParaRPr lang="zh-CN" altLang="en-US" smtClean="0"/>
           </a:p>
           <a:p>
             <a:pPr lvl="1"/>
@@ -1751,7 +1753,6 @@
               <a:rPr lang="zh-CN" altLang="en-US" smtClean="0"/>
               <a:t>第二级</a:t>
             </a:r>
-            <a:endParaRPr lang="zh-CN" altLang="en-US" smtClean="0"/>
           </a:p>
           <a:p>
             <a:pPr lvl="2"/>
@@ -1759,7 +1760,6 @@
               <a:rPr lang="zh-CN" altLang="en-US" smtClean="0"/>
               <a:t>第三级</a:t>
             </a:r>
-            <a:endParaRPr lang="zh-CN" altLang="en-US" smtClean="0"/>
           </a:p>
           <a:p>
             <a:pPr lvl="3"/>
@@ -1767,7 +1767,6 @@
               <a:rPr lang="zh-CN" altLang="en-US" smtClean="0"/>
               <a:t>第四级</a:t>
             </a:r>
-            <a:endParaRPr lang="zh-CN" altLang="en-US" smtClean="0"/>
           </a:p>
           <a:p>
             <a:pPr lvl="4"/>
@@ -1855,6 +1854,10 @@
             </a:pPr>
             <a:fld id="{3A2E21B1-32D5-46FE-ACC7-54E7E28AB342}" type="slidenum">
               <a:rPr lang="en-US" altLang="zh-CN"/>
+              <a:pPr>
+                <a:defRPr/>
+              </a:pPr>
+              <a:t>‹#›</a:t>
             </a:fld>
             <a:endParaRPr lang="en-US" altLang="zh-CN"/>
           </a:p>
@@ -1984,6 +1987,10 @@
             </a:pPr>
             <a:fld id="{9EAB88E2-7F54-4A35-9F8F-F7C3F325172B}" type="slidenum">
               <a:rPr lang="en-US" altLang="zh-CN"/>
+              <a:pPr>
+                <a:defRPr/>
+              </a:pPr>
+              <a:t>‹#›</a:t>
             </a:fld>
             <a:endParaRPr lang="en-US" altLang="zh-CN"/>
           </a:p>
@@ -2090,6 +2097,10 @@
             </a:pPr>
             <a:fld id="{094E9C75-CC1E-4004-8A76-1CDBB6763728}" type="slidenum">
               <a:rPr lang="en-US" altLang="zh-CN"/>
+              <a:pPr>
+                <a:defRPr/>
+              </a:pPr>
+              <a:t>‹#›</a:t>
             </a:fld>
             <a:endParaRPr lang="en-US" altLang="zh-CN"/>
           </a:p>
@@ -2205,7 +2216,6 @@
               <a:rPr lang="zh-CN" altLang="en-US" smtClean="0"/>
               <a:t>单击此处编辑母版文本样式</a:t>
             </a:r>
-            <a:endParaRPr lang="zh-CN" altLang="en-US" smtClean="0"/>
           </a:p>
           <a:p>
             <a:pPr lvl="1"/>
@@ -2213,7 +2223,6 @@
               <a:rPr lang="zh-CN" altLang="en-US" smtClean="0"/>
               <a:t>第二级</a:t>
             </a:r>
-            <a:endParaRPr lang="zh-CN" altLang="en-US" smtClean="0"/>
           </a:p>
           <a:p>
             <a:pPr lvl="2"/>
@@ -2221,7 +2230,6 @@
               <a:rPr lang="zh-CN" altLang="en-US" smtClean="0"/>
               <a:t>第三级</a:t>
             </a:r>
-            <a:endParaRPr lang="zh-CN" altLang="en-US" smtClean="0"/>
           </a:p>
           <a:p>
             <a:pPr lvl="3"/>
@@ -2229,7 +2237,6 @@
               <a:rPr lang="zh-CN" altLang="en-US" smtClean="0"/>
               <a:t>第四级</a:t>
             </a:r>
-            <a:endParaRPr lang="zh-CN" altLang="en-US" smtClean="0"/>
           </a:p>
           <a:p>
             <a:pPr lvl="4"/>
@@ -2303,7 +2310,6 @@
               <a:rPr lang="zh-CN" altLang="en-US" smtClean="0"/>
               <a:t>单击此处编辑母版文本样式</a:t>
             </a:r>
-            <a:endParaRPr lang="zh-CN" altLang="en-US" smtClean="0"/>
           </a:p>
         </p:txBody>
       </p:sp>
@@ -2383,6 +2389,10 @@
             </a:pPr>
             <a:fld id="{22D6264D-7DF0-427B-BB84-63FCF5B7E773}" type="slidenum">
               <a:rPr lang="en-US" altLang="zh-CN"/>
+              <a:pPr>
+                <a:defRPr/>
+              </a:pPr>
+              <a:t>‹#›</a:t>
             </a:fld>
             <a:endParaRPr lang="en-US" altLang="zh-CN"/>
           </a:p>
@@ -2573,7 +2583,6 @@
               <a:rPr lang="zh-CN" altLang="en-US" smtClean="0"/>
               <a:t>单击此处编辑母版文本样式</a:t>
             </a:r>
-            <a:endParaRPr lang="zh-CN" altLang="en-US" smtClean="0"/>
           </a:p>
         </p:txBody>
       </p:sp>
@@ -2653,6 +2662,10 @@
             </a:pPr>
             <a:fld id="{9AC6440C-29C9-468B-ADAB-7E6B0D2AB3A5}" type="slidenum">
               <a:rPr lang="en-US" altLang="zh-CN"/>
+              <a:pPr>
+                <a:defRPr/>
+              </a:pPr>
+              <a:t>‹#›</a:t>
             </a:fld>
             <a:endParaRPr lang="en-US" altLang="zh-CN"/>
           </a:p>
@@ -2672,7 +2685,7 @@
     <p:bg>
       <p:bgPr>
         <a:blipFill dpi="0" rotWithShape="0">
-          <a:blip r:embed="rId12"/>
+          <a:blip r:embed="rId13" cstate="print"/>
           <a:srcRect/>
           <a:stretch>
             <a:fillRect/>
@@ -2765,7 +2778,6 @@
               <a:rPr lang="zh-CN" altLang="en-US" smtClean="0"/>
               <a:t>单击此处编辑母版文本样式</a:t>
             </a:r>
-            <a:endParaRPr lang="zh-CN" altLang="en-US" smtClean="0"/>
           </a:p>
           <a:p>
             <a:pPr lvl="1"/>
@@ -2773,7 +2785,6 @@
               <a:rPr lang="zh-CN" altLang="en-US" smtClean="0"/>
               <a:t>第二级</a:t>
             </a:r>
-            <a:endParaRPr lang="zh-CN" altLang="en-US" smtClean="0"/>
           </a:p>
           <a:p>
             <a:pPr lvl="2"/>
@@ -2781,7 +2792,6 @@
               <a:rPr lang="zh-CN" altLang="en-US" smtClean="0"/>
               <a:t>第三级</a:t>
             </a:r>
-            <a:endParaRPr lang="zh-CN" altLang="en-US" smtClean="0"/>
           </a:p>
           <a:p>
             <a:pPr lvl="3"/>
@@ -2789,7 +2799,6 @@
               <a:rPr lang="zh-CN" altLang="en-US" smtClean="0"/>
               <a:t>第四级</a:t>
             </a:r>
-            <a:endParaRPr lang="zh-CN" altLang="en-US" smtClean="0"/>
           </a:p>
           <a:p>
             <a:pPr lvl="4"/>
@@ -2925,6 +2934,10 @@
             </a:pPr>
             <a:fld id="{B17E9B8C-54B9-46A7-AA23-01448E656E4B}" type="slidenum">
               <a:rPr lang="en-US" altLang="zh-CN"/>
+              <a:pPr>
+                <a:defRPr/>
+              </a:pPr>
+              <a:t>‹#›</a:t>
             </a:fld>
             <a:endParaRPr lang="en-US" altLang="zh-CN"/>
           </a:p>
@@ -3321,7 +3334,7 @@
     <p:bg>
       <p:bgPr>
         <a:blipFill dpi="0" rotWithShape="0">
-          <a:blip r:embed="rId1"/>
+          <a:blip r:embed="rId2" cstate="print"/>
           <a:srcRect/>
           <a:stretch>
             <a:fillRect/>
@@ -3373,21 +3386,1009 @@
               </a:rPr>
               <a:t>学习分享</a:t>
             </a:r>
-            <a:endParaRPr lang="zh-CN" altLang="zh-CN" smtClean="0">
+          </a:p>
+        </p:txBody>
+      </p:sp>
+      <p:sp>
+        <p:nvSpPr>
+          <p:cNvPr id="13315" name="Rectangle 3"/>
+          <p:cNvSpPr>
+            <a:spLocks noGrp="1" noChangeArrowheads="1"/>
+          </p:cNvSpPr>
+          <p:nvPr>
+            <p:ph type="subTitle" idx="1"/>
+          </p:nvPr>
+        </p:nvSpPr>
+        <p:spPr/>
+        <p:txBody>
+          <a:bodyPr/>
+          <a:lstStyle/>
+          <a:p>
+            <a:r>
+              <a:rPr lang="zh-CN" altLang="en-US" smtClean="0">
+                <a:ea typeface="宋体" charset="-122"/>
+              </a:rPr>
+              <a:t>简梓鉴</a:t>
+            </a:r>
+          </a:p>
+        </p:txBody>
+      </p:sp>
+    </p:spTree>
+  </p:cSld>
+  <p:clrMapOvr>
+    <a:masterClrMapping/>
+  </p:clrMapOvr>
+  <p:timing>
+    <p:tnLst>
+      <p:par>
+        <p:cTn id="1" dur="indefinite" restart="never" nodeType="tmRoot"/>
+      </p:par>
+    </p:tnLst>
+  </p:timing>
+</p:sld>
+</file>
+
+<file path=ppt/slides/slide10.xml><?xml version="1.0" encoding="utf-8"?>
+<p:sld xmlns:a="http://schemas.openxmlformats.org/drawingml/2006/main" xmlns:r="http://schemas.openxmlformats.org/officeDocument/2006/relationships" xmlns:p="http://schemas.openxmlformats.org/presentationml/2006/main">
+  <p:cSld>
+    <p:spTree>
+      <p:nvGrpSpPr>
+        <p:cNvPr id="1" name=""/>
+        <p:cNvGrpSpPr/>
+        <p:nvPr/>
+      </p:nvGrpSpPr>
+      <p:grpSpPr>
+        <a:xfrm>
+          <a:off x="0" y="0"/>
+          <a:ext cx="0" cy="0"/>
+          <a:chOff x="0" y="0"/>
+          <a:chExt cx="0" cy="0"/>
+        </a:xfrm>
+      </p:grpSpPr>
+      <p:sp>
+        <p:nvSpPr>
+          <p:cNvPr id="2" name="标题 1"/>
+          <p:cNvSpPr>
+            <a:spLocks noGrp="1"/>
+          </p:cNvSpPr>
+          <p:nvPr>
+            <p:ph type="title"/>
+          </p:nvPr>
+        </p:nvSpPr>
+        <p:spPr/>
+        <p:txBody>
+          <a:bodyPr/>
+          <a:lstStyle/>
+          <a:p>
+            <a:r>
+              <a:rPr lang="zh-CN" altLang="en-US" sz="3600" dirty="0" smtClean="0">
+                <a:latin typeface="宋体" charset="0"/>
+                <a:ea typeface="宋体" charset="0"/>
+              </a:rPr>
+              <a:t>创建</a:t>
+            </a:r>
+            <a:r>
+              <a:rPr lang="en-US" altLang="zh-CN" sz="3600" dirty="0" smtClean="0">
+                <a:latin typeface="宋体" charset="0"/>
+                <a:ea typeface="宋体" charset="0"/>
+              </a:rPr>
+              <a:t>RMI</a:t>
+            </a:r>
+            <a:r>
+              <a:rPr lang="zh-CN" altLang="en-US" sz="3600" dirty="0" smtClean="0">
+                <a:latin typeface="宋体" charset="0"/>
+                <a:ea typeface="宋体" charset="0"/>
+              </a:rPr>
+              <a:t>远程服务之客户端代理</a:t>
+            </a:r>
+            <a:endParaRPr lang="zh-CN" altLang="en-US" sz="3600" dirty="0">
               <a:latin typeface="宋体" charset="0"/>
               <a:ea typeface="宋体" charset="0"/>
             </a:endParaRPr>
           </a:p>
         </p:txBody>
       </p:sp>
-      <p:sp>
-        <p:nvSpPr>
-          <p:cNvPr id="13315" name="Rectangle 3"/>
+      <p:pic>
+        <p:nvPicPr>
+          <p:cNvPr id="4" name="内容占位符 3" descr="client.png"/>
+          <p:cNvPicPr>
+            <a:picLocks noGrp="1" noChangeAspect="1"/>
+          </p:cNvPicPr>
+          <p:nvPr>
+            <p:ph idx="1"/>
+          </p:nvPr>
+        </p:nvPicPr>
+        <p:blipFill>
+          <a:blip r:embed="rId2" cstate="print"/>
+          <a:stretch>
+            <a:fillRect/>
+          </a:stretch>
+        </p:blipFill>
+        <p:spPr>
+          <a:xfrm>
+            <a:off x="838200" y="2464025"/>
+            <a:ext cx="7848600" cy="2987224"/>
+          </a:xfrm>
+        </p:spPr>
+      </p:pic>
+    </p:spTree>
+  </p:cSld>
+  <p:clrMapOvr>
+    <a:masterClrMapping/>
+  </p:clrMapOvr>
+  <p:timing>
+    <p:tnLst>
+      <p:par>
+        <p:cTn id="1" dur="indefinite" restart="never" nodeType="tmRoot"/>
+      </p:par>
+    </p:tnLst>
+  </p:timing>
+</p:sld>
+</file>
+
+<file path=ppt/slides/slide11.xml><?xml version="1.0" encoding="utf-8"?>
+<p:sld xmlns:a="http://schemas.openxmlformats.org/drawingml/2006/main" xmlns:r="http://schemas.openxmlformats.org/officeDocument/2006/relationships" xmlns:p="http://schemas.openxmlformats.org/presentationml/2006/main">
+  <p:cSld>
+    <p:spTree>
+      <p:nvGrpSpPr>
+        <p:cNvPr id="1" name=""/>
+        <p:cNvGrpSpPr/>
+        <p:nvPr/>
+      </p:nvGrpSpPr>
+      <p:grpSpPr>
+        <a:xfrm>
+          <a:off x="0" y="0"/>
+          <a:ext cx="0" cy="0"/>
+          <a:chOff x="0" y="0"/>
+          <a:chExt cx="0" cy="0"/>
+        </a:xfrm>
+      </p:grpSpPr>
+      <p:sp>
+        <p:nvSpPr>
+          <p:cNvPr id="2" name="标题 1"/>
+          <p:cNvSpPr>
+            <a:spLocks noGrp="1"/>
+          </p:cNvSpPr>
+          <p:nvPr>
+            <p:ph type="title"/>
+          </p:nvPr>
+        </p:nvSpPr>
+        <p:spPr/>
+        <p:txBody>
+          <a:bodyPr/>
+          <a:lstStyle/>
+          <a:p>
+            <a:r>
+              <a:rPr lang="zh-CN" altLang="en-US" sz="3600" dirty="0" smtClean="0">
+                <a:latin typeface="宋体" charset="0"/>
+                <a:ea typeface="宋体" charset="0"/>
+              </a:rPr>
+              <a:t>创建</a:t>
+            </a:r>
+            <a:r>
+              <a:rPr lang="en-US" altLang="zh-CN" sz="3600" dirty="0" smtClean="0">
+                <a:latin typeface="宋体" charset="0"/>
+                <a:ea typeface="宋体" charset="0"/>
+              </a:rPr>
+              <a:t>RMI</a:t>
+            </a:r>
+            <a:r>
+              <a:rPr lang="zh-CN" altLang="en-US" sz="3600" dirty="0" smtClean="0">
+                <a:latin typeface="宋体" charset="0"/>
+                <a:ea typeface="宋体" charset="0"/>
+              </a:rPr>
+              <a:t>远程服务之服务端</a:t>
+            </a:r>
+            <a:endParaRPr lang="zh-CN" altLang="en-US" sz="3600" dirty="0">
+              <a:latin typeface="宋体" charset="0"/>
+              <a:ea typeface="宋体" charset="0"/>
+            </a:endParaRPr>
+          </a:p>
+        </p:txBody>
+      </p:sp>
+      <p:pic>
+        <p:nvPicPr>
+          <p:cNvPr id="4" name="内容占位符 3" descr="server.png"/>
+          <p:cNvPicPr>
+            <a:picLocks noGrp="1" noChangeAspect="1"/>
+          </p:cNvPicPr>
+          <p:nvPr>
+            <p:ph idx="1"/>
+          </p:nvPr>
+        </p:nvPicPr>
+        <p:blipFill>
+          <a:blip r:embed="rId2" cstate="print"/>
+          <a:stretch>
+            <a:fillRect/>
+          </a:stretch>
+        </p:blipFill>
+        <p:spPr>
+          <a:xfrm>
+            <a:off x="838200" y="2702589"/>
+            <a:ext cx="7848600" cy="2510097"/>
+          </a:xfrm>
+        </p:spPr>
+      </p:pic>
+    </p:spTree>
+  </p:cSld>
+  <p:clrMapOvr>
+    <a:masterClrMapping/>
+  </p:clrMapOvr>
+  <p:timing>
+    <p:tnLst>
+      <p:par>
+        <p:cTn id="1" dur="indefinite" restart="never" nodeType="tmRoot"/>
+      </p:par>
+    </p:tnLst>
+  </p:timing>
+</p:sld>
+</file>
+
+<file path=ppt/slides/slide12.xml><?xml version="1.0" encoding="utf-8"?>
+<p:sld xmlns:a="http://schemas.openxmlformats.org/drawingml/2006/main" xmlns:r="http://schemas.openxmlformats.org/officeDocument/2006/relationships" xmlns:p="http://schemas.openxmlformats.org/presentationml/2006/main">
+  <p:cSld>
+    <p:spTree>
+      <p:nvGrpSpPr>
+        <p:cNvPr id="1" name=""/>
+        <p:cNvGrpSpPr/>
+        <p:nvPr/>
+      </p:nvGrpSpPr>
+      <p:grpSpPr>
+        <a:xfrm>
+          <a:off x="0" y="0"/>
+          <a:ext cx="0" cy="0"/>
+          <a:chOff x="0" y="0"/>
+          <a:chExt cx="0" cy="0"/>
+        </a:xfrm>
+      </p:grpSpPr>
+      <p:sp>
+        <p:nvSpPr>
+          <p:cNvPr id="2" name="标题 1"/>
+          <p:cNvSpPr>
+            <a:spLocks noGrp="1"/>
+          </p:cNvSpPr>
+          <p:nvPr>
+            <p:ph type="title"/>
+          </p:nvPr>
+        </p:nvSpPr>
+        <p:spPr/>
+        <p:txBody>
+          <a:bodyPr/>
+          <a:lstStyle/>
+          <a:p>
+            <a:r>
+              <a:rPr lang="zh-CN" altLang="en-US" sz="3600" dirty="0" smtClean="0">
+                <a:latin typeface="宋体" charset="0"/>
+                <a:ea typeface="宋体" charset="0"/>
+              </a:rPr>
+              <a:t>创建</a:t>
+            </a:r>
+            <a:r>
+              <a:rPr lang="en-US" altLang="zh-CN" sz="3600" dirty="0" smtClean="0">
+                <a:latin typeface="宋体" charset="0"/>
+                <a:ea typeface="宋体" charset="0"/>
+              </a:rPr>
+              <a:t>RMI</a:t>
+            </a:r>
+            <a:r>
+              <a:rPr lang="zh-CN" altLang="en-US" sz="3600" dirty="0" smtClean="0">
+                <a:latin typeface="宋体" charset="0"/>
+                <a:ea typeface="宋体" charset="0"/>
+              </a:rPr>
+              <a:t>远程服务之导出服务</a:t>
+            </a:r>
+            <a:endParaRPr lang="zh-CN" altLang="en-US" sz="3600" dirty="0">
+              <a:latin typeface="宋体" charset="0"/>
+              <a:ea typeface="宋体" charset="0"/>
+            </a:endParaRPr>
+          </a:p>
+        </p:txBody>
+      </p:sp>
+      <p:sp>
+        <p:nvSpPr>
+          <p:cNvPr id="3" name="内容占位符 2"/>
+          <p:cNvSpPr>
+            <a:spLocks noGrp="1"/>
+          </p:cNvSpPr>
+          <p:nvPr>
+            <p:ph idx="1"/>
+          </p:nvPr>
+        </p:nvSpPr>
+        <p:spPr>
+          <a:xfrm>
+            <a:off x="838200" y="1905000"/>
+            <a:ext cx="7848600" cy="4105275"/>
+          </a:xfrm>
+        </p:spPr>
+        <p:txBody>
+          <a:bodyPr/>
+          <a:lstStyle/>
+          <a:p>
+            <a:r>
+              <a:rPr lang="zh-CN" altLang="en-US" sz="2400" dirty="0" smtClean="0">
+                <a:latin typeface="宋体" charset="0"/>
+                <a:ea typeface="宋体" charset="0"/>
+                <a:sym typeface="+mn-ea"/>
+              </a:rPr>
+              <a:t>这一步其实相对简单，通过</a:t>
+            </a:r>
+            <a:r>
+              <a:rPr lang="en-US" altLang="zh-CN" sz="2400" dirty="0" err="1" smtClean="0">
+                <a:latin typeface="宋体" charset="0"/>
+                <a:ea typeface="宋体" charset="0"/>
+                <a:sym typeface="+mn-ea"/>
+              </a:rPr>
+              <a:t>LiveRef</a:t>
+            </a:r>
+            <a:r>
+              <a:rPr lang="zh-CN" altLang="en-US" sz="2400" dirty="0" smtClean="0">
+                <a:latin typeface="宋体" charset="0"/>
+                <a:ea typeface="宋体" charset="0"/>
+                <a:sym typeface="+mn-ea"/>
+              </a:rPr>
+              <a:t>推导出终端对应的通信管理类</a:t>
+            </a:r>
+            <a:r>
+              <a:rPr lang="en-US" altLang="zh-CN" sz="2400" dirty="0" smtClean="0">
+                <a:latin typeface="宋体" charset="0"/>
+                <a:ea typeface="宋体" charset="0"/>
+                <a:sym typeface="+mn-ea"/>
+              </a:rPr>
+              <a:t>Transport</a:t>
+            </a:r>
+            <a:r>
+              <a:rPr lang="zh-CN" altLang="en-US" sz="2400" dirty="0" smtClean="0">
+                <a:latin typeface="宋体" charset="0"/>
+                <a:ea typeface="宋体" charset="0"/>
+                <a:sym typeface="+mn-ea"/>
+              </a:rPr>
+              <a:t>，然后如果该</a:t>
+            </a:r>
+            <a:r>
+              <a:rPr lang="en-US" altLang="zh-CN" sz="2400" dirty="0" smtClean="0">
+                <a:latin typeface="宋体" charset="0"/>
+                <a:ea typeface="宋体" charset="0"/>
+                <a:sym typeface="+mn-ea"/>
+              </a:rPr>
+              <a:t>Transport</a:t>
+            </a:r>
+            <a:r>
+              <a:rPr lang="zh-CN" altLang="en-US" sz="2400" dirty="0" smtClean="0">
+                <a:latin typeface="宋体" charset="0"/>
+                <a:ea typeface="宋体" charset="0"/>
+                <a:sym typeface="+mn-ea"/>
+              </a:rPr>
+              <a:t>没有开启</a:t>
+            </a:r>
+            <a:r>
+              <a:rPr lang="en-US" altLang="zh-CN" sz="2400" dirty="0" err="1" smtClean="0">
+                <a:latin typeface="宋体" charset="0"/>
+                <a:ea typeface="宋体" charset="0"/>
+                <a:sym typeface="+mn-ea"/>
+              </a:rPr>
+              <a:t>SocketServer</a:t>
+            </a:r>
+            <a:r>
+              <a:rPr lang="zh-CN" altLang="en-US" sz="2400" dirty="0" smtClean="0">
+                <a:latin typeface="宋体" charset="0"/>
+                <a:ea typeface="宋体" charset="0"/>
+                <a:sym typeface="+mn-ea"/>
+              </a:rPr>
+              <a:t>监听连接，开启之。否则直接把</a:t>
+            </a:r>
+            <a:r>
+              <a:rPr lang="en-US" altLang="zh-CN" sz="2400" dirty="0" smtClean="0">
+                <a:latin typeface="宋体" charset="0"/>
+                <a:ea typeface="宋体" charset="0"/>
+                <a:sym typeface="+mn-ea"/>
+              </a:rPr>
+              <a:t>target</a:t>
+            </a:r>
+            <a:r>
+              <a:rPr lang="zh-CN" altLang="en-US" sz="2400" dirty="0" smtClean="0">
+                <a:latin typeface="宋体" charset="0"/>
+                <a:ea typeface="宋体" charset="0"/>
+                <a:sym typeface="+mn-ea"/>
+              </a:rPr>
+              <a:t>放入</a:t>
+            </a:r>
+            <a:r>
+              <a:rPr lang="en-US" altLang="zh-CN" sz="2400" dirty="0" err="1" smtClean="0">
+                <a:latin typeface="宋体" charset="0"/>
+                <a:ea typeface="宋体" charset="0"/>
+                <a:sym typeface="+mn-ea"/>
+              </a:rPr>
+              <a:t>ObjectTable</a:t>
+            </a:r>
+            <a:r>
+              <a:rPr lang="zh-CN" altLang="en-US" sz="2400" dirty="0" smtClean="0">
+                <a:latin typeface="宋体" charset="0"/>
+                <a:ea typeface="宋体" charset="0"/>
+                <a:sym typeface="+mn-ea"/>
+              </a:rPr>
+              <a:t>中长期驻留。</a:t>
+            </a:r>
+            <a:endParaRPr lang="zh-CN" altLang="en-US" sz="2400" dirty="0">
+              <a:latin typeface="宋体" charset="0"/>
+              <a:ea typeface="宋体" charset="0"/>
+              <a:sym typeface="+mn-ea"/>
+            </a:endParaRPr>
+          </a:p>
+        </p:txBody>
+      </p:sp>
+    </p:spTree>
+  </p:cSld>
+  <p:clrMapOvr>
+    <a:masterClrMapping/>
+  </p:clrMapOvr>
+  <p:timing>
+    <p:tnLst>
+      <p:par>
+        <p:cTn id="1" dur="indefinite" restart="never" nodeType="tmRoot"/>
+      </p:par>
+    </p:tnLst>
+  </p:timing>
+</p:sld>
+</file>
+
+<file path=ppt/slides/slide13.xml><?xml version="1.0" encoding="utf-8"?>
+<p:sld xmlns:a="http://schemas.openxmlformats.org/drawingml/2006/main" xmlns:r="http://schemas.openxmlformats.org/officeDocument/2006/relationships" xmlns:p="http://schemas.openxmlformats.org/presentationml/2006/main">
+  <p:cSld>
+    <p:spTree>
+      <p:nvGrpSpPr>
+        <p:cNvPr id="1" name=""/>
+        <p:cNvGrpSpPr/>
+        <p:nvPr/>
+      </p:nvGrpSpPr>
+      <p:grpSpPr>
+        <a:xfrm>
+          <a:off x="0" y="0"/>
+          <a:ext cx="0" cy="0"/>
+          <a:chOff x="0" y="0"/>
+          <a:chExt cx="0" cy="0"/>
+        </a:xfrm>
+      </p:grpSpPr>
+      <p:sp>
+        <p:nvSpPr>
+          <p:cNvPr id="2" name="标题 1"/>
+          <p:cNvSpPr>
+            <a:spLocks noGrp="1"/>
+          </p:cNvSpPr>
+          <p:nvPr>
+            <p:ph type="title"/>
+          </p:nvPr>
+        </p:nvSpPr>
+        <p:spPr/>
+        <p:txBody>
+          <a:bodyPr/>
+          <a:lstStyle/>
+          <a:p>
+            <a:r>
+              <a:rPr lang="en-US" altLang="zh-CN" sz="3600" dirty="0" smtClean="0">
+                <a:latin typeface="宋体" charset="0"/>
+                <a:ea typeface="宋体" charset="0"/>
+              </a:rPr>
+              <a:t>RMI</a:t>
+            </a:r>
+            <a:r>
+              <a:rPr lang="zh-CN" altLang="en-US" sz="3600" dirty="0" smtClean="0">
+                <a:latin typeface="宋体" charset="0"/>
+                <a:ea typeface="宋体" charset="0"/>
+              </a:rPr>
+              <a:t>通信协议</a:t>
+            </a:r>
+            <a:endParaRPr lang="zh-CN" altLang="en-US" sz="3600" dirty="0">
+              <a:latin typeface="宋体" charset="0"/>
+              <a:ea typeface="宋体" charset="0"/>
+            </a:endParaRPr>
+          </a:p>
+        </p:txBody>
+      </p:sp>
+      <p:sp>
+        <p:nvSpPr>
+          <p:cNvPr id="3" name="内容占位符 2"/>
+          <p:cNvSpPr>
+            <a:spLocks noGrp="1"/>
+          </p:cNvSpPr>
+          <p:nvPr>
+            <p:ph idx="1"/>
+          </p:nvPr>
+        </p:nvSpPr>
+        <p:spPr>
+          <a:xfrm>
+            <a:off x="838200" y="1905000"/>
+            <a:ext cx="7848600" cy="4105275"/>
+          </a:xfrm>
+        </p:spPr>
+        <p:txBody>
+          <a:bodyPr/>
+          <a:lstStyle/>
+          <a:p>
+            <a:r>
+              <a:rPr lang="en-US" altLang="zh-CN" sz="2400" dirty="0" err="1" smtClean="0">
+                <a:latin typeface="宋体" pitchFamily="2" charset="-122"/>
+                <a:ea typeface="宋体" pitchFamily="2" charset="-122"/>
+              </a:rPr>
+              <a:t>SingleOpProtocol</a:t>
+            </a:r>
+            <a:endParaRPr lang="en-US" altLang="zh-CN" sz="2400" dirty="0" smtClean="0">
+              <a:latin typeface="宋体" pitchFamily="2" charset="-122"/>
+              <a:ea typeface="宋体" pitchFamily="2" charset="-122"/>
+            </a:endParaRPr>
+          </a:p>
+          <a:p>
+            <a:pPr>
+              <a:buNone/>
+            </a:pPr>
+            <a:r>
+              <a:rPr lang="en-US" altLang="zh-CN" sz="2400" dirty="0" smtClean="0">
+                <a:latin typeface="宋体" pitchFamily="2" charset="-122"/>
+                <a:ea typeface="宋体" pitchFamily="2" charset="-122"/>
+              </a:rPr>
+              <a:t>	</a:t>
+            </a:r>
+            <a:r>
+              <a:rPr lang="zh-CN" altLang="en-US" sz="1800" dirty="0" smtClean="0">
+                <a:latin typeface="宋体" pitchFamily="2" charset="-122"/>
+                <a:ea typeface="宋体" pitchFamily="2" charset="-122"/>
+              </a:rPr>
+              <a:t>本次建立的</a:t>
+            </a:r>
+            <a:r>
+              <a:rPr lang="en-US" altLang="zh-CN" sz="1800" dirty="0" err="1" smtClean="0">
+                <a:latin typeface="宋体" pitchFamily="2" charset="-122"/>
+                <a:ea typeface="宋体" pitchFamily="2" charset="-122"/>
+              </a:rPr>
+              <a:t>sokcet</a:t>
+            </a:r>
+            <a:r>
+              <a:rPr lang="zh-CN" altLang="en-US" sz="1800" dirty="0" smtClean="0">
+                <a:latin typeface="宋体" pitchFamily="2" charset="-122"/>
+                <a:ea typeface="宋体" pitchFamily="2" charset="-122"/>
+              </a:rPr>
+              <a:t>连接只为一次操作服务，操作完成关闭</a:t>
+            </a:r>
+            <a:r>
+              <a:rPr lang="en-US" altLang="zh-CN" sz="1800" dirty="0" smtClean="0">
+                <a:latin typeface="宋体" pitchFamily="2" charset="-122"/>
+                <a:ea typeface="宋体" pitchFamily="2" charset="-122"/>
+              </a:rPr>
+              <a:t>socket</a:t>
+            </a:r>
+            <a:r>
+              <a:rPr lang="zh-CN" altLang="en-US" sz="1800" dirty="0" smtClean="0">
+                <a:latin typeface="宋体" pitchFamily="2" charset="-122"/>
+                <a:ea typeface="宋体" pitchFamily="2" charset="-122"/>
+              </a:rPr>
+              <a:t>连接。</a:t>
+            </a:r>
+            <a:endParaRPr lang="en-US" altLang="zh-CN" sz="2400" dirty="0" smtClean="0">
+              <a:latin typeface="宋体" pitchFamily="2" charset="-122"/>
+              <a:ea typeface="宋体" pitchFamily="2" charset="-122"/>
+            </a:endParaRPr>
+          </a:p>
+          <a:p>
+            <a:r>
+              <a:rPr lang="en-US" altLang="zh-CN" sz="2400" dirty="0" err="1" smtClean="0">
+                <a:latin typeface="宋体" pitchFamily="2" charset="-122"/>
+                <a:ea typeface="宋体" pitchFamily="2" charset="-122"/>
+              </a:rPr>
+              <a:t>StreamProtocol</a:t>
+            </a:r>
+            <a:endParaRPr lang="en-US" altLang="zh-CN" sz="2400" dirty="0" smtClean="0">
+              <a:latin typeface="宋体" pitchFamily="2" charset="-122"/>
+              <a:ea typeface="宋体" pitchFamily="2" charset="-122"/>
+            </a:endParaRPr>
+          </a:p>
+          <a:p>
+            <a:pPr>
+              <a:buNone/>
+            </a:pPr>
+            <a:r>
+              <a:rPr lang="en-US" altLang="zh-CN" sz="2400" dirty="0" smtClean="0">
+                <a:latin typeface="宋体" pitchFamily="2" charset="-122"/>
+                <a:ea typeface="宋体" pitchFamily="2" charset="-122"/>
+              </a:rPr>
+              <a:t>	</a:t>
+            </a:r>
+            <a:r>
+              <a:rPr lang="en-US" altLang="zh-CN" sz="1800" dirty="0" smtClean="0">
+                <a:latin typeface="宋体" pitchFamily="2" charset="-122"/>
+                <a:ea typeface="宋体" pitchFamily="2" charset="-122"/>
+              </a:rPr>
+              <a:t>socket</a:t>
+            </a:r>
+            <a:r>
+              <a:rPr lang="zh-CN" altLang="en-US" sz="1800" dirty="0" smtClean="0">
+                <a:latin typeface="宋体" pitchFamily="2" charset="-122"/>
+                <a:ea typeface="宋体" pitchFamily="2" charset="-122"/>
+              </a:rPr>
+              <a:t>连接为多次操作服务，直到某种异常发生</a:t>
+            </a:r>
+            <a:endParaRPr lang="en-US" altLang="zh-CN" sz="2400" dirty="0" smtClean="0">
+              <a:latin typeface="宋体" pitchFamily="2" charset="-122"/>
+              <a:ea typeface="宋体" pitchFamily="2" charset="-122"/>
+            </a:endParaRPr>
+          </a:p>
+          <a:p>
+            <a:r>
+              <a:rPr lang="en-US" altLang="zh-CN" sz="2400" dirty="0" err="1" smtClean="0">
+                <a:latin typeface="宋体" pitchFamily="2" charset="-122"/>
+                <a:ea typeface="宋体" pitchFamily="2" charset="-122"/>
+              </a:rPr>
+              <a:t>MultiplexProtocol</a:t>
+            </a:r>
+            <a:endParaRPr lang="en-US" altLang="zh-CN" sz="2400" dirty="0" smtClean="0">
+              <a:latin typeface="宋体" pitchFamily="2" charset="-122"/>
+              <a:ea typeface="宋体" pitchFamily="2" charset="-122"/>
+            </a:endParaRPr>
+          </a:p>
+          <a:p>
+            <a:pPr>
+              <a:buNone/>
+            </a:pPr>
+            <a:r>
+              <a:rPr lang="en-US" altLang="zh-CN" sz="2400" dirty="0" smtClean="0">
+                <a:latin typeface="宋体" pitchFamily="2" charset="-122"/>
+                <a:ea typeface="宋体" pitchFamily="2" charset="-122"/>
+              </a:rPr>
+              <a:t>	</a:t>
+            </a:r>
+            <a:r>
+              <a:rPr lang="en-US" altLang="zh-CN" sz="1800" dirty="0" smtClean="0">
+                <a:latin typeface="宋体" pitchFamily="2" charset="-122"/>
+                <a:ea typeface="宋体" pitchFamily="2" charset="-122"/>
+              </a:rPr>
+              <a:t>socket</a:t>
+            </a:r>
+            <a:r>
+              <a:rPr lang="zh-CN" altLang="en-US" sz="1800" dirty="0" smtClean="0">
+                <a:latin typeface="宋体" pitchFamily="2" charset="-122"/>
+                <a:ea typeface="宋体" pitchFamily="2" charset="-122"/>
+              </a:rPr>
+              <a:t>使用多路复用，建立多个虚拟连接</a:t>
+            </a:r>
+            <a:endParaRPr lang="en-US" altLang="zh-CN" sz="1800" dirty="0" smtClean="0">
+              <a:latin typeface="宋体" pitchFamily="2" charset="-122"/>
+              <a:ea typeface="宋体" pitchFamily="2" charset="-122"/>
+            </a:endParaRPr>
+          </a:p>
+        </p:txBody>
+      </p:sp>
+    </p:spTree>
+  </p:cSld>
+  <p:clrMapOvr>
+    <a:masterClrMapping/>
+  </p:clrMapOvr>
+  <p:timing>
+    <p:tnLst>
+      <p:par>
+        <p:cTn id="1" dur="indefinite" restart="never" nodeType="tmRoot"/>
+      </p:par>
+    </p:tnLst>
+  </p:timing>
+</p:sld>
+</file>
+
+<file path=ppt/slides/slide14.xml><?xml version="1.0" encoding="utf-8"?>
+<p:sld xmlns:a="http://schemas.openxmlformats.org/drawingml/2006/main" xmlns:r="http://schemas.openxmlformats.org/officeDocument/2006/relationships" xmlns:p="http://schemas.openxmlformats.org/presentationml/2006/main">
+  <p:cSld>
+    <p:spTree>
+      <p:nvGrpSpPr>
+        <p:cNvPr id="1" name=""/>
+        <p:cNvGrpSpPr/>
+        <p:nvPr/>
+      </p:nvGrpSpPr>
+      <p:grpSpPr>
+        <a:xfrm>
+          <a:off x="0" y="0"/>
+          <a:ext cx="0" cy="0"/>
+          <a:chOff x="0" y="0"/>
+          <a:chExt cx="0" cy="0"/>
+        </a:xfrm>
+      </p:grpSpPr>
+      <p:sp>
+        <p:nvSpPr>
+          <p:cNvPr id="2" name="标题 1"/>
+          <p:cNvSpPr>
+            <a:spLocks noGrp="1"/>
+          </p:cNvSpPr>
+          <p:nvPr>
+            <p:ph type="title"/>
+          </p:nvPr>
+        </p:nvSpPr>
+        <p:spPr/>
+        <p:txBody>
+          <a:bodyPr/>
+          <a:lstStyle/>
+          <a:p>
+            <a:r>
+              <a:rPr lang="en-US" altLang="zh-CN" sz="3600" dirty="0" smtClean="0">
+                <a:latin typeface="宋体" charset="0"/>
+                <a:ea typeface="宋体" charset="0"/>
+              </a:rPr>
+              <a:t>RMI</a:t>
+            </a:r>
+            <a:r>
+              <a:rPr lang="zh-CN" altLang="en-US" sz="3600" dirty="0" smtClean="0">
+                <a:latin typeface="宋体" charset="0"/>
+                <a:ea typeface="宋体" charset="0"/>
+              </a:rPr>
+              <a:t>线程模型</a:t>
+            </a:r>
+            <a:endParaRPr lang="zh-CN" altLang="en-US" sz="3600" dirty="0">
+              <a:latin typeface="宋体" charset="0"/>
+              <a:ea typeface="宋体" charset="0"/>
+            </a:endParaRPr>
+          </a:p>
+        </p:txBody>
+      </p:sp>
+      <p:sp>
+        <p:nvSpPr>
+          <p:cNvPr id="3" name="内容占位符 2"/>
+          <p:cNvSpPr>
+            <a:spLocks noGrp="1"/>
+          </p:cNvSpPr>
+          <p:nvPr>
+            <p:ph idx="1"/>
+          </p:nvPr>
+        </p:nvSpPr>
+        <p:spPr>
+          <a:xfrm>
+            <a:off x="838200" y="1905000"/>
+            <a:ext cx="7848600" cy="4105275"/>
+          </a:xfrm>
+        </p:spPr>
+        <p:txBody>
+          <a:bodyPr/>
+          <a:lstStyle/>
+          <a:p>
+            <a:r>
+              <a:rPr lang="en-US" altLang="zh-CN" sz="1800" dirty="0" smtClean="0">
+                <a:latin typeface="宋体" pitchFamily="2" charset="-122"/>
+                <a:ea typeface="宋体" pitchFamily="2" charset="-122"/>
+              </a:rPr>
+              <a:t>Jdk1.5</a:t>
+            </a:r>
+            <a:r>
+              <a:rPr lang="zh-CN" altLang="en-US" sz="1800" dirty="0" smtClean="0">
+                <a:latin typeface="宋体" pitchFamily="2" charset="-122"/>
+                <a:ea typeface="宋体" pitchFamily="2" charset="-122"/>
+              </a:rPr>
+              <a:t>之后</a:t>
+            </a:r>
+            <a:r>
+              <a:rPr lang="en-US" altLang="zh-CN" sz="1800" dirty="0" smtClean="0">
+                <a:latin typeface="宋体" pitchFamily="2" charset="-122"/>
+                <a:ea typeface="宋体" pitchFamily="2" charset="-122"/>
+              </a:rPr>
+              <a:t>RMI</a:t>
+            </a:r>
+            <a:r>
+              <a:rPr lang="zh-CN" altLang="en-US" sz="1800" dirty="0" smtClean="0">
+                <a:latin typeface="宋体" pitchFamily="2" charset="-122"/>
+                <a:ea typeface="宋体" pitchFamily="2" charset="-122"/>
+              </a:rPr>
+              <a:t>使用线程池处理客户端的请求。具体的做法每个</a:t>
+            </a:r>
+            <a:r>
+              <a:rPr lang="en-US" altLang="zh-CN" sz="1800" dirty="0" smtClean="0">
+                <a:latin typeface="宋体" pitchFamily="2" charset="-122"/>
+                <a:ea typeface="宋体" pitchFamily="2" charset="-122"/>
+              </a:rPr>
+              <a:t>Transport</a:t>
+            </a:r>
+            <a:r>
+              <a:rPr lang="zh-CN" altLang="en-US" sz="1800" dirty="0" smtClean="0">
+                <a:latin typeface="宋体" pitchFamily="2" charset="-122"/>
+                <a:ea typeface="宋体" pitchFamily="2" charset="-122"/>
+              </a:rPr>
+              <a:t>对象独占一个在线程池之外的线程进行</a:t>
+            </a:r>
+            <a:r>
+              <a:rPr lang="en-US" altLang="zh-CN" sz="1800" dirty="0" err="1" smtClean="0">
+                <a:latin typeface="宋体" pitchFamily="2" charset="-122"/>
+                <a:ea typeface="宋体" pitchFamily="2" charset="-122"/>
+              </a:rPr>
+              <a:t>SocketServer</a:t>
+            </a:r>
+            <a:r>
+              <a:rPr lang="zh-CN" altLang="en-US" sz="1800" dirty="0" smtClean="0">
+                <a:latin typeface="宋体" pitchFamily="2" charset="-122"/>
+                <a:ea typeface="宋体" pitchFamily="2" charset="-122"/>
+              </a:rPr>
+              <a:t>的</a:t>
+            </a:r>
+            <a:r>
+              <a:rPr lang="en-US" altLang="zh-CN" sz="1800" dirty="0" smtClean="0">
+                <a:latin typeface="宋体" pitchFamily="2" charset="-122"/>
+                <a:ea typeface="宋体" pitchFamily="2" charset="-122"/>
+              </a:rPr>
+              <a:t>accept</a:t>
+            </a:r>
+            <a:r>
+              <a:rPr lang="zh-CN" altLang="en-US" sz="1800" dirty="0" smtClean="0">
+                <a:latin typeface="宋体" pitchFamily="2" charset="-122"/>
+                <a:ea typeface="宋体" pitchFamily="2" charset="-122"/>
+              </a:rPr>
+              <a:t>方法，接受客户端建立</a:t>
+            </a:r>
+            <a:r>
+              <a:rPr lang="en-US" altLang="zh-CN" sz="1800" dirty="0" smtClean="0">
+                <a:latin typeface="宋体" pitchFamily="2" charset="-122"/>
+                <a:ea typeface="宋体" pitchFamily="2" charset="-122"/>
+              </a:rPr>
+              <a:t>socket</a:t>
+            </a:r>
+            <a:r>
+              <a:rPr lang="zh-CN" altLang="en-US" sz="1800" dirty="0" smtClean="0">
+                <a:latin typeface="宋体" pitchFamily="2" charset="-122"/>
+                <a:ea typeface="宋体" pitchFamily="2" charset="-122"/>
+              </a:rPr>
+              <a:t>连接，建立连接后把</a:t>
+            </a:r>
+            <a:r>
+              <a:rPr lang="en-US" altLang="zh-CN" sz="1800" dirty="0" smtClean="0">
+                <a:latin typeface="宋体" pitchFamily="2" charset="-122"/>
+                <a:ea typeface="宋体" pitchFamily="2" charset="-122"/>
+              </a:rPr>
+              <a:t>socket</a:t>
+            </a:r>
+            <a:r>
+              <a:rPr lang="zh-CN" altLang="en-US" sz="1800" dirty="0" smtClean="0">
+                <a:latin typeface="宋体" pitchFamily="2" charset="-122"/>
+                <a:ea typeface="宋体" pitchFamily="2" charset="-122"/>
+              </a:rPr>
+              <a:t>转交给线程池处理。</a:t>
+            </a:r>
+            <a:endParaRPr lang="en-US" altLang="zh-CN" sz="1800" dirty="0" smtClean="0">
+              <a:latin typeface="宋体" pitchFamily="2" charset="-122"/>
+              <a:ea typeface="宋体" pitchFamily="2" charset="-122"/>
+            </a:endParaRPr>
+          </a:p>
+          <a:p>
+            <a:r>
+              <a:rPr lang="zh-CN" altLang="en-US" sz="1800" dirty="0" smtClean="0">
+                <a:latin typeface="宋体" pitchFamily="2" charset="-122"/>
+                <a:ea typeface="宋体" pitchFamily="2" charset="-122"/>
+              </a:rPr>
+              <a:t>使用之前提及的</a:t>
+            </a:r>
+            <a:r>
+              <a:rPr lang="en-US" altLang="zh-CN" sz="1800" dirty="0" err="1" smtClean="0">
+                <a:latin typeface="宋体" pitchFamily="2" charset="-122"/>
+                <a:ea typeface="宋体" pitchFamily="2" charset="-122"/>
+              </a:rPr>
+              <a:t>SingleOpProtocol</a:t>
+            </a:r>
+            <a:r>
+              <a:rPr lang="zh-CN" altLang="en-US" sz="1800" dirty="0" smtClean="0">
+                <a:latin typeface="宋体" pitchFamily="2" charset="-122"/>
+                <a:ea typeface="宋体" pitchFamily="2" charset="-122"/>
+              </a:rPr>
+              <a:t>协议、</a:t>
+            </a:r>
+            <a:r>
+              <a:rPr lang="en-US" altLang="zh-CN" sz="1800" dirty="0" smtClean="0">
+                <a:latin typeface="宋体" pitchFamily="2" charset="-122"/>
+                <a:ea typeface="宋体" pitchFamily="2" charset="-122"/>
+              </a:rPr>
+              <a:t> </a:t>
+            </a:r>
+            <a:r>
+              <a:rPr lang="en-US" altLang="zh-CN" sz="1800" dirty="0" err="1" smtClean="0">
+                <a:latin typeface="宋体" pitchFamily="2" charset="-122"/>
+                <a:ea typeface="宋体" pitchFamily="2" charset="-122"/>
+              </a:rPr>
+              <a:t>StreamProtocol</a:t>
+            </a:r>
+            <a:r>
+              <a:rPr lang="zh-CN" altLang="en-US" sz="1800" dirty="0" smtClean="0">
+                <a:latin typeface="宋体" pitchFamily="2" charset="-122"/>
+                <a:ea typeface="宋体" pitchFamily="2" charset="-122"/>
+              </a:rPr>
+              <a:t>协议都是直接使用线程池线程。但如果使用</a:t>
+            </a:r>
+            <a:r>
+              <a:rPr lang="en-US" altLang="zh-CN" sz="1800" dirty="0" err="1" smtClean="0">
+                <a:latin typeface="宋体" pitchFamily="2" charset="-122"/>
+                <a:ea typeface="宋体" pitchFamily="2" charset="-122"/>
+              </a:rPr>
+              <a:t>MultiplexProtocol</a:t>
+            </a:r>
+            <a:r>
+              <a:rPr lang="zh-CN" altLang="en-US" sz="1800" dirty="0" smtClean="0">
+                <a:latin typeface="宋体" pitchFamily="2" charset="-122"/>
+                <a:ea typeface="宋体" pitchFamily="2" charset="-122"/>
+              </a:rPr>
+              <a:t>协议就会有一些不同。</a:t>
+            </a:r>
+            <a:endParaRPr lang="en-US" altLang="zh-CN" sz="1800" dirty="0" smtClean="0">
+              <a:latin typeface="宋体" pitchFamily="2" charset="-122"/>
+              <a:ea typeface="宋体" pitchFamily="2" charset="-122"/>
+            </a:endParaRPr>
+          </a:p>
+          <a:p>
+            <a:r>
+              <a:rPr lang="zh-CN" altLang="en-US" sz="1800" dirty="0" smtClean="0">
+                <a:latin typeface="宋体" pitchFamily="2" charset="-122"/>
+                <a:ea typeface="宋体" pitchFamily="2" charset="-122"/>
+              </a:rPr>
+              <a:t>使用</a:t>
+            </a:r>
+            <a:r>
+              <a:rPr lang="en-US" altLang="zh-CN" sz="1800" dirty="0" err="1" smtClean="0">
+                <a:latin typeface="宋体" pitchFamily="2" charset="-122"/>
+                <a:ea typeface="宋体" pitchFamily="2" charset="-122"/>
+              </a:rPr>
+              <a:t>MultiplexProtocol</a:t>
+            </a:r>
+            <a:r>
+              <a:rPr lang="zh-CN" altLang="en-US" sz="1800" dirty="0" smtClean="0">
+                <a:latin typeface="宋体" pitchFamily="2" charset="-122"/>
+                <a:ea typeface="宋体" pitchFamily="2" charset="-122"/>
+              </a:rPr>
+              <a:t>协议除了占用一个线程池的线程进行不断消息接收，还会建立与虚拟连接数量等值的额外线程进行消息处理以及写出。</a:t>
+            </a:r>
+            <a:endParaRPr lang="en-US" altLang="zh-CN" sz="1800" dirty="0" smtClean="0">
+              <a:latin typeface="宋体" pitchFamily="2" charset="-122"/>
+              <a:ea typeface="宋体" pitchFamily="2" charset="-122"/>
+            </a:endParaRPr>
+          </a:p>
+        </p:txBody>
+      </p:sp>
+    </p:spTree>
+  </p:cSld>
+  <p:clrMapOvr>
+    <a:masterClrMapping/>
+  </p:clrMapOvr>
+  <p:timing>
+    <p:tnLst>
+      <p:par>
+        <p:cTn id="1" dur="indefinite" restart="never" nodeType="tmRoot"/>
+      </p:par>
+    </p:tnLst>
+  </p:timing>
+</p:sld>
+</file>
+
+<file path=ppt/slides/slide15.xml><?xml version="1.0" encoding="utf-8"?>
+<p:sld xmlns:a="http://schemas.openxmlformats.org/drawingml/2006/main" xmlns:r="http://schemas.openxmlformats.org/officeDocument/2006/relationships" xmlns:p="http://schemas.openxmlformats.org/presentationml/2006/main">
+  <p:cSld>
+    <p:bg>
+      <p:bgPr>
+        <a:blipFill dpi="0" rotWithShape="0">
+          <a:blip r:embed="rId2" cstate="print"/>
+          <a:srcRect/>
+          <a:stretch>
+            <a:fillRect/>
+          </a:stretch>
+        </a:blipFill>
+        <a:effectLst/>
+      </p:bgPr>
+    </p:bg>
+    <p:spTree>
+      <p:nvGrpSpPr>
+        <p:cNvPr id="1" name=""/>
+        <p:cNvGrpSpPr/>
+        <p:nvPr/>
+      </p:nvGrpSpPr>
+      <p:grpSpPr>
+        <a:xfrm>
+          <a:off x="0" y="0"/>
+          <a:ext cx="0" cy="0"/>
+          <a:chOff x="0" y="0"/>
+          <a:chExt cx="0" cy="0"/>
+        </a:xfrm>
+      </p:grpSpPr>
+      <p:sp>
+        <p:nvSpPr>
+          <p:cNvPr id="16386" name="Rectangle 2"/>
           <p:cNvSpPr>
             <a:spLocks noGrp="1" noChangeArrowheads="1"/>
           </p:cNvSpPr>
           <p:nvPr>
-            <p:ph type="subTitle" idx="1"/>
+            <p:ph type="title"/>
           </p:nvPr>
         </p:nvSpPr>
         <p:spPr/>
@@ -3396,12 +4397,30 @@
           <a:lstStyle/>
           <a:p>
             <a:r>
-              <a:rPr lang="zh-CN" altLang="en-US" smtClean="0">
+              <a:rPr lang="en-US" altLang="zh-CN" smtClean="0">
                 <a:ea typeface="宋体" charset="-122"/>
               </a:rPr>
-              <a:t>简梓鉴</a:t>
-            </a:r>
-            <a:endParaRPr lang="zh-CN" altLang="en-US" smtClean="0">
+              <a:t>Q&amp;A</a:t>
+            </a:r>
+          </a:p>
+        </p:txBody>
+      </p:sp>
+      <p:sp>
+        <p:nvSpPr>
+          <p:cNvPr id="16387" name="Rectangle 3"/>
+          <p:cNvSpPr>
+            <a:spLocks noGrp="1" noChangeArrowheads="1"/>
+          </p:cNvSpPr>
+          <p:nvPr>
+            <p:ph type="body" idx="1"/>
+          </p:nvPr>
+        </p:nvSpPr>
+        <p:spPr/>
+        <p:txBody>
+          <a:bodyPr/>
+          <a:lstStyle/>
+          <a:p>
+            <a:endParaRPr lang="en-US" altLang="zh-CN" smtClean="0">
               <a:ea typeface="宋体" charset="-122"/>
             </a:endParaRPr>
           </a:p>
@@ -3431,7 +4450,14 @@
         <p:cNvGrpSpPr/>
         <p:nvPr/>
       </p:nvGrpSpPr>
-      <p:grpSpPr/>
+      <p:grpSpPr>
+        <a:xfrm>
+          <a:off x="0" y="0"/>
+          <a:ext cx="0" cy="0"/>
+          <a:chOff x="0" y="0"/>
+          <a:chExt cx="0" cy="0"/>
+        </a:xfrm>
+      </p:grpSpPr>
       <p:sp>
         <p:nvSpPr>
           <p:cNvPr id="2" name="标题 1"/>
@@ -3445,6 +4471,7 @@
         <p:spPr/>
         <p:txBody>
           <a:bodyPr/>
+          <a:lstStyle/>
           <a:p>
             <a:r>
               <a:rPr lang="zh-CN" altLang="en-US" sz="3600">
@@ -3460,10 +4487,6 @@
               </a:rPr>
               <a:t>RMI</a:t>
             </a:r>
-            <a:endParaRPr lang="en-US" altLang="zh-CN" sz="3600">
-              <a:latin typeface="宋体" charset="0"/>
-              <a:ea typeface="宋体" charset="0"/>
-            </a:endParaRPr>
           </a:p>
         </p:txBody>
       </p:sp>
@@ -3480,6 +4503,7 @@
         <p:spPr/>
         <p:txBody>
           <a:bodyPr/>
+          <a:lstStyle/>
           <a:p>
             <a:r>
               <a:rPr sz="2400">
@@ -3495,10 +4519,6 @@
               </a:rPr>
               <a:t>。</a:t>
             </a:r>
-            <a:endParaRPr lang="zh-CN" sz="2400">
-              <a:latin typeface="宋体" charset="0"/>
-              <a:ea typeface="宋体" charset="0"/>
-            </a:endParaRPr>
           </a:p>
           <a:p>
             <a:r>
@@ -3536,10 +4556,6 @@
               </a:rPr>
               <a:t>可以相互通信。而这个通信是通过方法调用实现的。</a:t>
             </a:r>
-            <a:endParaRPr lang="zh-CN" altLang="en-US" sz="2400">
-              <a:latin typeface="宋体" charset="0"/>
-              <a:ea typeface="宋体" charset="0"/>
-            </a:endParaRPr>
           </a:p>
           <a:p>
             <a:r>
@@ -3570,10 +4586,6 @@
               </a:rPr>
               <a:t>的程序员可以像调用本地对象一样调用远程对象。</a:t>
             </a:r>
-            <a:endParaRPr lang="zh-CN" altLang="en-US" sz="2400">
-              <a:latin typeface="宋体" charset="0"/>
-              <a:ea typeface="宋体" charset="0"/>
-            </a:endParaRPr>
           </a:p>
         </p:txBody>
       </p:sp>
@@ -3582,1010 +4594,19 @@
   <p:clrMapOvr>
     <a:masterClrMapping/>
   </p:clrMapOvr>
+  <p:timing>
+    <p:tnLst>
+      <p:par>
+        <p:cTn id="1" dur="indefinite" restart="never" nodeType="tmRoot"/>
+      </p:par>
+    </p:tnLst>
+  </p:timing>
 </p:sld>
 </file>
 
 <file path=ppt/slides/slide3.xml><?xml version="1.0" encoding="utf-8"?>
 <p:sld xmlns:a="http://schemas.openxmlformats.org/drawingml/2006/main" xmlns:r="http://schemas.openxmlformats.org/officeDocument/2006/relationships" xmlns:p="http://schemas.openxmlformats.org/presentationml/2006/main">
   <p:cSld>
-    <p:spTree>
-      <p:nvGrpSpPr>
-        <p:cNvPr id="1" name=""/>
-        <p:cNvGrpSpPr/>
-        <p:nvPr/>
-      </p:nvGrpSpPr>
-      <p:grpSpPr/>
-      <p:sp>
-        <p:nvSpPr>
-          <p:cNvPr id="2" name="标题 1"/>
-          <p:cNvSpPr>
-            <a:spLocks noGrp="1"/>
-          </p:cNvSpPr>
-          <p:nvPr>
-            <p:ph type="title"/>
-          </p:nvPr>
-        </p:nvSpPr>
-        <p:spPr/>
-        <p:txBody>
-          <a:bodyPr/>
-          <a:p>
-            <a:r>
-              <a:rPr lang="en-US" altLang="zh-CN" sz="3600">
-                <a:latin typeface="宋体" charset="0"/>
-                <a:ea typeface="宋体" charset="0"/>
-              </a:rPr>
-              <a:t>RMI</a:t>
-            </a:r>
-            <a:r>
-              <a:rPr lang="zh-CN" altLang="en-US" sz="3600">
-                <a:latin typeface="宋体" charset="0"/>
-                <a:ea typeface="宋体" charset="0"/>
-              </a:rPr>
-              <a:t>的知识点</a:t>
-            </a:r>
-            <a:endParaRPr lang="zh-CN" altLang="en-US" sz="3600">
-              <a:latin typeface="宋体" charset="0"/>
-              <a:ea typeface="宋体" charset="0"/>
-            </a:endParaRPr>
-          </a:p>
-        </p:txBody>
-      </p:sp>
-      <p:sp>
-        <p:nvSpPr>
-          <p:cNvPr id="3" name="内容占位符 2"/>
-          <p:cNvSpPr>
-            <a:spLocks noGrp="1"/>
-          </p:cNvSpPr>
-          <p:nvPr>
-            <p:ph idx="1"/>
-          </p:nvPr>
-        </p:nvSpPr>
-        <p:spPr/>
-        <p:txBody>
-          <a:bodyPr/>
-          <a:p>
-            <a:r>
-              <a:rPr lang="zh-CN" altLang="en-US" sz="2400">
-                <a:latin typeface="宋体" charset="0"/>
-                <a:ea typeface="宋体" charset="0"/>
-              </a:rPr>
-              <a:t>数据结构</a:t>
-            </a:r>
-            <a:endParaRPr lang="zh-CN" altLang="en-US" sz="2400">
-              <a:latin typeface="宋体" charset="0"/>
-              <a:ea typeface="宋体" charset="0"/>
-            </a:endParaRPr>
-          </a:p>
-          <a:p>
-            <a:r>
-              <a:rPr lang="zh-CN" altLang="en-US" sz="2400">
-                <a:latin typeface="宋体" charset="0"/>
-                <a:ea typeface="宋体" charset="0"/>
-              </a:rPr>
-              <a:t>通信协议及线程模型</a:t>
-            </a:r>
-            <a:endParaRPr lang="zh-CN" altLang="en-US" sz="2400">
-              <a:latin typeface="宋体" charset="0"/>
-              <a:ea typeface="宋体" charset="0"/>
-            </a:endParaRPr>
-          </a:p>
-          <a:p>
-            <a:r>
-              <a:rPr lang="zh-CN" altLang="en-US" sz="2400">
-                <a:latin typeface="宋体" charset="0"/>
-                <a:ea typeface="宋体" charset="0"/>
-              </a:rPr>
-              <a:t>分布式垃圾回收</a:t>
-            </a:r>
-            <a:endParaRPr lang="zh-CN" altLang="en-US" sz="2400">
-              <a:latin typeface="宋体" charset="0"/>
-              <a:ea typeface="宋体" charset="0"/>
-            </a:endParaRPr>
-          </a:p>
-          <a:p>
-            <a:r>
-              <a:rPr lang="zh-CN" altLang="en-US" sz="2400">
-                <a:latin typeface="宋体" charset="0"/>
-                <a:ea typeface="宋体" charset="0"/>
-              </a:rPr>
-              <a:t>安全模型</a:t>
-            </a:r>
-            <a:endParaRPr lang="zh-CN" altLang="en-US" sz="2400">
-              <a:latin typeface="宋体" charset="0"/>
-              <a:ea typeface="宋体" charset="0"/>
-            </a:endParaRPr>
-          </a:p>
-        </p:txBody>
-      </p:sp>
-    </p:spTree>
-  </p:cSld>
-  <p:clrMapOvr>
-    <a:masterClrMapping/>
-  </p:clrMapOvr>
-</p:sld>
-</file>
-
-<file path=ppt/slides/slide4.xml><?xml version="1.0" encoding="utf-8"?>
-<p:sld xmlns:a="http://schemas.openxmlformats.org/drawingml/2006/main" xmlns:r="http://schemas.openxmlformats.org/officeDocument/2006/relationships" xmlns:p="http://schemas.openxmlformats.org/presentationml/2006/main">
-  <p:cSld>
-    <p:spTree>
-      <p:nvGrpSpPr>
-        <p:cNvPr id="1" name=""/>
-        <p:cNvGrpSpPr/>
-        <p:nvPr/>
-      </p:nvGrpSpPr>
-      <p:grpSpPr/>
-      <p:sp>
-        <p:nvSpPr>
-          <p:cNvPr id="2" name="标题 1"/>
-          <p:cNvSpPr>
-            <a:spLocks noGrp="1"/>
-          </p:cNvSpPr>
-          <p:nvPr>
-            <p:ph type="title"/>
-          </p:nvPr>
-        </p:nvSpPr>
-        <p:spPr/>
-        <p:txBody>
-          <a:bodyPr/>
-          <a:p>
-            <a:r>
-              <a:rPr lang="en-US" altLang="zh-CN" sz="3600">
-                <a:latin typeface="宋体" charset="0"/>
-                <a:ea typeface="宋体" charset="0"/>
-              </a:rPr>
-              <a:t>RMI</a:t>
-            </a:r>
-            <a:r>
-              <a:rPr lang="zh-CN" altLang="en-US" sz="3600">
-                <a:latin typeface="宋体" charset="0"/>
-                <a:ea typeface="宋体" charset="0"/>
-              </a:rPr>
-              <a:t>数据结构之抽象</a:t>
-            </a:r>
-            <a:endParaRPr lang="zh-CN" altLang="en-US" sz="3600">
-              <a:latin typeface="宋体" charset="0"/>
-              <a:ea typeface="宋体" charset="0"/>
-            </a:endParaRPr>
-          </a:p>
-        </p:txBody>
-      </p:sp>
-      <p:sp>
-        <p:nvSpPr>
-          <p:cNvPr id="3" name="内容占位符 2"/>
-          <p:cNvSpPr>
-            <a:spLocks noGrp="1"/>
-          </p:cNvSpPr>
-          <p:nvPr>
-            <p:ph idx="1"/>
-          </p:nvPr>
-        </p:nvSpPr>
-        <p:spPr/>
-        <p:txBody>
-          <a:bodyPr/>
-          <a:p>
-            <a:r>
-              <a:rPr lang="zh-CN" altLang="en-US" sz="2400">
-                <a:latin typeface="宋体" charset="0"/>
-                <a:ea typeface="宋体" charset="0"/>
-              </a:rPr>
-              <a:t>RemoteObject：继承</a:t>
-            </a:r>
-            <a:r>
-              <a:rPr lang="en-US" altLang="zh-CN" sz="2400">
-                <a:latin typeface="宋体" charset="0"/>
-                <a:ea typeface="宋体" charset="0"/>
-              </a:rPr>
-              <a:t>Object</a:t>
-            </a:r>
-            <a:r>
-              <a:rPr lang="zh-CN" altLang="en-US" sz="2400">
-                <a:latin typeface="宋体" charset="0"/>
-                <a:ea typeface="宋体" charset="0"/>
-              </a:rPr>
-              <a:t>，</a:t>
-            </a:r>
-            <a:r>
-              <a:rPr lang="zh-CN" altLang="en-US" sz="2400">
-                <a:latin typeface="宋体" charset="0"/>
-                <a:ea typeface="宋体" charset="0"/>
-              </a:rPr>
-              <a:t>提供了远程对象有关于</a:t>
-            </a:r>
-            <a:r>
-              <a:rPr lang="en-US" altLang="zh-CN" sz="2400">
-                <a:latin typeface="宋体" charset="0"/>
-                <a:ea typeface="宋体" charset="0"/>
-              </a:rPr>
-              <a:t>Object</a:t>
-            </a:r>
-            <a:r>
-              <a:rPr lang="zh-CN" altLang="en-US" sz="2400">
-                <a:latin typeface="宋体" charset="0"/>
-                <a:ea typeface="宋体" charset="0"/>
-              </a:rPr>
-              <a:t>对象行为的远程实现。</a:t>
-            </a:r>
-            <a:endParaRPr lang="zh-CN" altLang="en-US" sz="2400">
-              <a:latin typeface="宋体" charset="0"/>
-              <a:ea typeface="宋体" charset="0"/>
-            </a:endParaRPr>
-          </a:p>
-          <a:p>
-            <a:r>
-              <a:rPr lang="zh-CN" altLang="en-US" sz="2400">
-                <a:latin typeface="宋体" charset="0"/>
-                <a:ea typeface="宋体" charset="0"/>
-              </a:rPr>
-              <a:t>RemoteRef：远程句柄，提供了操作远程对象的定义。</a:t>
-            </a:r>
-            <a:endParaRPr lang="zh-CN" altLang="en-US" sz="2400">
-              <a:latin typeface="宋体" charset="0"/>
-              <a:ea typeface="宋体" charset="0"/>
-              <a:sym typeface="+mn-ea"/>
-            </a:endParaRPr>
-          </a:p>
-          <a:p>
-            <a:endParaRPr lang="zh-CN" altLang="en-US" sz="2400">
-              <a:latin typeface="宋体" charset="0"/>
-              <a:ea typeface="宋体" charset="0"/>
-            </a:endParaRPr>
-          </a:p>
-        </p:txBody>
-      </p:sp>
-    </p:spTree>
-  </p:cSld>
-  <p:clrMapOvr>
-    <a:masterClrMapping/>
-  </p:clrMapOvr>
-</p:sld>
-</file>
-
-<file path=ppt/slides/slide5.xml><?xml version="1.0" encoding="utf-8"?>
-<p:sld xmlns:a="http://schemas.openxmlformats.org/drawingml/2006/main" xmlns:r="http://schemas.openxmlformats.org/officeDocument/2006/relationships" xmlns:p="http://schemas.openxmlformats.org/presentationml/2006/main">
-  <p:cSld>
-    <p:spTree>
-      <p:nvGrpSpPr>
-        <p:cNvPr id="1" name=""/>
-        <p:cNvGrpSpPr/>
-        <p:nvPr/>
-      </p:nvGrpSpPr>
-      <p:grpSpPr/>
-      <p:sp>
-        <p:nvSpPr>
-          <p:cNvPr id="2" name="标题 1"/>
-          <p:cNvSpPr>
-            <a:spLocks noGrp="1"/>
-          </p:cNvSpPr>
-          <p:nvPr>
-            <p:ph type="title"/>
-          </p:nvPr>
-        </p:nvSpPr>
-        <p:spPr/>
-        <p:txBody>
-          <a:bodyPr/>
-          <a:p>
-            <a:r>
-              <a:rPr lang="en-US" altLang="zh-CN" sz="3600">
-                <a:latin typeface="宋体" charset="0"/>
-                <a:ea typeface="宋体" charset="0"/>
-              </a:rPr>
-              <a:t>RMI</a:t>
-            </a:r>
-            <a:r>
-              <a:rPr lang="zh-CN" altLang="en-US" sz="3600">
-                <a:latin typeface="宋体" charset="0"/>
-                <a:ea typeface="宋体" charset="0"/>
-              </a:rPr>
-              <a:t>数据结构之客户端</a:t>
-            </a:r>
-            <a:endParaRPr lang="zh-CN" altLang="en-US" sz="3600">
-              <a:latin typeface="宋体" charset="0"/>
-              <a:ea typeface="宋体" charset="0"/>
-            </a:endParaRPr>
-          </a:p>
-        </p:txBody>
-      </p:sp>
-      <p:sp>
-        <p:nvSpPr>
-          <p:cNvPr id="3" name="内容占位符 2"/>
-          <p:cNvSpPr>
-            <a:spLocks noGrp="1"/>
-          </p:cNvSpPr>
-          <p:nvPr>
-            <p:ph idx="1"/>
-          </p:nvPr>
-        </p:nvSpPr>
-        <p:spPr/>
-        <p:txBody>
-          <a:bodyPr/>
-          <a:p>
-            <a:r>
-              <a:rPr lang="en-US" altLang="zh-CN" sz="2400">
-                <a:latin typeface="宋体" charset="0"/>
-                <a:ea typeface="宋体" charset="0"/>
-              </a:rPr>
-              <a:t>Proxy</a:t>
-            </a:r>
-            <a:r>
-              <a:rPr lang="zh-CN" altLang="en-US" sz="2400">
-                <a:latin typeface="宋体" charset="0"/>
-                <a:ea typeface="宋体" charset="0"/>
-              </a:rPr>
-              <a:t>：一个实现了远程服务接口的动态代理。</a:t>
-            </a:r>
-            <a:endParaRPr lang="zh-CN" altLang="en-US" sz="2400">
-              <a:latin typeface="宋体" charset="0"/>
-              <a:ea typeface="宋体" charset="0"/>
-            </a:endParaRPr>
-          </a:p>
-          <a:p>
-            <a:r>
-              <a:rPr lang="zh-CN" altLang="en-US" sz="2400">
-                <a:latin typeface="宋体" charset="0"/>
-                <a:ea typeface="宋体" charset="0"/>
-              </a:rPr>
-              <a:t>RemoteObjectInvocationHandler：实现了InvocationHandler，动态代理的</a:t>
-            </a:r>
-            <a:r>
-              <a:rPr lang="en-US" altLang="zh-CN" sz="2400">
-                <a:latin typeface="宋体" charset="0"/>
-                <a:ea typeface="宋体" charset="0"/>
-              </a:rPr>
-              <a:t>Handler</a:t>
-            </a:r>
-            <a:r>
-              <a:rPr lang="zh-CN" altLang="en-US" sz="2400">
-                <a:latin typeface="宋体" charset="0"/>
-                <a:ea typeface="宋体" charset="0"/>
-              </a:rPr>
-              <a:t>类。</a:t>
-            </a:r>
-            <a:endParaRPr lang="zh-CN" altLang="en-US" sz="2400">
-              <a:latin typeface="宋体" charset="0"/>
-              <a:ea typeface="宋体" charset="0"/>
-            </a:endParaRPr>
-          </a:p>
-          <a:p>
-            <a:r>
-              <a:rPr lang="en-US" altLang="zh-CN" sz="2400">
-                <a:latin typeface="宋体" charset="0"/>
-                <a:ea typeface="宋体" charset="0"/>
-              </a:rPr>
-              <a:t>UnicastRef:</a:t>
-            </a:r>
-            <a:r>
-              <a:rPr lang="zh-CN" altLang="en-US" sz="2400">
-                <a:latin typeface="宋体" charset="0"/>
-                <a:ea typeface="宋体" charset="0"/>
-                <a:sym typeface="+mn-ea"/>
-              </a:rPr>
-              <a:t>实现了</a:t>
-            </a:r>
-            <a:r>
-              <a:rPr lang="zh-CN" altLang="en-US" sz="2400">
-                <a:latin typeface="宋体" charset="0"/>
-                <a:ea typeface="宋体" charset="0"/>
-                <a:sym typeface="+mn-ea"/>
-              </a:rPr>
-              <a:t>RemoteRef，是客户端对远程对象的句柄。提供了客户端远程句柄操作远程对象的具体实现。</a:t>
-            </a:r>
-            <a:endParaRPr lang="zh-CN" altLang="en-US" sz="2400">
-              <a:latin typeface="宋体" charset="0"/>
-              <a:ea typeface="宋体" charset="0"/>
-            </a:endParaRPr>
-          </a:p>
-          <a:p>
-            <a:r>
-              <a:rPr lang="en-US" altLang="zh-CN" sz="2400">
-                <a:latin typeface="宋体" charset="0"/>
-                <a:ea typeface="宋体" charset="0"/>
-              </a:rPr>
-              <a:t>LiveRef</a:t>
-            </a:r>
-            <a:r>
-              <a:rPr lang="zh-CN" altLang="en-US" sz="2400">
-                <a:latin typeface="宋体" charset="0"/>
-                <a:ea typeface="宋体" charset="0"/>
-              </a:rPr>
-              <a:t>：通信对象的包装类。</a:t>
-            </a:r>
-            <a:endParaRPr lang="zh-CN" altLang="en-US" sz="2400">
-              <a:latin typeface="宋体" charset="0"/>
-              <a:ea typeface="宋体" charset="0"/>
-            </a:endParaRPr>
-          </a:p>
-          <a:p>
-            <a:r>
-              <a:rPr lang="en-US" altLang="zh-CN" sz="2400">
-                <a:latin typeface="宋体" charset="0"/>
-                <a:ea typeface="宋体" charset="0"/>
-              </a:rPr>
-              <a:t>ObjID:</a:t>
-            </a:r>
-            <a:r>
-              <a:rPr lang="zh-CN" altLang="en-US" sz="2400">
-                <a:latin typeface="宋体" charset="0"/>
-                <a:ea typeface="宋体" charset="0"/>
-              </a:rPr>
-              <a:t>远程对象的唯一标识。</a:t>
-            </a:r>
-            <a:endParaRPr lang="zh-CN" altLang="en-US" sz="2400">
-              <a:latin typeface="宋体" charset="0"/>
-              <a:ea typeface="宋体" charset="0"/>
-            </a:endParaRPr>
-          </a:p>
-        </p:txBody>
-      </p:sp>
-    </p:spTree>
-  </p:cSld>
-  <p:clrMapOvr>
-    <a:masterClrMapping/>
-  </p:clrMapOvr>
-</p:sld>
-</file>
-
-<file path=ppt/slides/slide6.xml><?xml version="1.0" encoding="utf-8"?>
-<p:sld xmlns:a="http://schemas.openxmlformats.org/drawingml/2006/main" xmlns:r="http://schemas.openxmlformats.org/officeDocument/2006/relationships" xmlns:p="http://schemas.openxmlformats.org/presentationml/2006/main">
-  <p:cSld>
-    <p:spTree>
-      <p:nvGrpSpPr>
-        <p:cNvPr id="1" name=""/>
-        <p:cNvGrpSpPr/>
-        <p:nvPr/>
-      </p:nvGrpSpPr>
-      <p:grpSpPr/>
-      <p:sp>
-        <p:nvSpPr>
-          <p:cNvPr id="2" name="标题 1"/>
-          <p:cNvSpPr>
-            <a:spLocks noGrp="1"/>
-          </p:cNvSpPr>
-          <p:nvPr>
-            <p:ph type="title"/>
-          </p:nvPr>
-        </p:nvSpPr>
-        <p:spPr/>
-        <p:txBody>
-          <a:bodyPr/>
-          <a:p>
-            <a:r>
-              <a:rPr lang="en-US" altLang="zh-CN" sz="3600">
-                <a:latin typeface="宋体" charset="0"/>
-                <a:ea typeface="宋体" charset="0"/>
-              </a:rPr>
-              <a:t>RMI</a:t>
-            </a:r>
-            <a:r>
-              <a:rPr lang="zh-CN" altLang="en-US" sz="3600">
-                <a:latin typeface="宋体" charset="0"/>
-                <a:ea typeface="宋体" charset="0"/>
-              </a:rPr>
-              <a:t>数据结构之服务端</a:t>
-            </a:r>
-            <a:endParaRPr lang="zh-CN" altLang="en-US" sz="3600">
-              <a:latin typeface="宋体" charset="0"/>
-              <a:ea typeface="宋体" charset="0"/>
-            </a:endParaRPr>
-          </a:p>
-        </p:txBody>
-      </p:sp>
-      <p:sp>
-        <p:nvSpPr>
-          <p:cNvPr id="3" name="内容占位符 2"/>
-          <p:cNvSpPr>
-            <a:spLocks noGrp="1"/>
-          </p:cNvSpPr>
-          <p:nvPr>
-            <p:ph idx="1"/>
-          </p:nvPr>
-        </p:nvSpPr>
-        <p:spPr>
-          <a:xfrm>
-            <a:off x="838200" y="1905000"/>
-            <a:ext cx="7848600" cy="4105275"/>
-          </a:xfrm>
-        </p:spPr>
-        <p:txBody>
-          <a:bodyPr/>
-          <a:p>
-            <a:r>
-              <a:rPr lang="zh-CN" altLang="en-US" sz="2400">
-                <a:latin typeface="宋体" charset="0"/>
-                <a:ea typeface="宋体" charset="0"/>
-                <a:sym typeface="+mn-ea"/>
-              </a:rPr>
-              <a:t>ServerRef：继承了</a:t>
-            </a:r>
-            <a:r>
-              <a:rPr lang="zh-CN" altLang="en-US" sz="2400">
-                <a:latin typeface="宋体" charset="0"/>
-                <a:ea typeface="宋体" charset="0"/>
-                <a:sym typeface="+mn-ea"/>
-              </a:rPr>
-              <a:t>RemoteRef，是服务端对服务对象的句柄。提供了导出服务对象的定义。</a:t>
-            </a:r>
-            <a:endParaRPr lang="zh-CN" altLang="en-US" sz="2400">
-              <a:latin typeface="宋体" charset="0"/>
-              <a:ea typeface="宋体" charset="0"/>
-              <a:sym typeface="+mn-ea"/>
-            </a:endParaRPr>
-          </a:p>
-          <a:p>
-            <a:r>
-              <a:rPr lang="zh-CN" altLang="en-US" sz="2400">
-                <a:latin typeface="宋体" charset="0"/>
-                <a:ea typeface="宋体" charset="0"/>
-                <a:sym typeface="+mn-ea"/>
-              </a:rPr>
-              <a:t>RemoteServer：继承</a:t>
-            </a:r>
-            <a:r>
-              <a:rPr lang="en-US" altLang="zh-CN" sz="2400">
-                <a:latin typeface="宋体" charset="0"/>
-                <a:ea typeface="宋体" charset="0"/>
-                <a:sym typeface="+mn-ea"/>
-              </a:rPr>
-              <a:t>RemoteObject</a:t>
-            </a:r>
-            <a:r>
-              <a:rPr lang="zh-CN" altLang="en-US" sz="2400">
-                <a:latin typeface="宋体" charset="0"/>
-                <a:ea typeface="宋体" charset="0"/>
-                <a:sym typeface="+mn-ea"/>
-              </a:rPr>
-              <a:t>，提供对远程引用语义的支持。</a:t>
-            </a:r>
-            <a:endParaRPr lang="zh-CN" altLang="en-US" sz="2400">
-              <a:latin typeface="宋体" charset="0"/>
-              <a:ea typeface="宋体" charset="0"/>
-              <a:sym typeface="+mn-ea"/>
-            </a:endParaRPr>
-          </a:p>
-          <a:p>
-            <a:r>
-              <a:rPr lang="zh-CN" altLang="en-US" sz="2400">
-                <a:latin typeface="宋体" charset="0"/>
-                <a:ea typeface="宋体" charset="0"/>
-              </a:rPr>
-              <a:t>UnicastRemoteObject：继承</a:t>
-            </a:r>
-            <a:r>
-              <a:rPr lang="en-US" altLang="zh-CN" sz="2400">
-                <a:latin typeface="宋体" charset="0"/>
-                <a:ea typeface="宋体" charset="0"/>
-                <a:sym typeface="+mn-ea"/>
-              </a:rPr>
-              <a:t>RemoteObject</a:t>
-            </a:r>
-            <a:r>
-              <a:rPr lang="zh-CN" altLang="en-US" sz="2400">
-                <a:latin typeface="宋体" charset="0"/>
-                <a:ea typeface="宋体" charset="0"/>
-                <a:sym typeface="+mn-ea"/>
-              </a:rPr>
-              <a:t>，用于导出服务对象服务。</a:t>
-            </a:r>
-            <a:endParaRPr lang="zh-CN" altLang="en-US" sz="2400">
-              <a:latin typeface="宋体" charset="0"/>
-              <a:ea typeface="宋体" charset="0"/>
-              <a:sym typeface="+mn-ea"/>
-            </a:endParaRPr>
-          </a:p>
-          <a:p>
-            <a:r>
-              <a:rPr lang="zh-CN" altLang="en-US" sz="2400">
-                <a:latin typeface="宋体" charset="0"/>
-                <a:ea typeface="宋体" charset="0"/>
-              </a:rPr>
-              <a:t>UnicastServerRef，实现了</a:t>
-            </a:r>
-            <a:r>
-              <a:rPr lang="zh-CN" altLang="en-US" sz="2400">
-                <a:latin typeface="宋体" charset="0"/>
-                <a:ea typeface="宋体" charset="0"/>
-                <a:sym typeface="+mn-ea"/>
-              </a:rPr>
-              <a:t>ServerRef，</a:t>
-            </a:r>
-            <a:r>
-              <a:rPr lang="zh-CN" altLang="en-US" sz="2400">
-                <a:latin typeface="宋体" charset="0"/>
-                <a:ea typeface="宋体" charset="0"/>
-                <a:sym typeface="+mn-ea"/>
-              </a:rPr>
-              <a:t>提供导出服务对象的实现，同时提供服务端句柄调用服务对象的实现。</a:t>
-            </a:r>
-            <a:endParaRPr lang="zh-CN" altLang="en-US" sz="2400">
-              <a:latin typeface="宋体" charset="0"/>
-              <a:ea typeface="宋体" charset="0"/>
-              <a:sym typeface="+mn-ea"/>
-            </a:endParaRPr>
-          </a:p>
-          <a:p>
-            <a:r>
-              <a:rPr lang="en-US" altLang="zh-CN" sz="2400">
-                <a:latin typeface="宋体" charset="0"/>
-                <a:ea typeface="宋体" charset="0"/>
-                <a:sym typeface="+mn-ea"/>
-              </a:rPr>
-              <a:t>Target</a:t>
-            </a:r>
-            <a:r>
-              <a:rPr lang="zh-CN" altLang="en-US" sz="2400">
-                <a:latin typeface="宋体" charset="0"/>
-                <a:ea typeface="宋体" charset="0"/>
-                <a:sym typeface="+mn-ea"/>
-              </a:rPr>
-              <a:t>：远程对象被包装成一个</a:t>
-            </a:r>
-            <a:r>
-              <a:rPr lang="en-US" altLang="zh-CN" sz="2400">
-                <a:latin typeface="宋体" charset="0"/>
-                <a:ea typeface="宋体" charset="0"/>
-                <a:sym typeface="+mn-ea"/>
-              </a:rPr>
-              <a:t>target</a:t>
-            </a:r>
-            <a:r>
-              <a:rPr lang="zh-CN" altLang="en-US" sz="2400">
-                <a:latin typeface="宋体" charset="0"/>
-                <a:ea typeface="宋体" charset="0"/>
-                <a:sym typeface="+mn-ea"/>
-              </a:rPr>
-              <a:t>，长期（有客户端引用）驻留在服务端的内存中。</a:t>
-            </a:r>
-            <a:endParaRPr lang="zh-CN" altLang="en-US" sz="2400">
-              <a:latin typeface="宋体" charset="0"/>
-              <a:ea typeface="宋体" charset="0"/>
-              <a:sym typeface="+mn-ea"/>
-            </a:endParaRPr>
-          </a:p>
-          <a:p>
-            <a:endParaRPr lang="zh-CN" altLang="en-US" sz="2400">
-              <a:latin typeface="宋体" charset="0"/>
-              <a:ea typeface="宋体" charset="0"/>
-              <a:sym typeface="+mn-ea"/>
-            </a:endParaRPr>
-          </a:p>
-        </p:txBody>
-      </p:sp>
-    </p:spTree>
-  </p:cSld>
-  <p:clrMapOvr>
-    <a:masterClrMapping/>
-  </p:clrMapOvr>
-</p:sld>
-</file>
-
-<file path=ppt/slides/slide7.xml><?xml version="1.0" encoding="utf-8"?>
-<p:sld xmlns:a="http://schemas.openxmlformats.org/drawingml/2006/main" xmlns:r="http://schemas.openxmlformats.org/officeDocument/2006/relationships" xmlns:p="http://schemas.openxmlformats.org/presentationml/2006/main">
-  <p:cSld>
-    <p:spTree>
-      <p:nvGrpSpPr>
-        <p:cNvPr id="1" name=""/>
-        <p:cNvGrpSpPr/>
-        <p:nvPr/>
-      </p:nvGrpSpPr>
-      <p:grpSpPr/>
-      <p:sp>
-        <p:nvSpPr>
-          <p:cNvPr id="2" name="标题 1"/>
-          <p:cNvSpPr>
-            <a:spLocks noGrp="1"/>
-          </p:cNvSpPr>
-          <p:nvPr>
-            <p:ph type="title"/>
-          </p:nvPr>
-        </p:nvSpPr>
-        <p:spPr/>
-        <p:txBody>
-          <a:bodyPr/>
-          <a:p>
-            <a:r>
-              <a:rPr lang="en-US" altLang="zh-CN" sz="3600">
-                <a:latin typeface="宋体" charset="0"/>
-                <a:ea typeface="宋体" charset="0"/>
-              </a:rPr>
-              <a:t>RMI</a:t>
-            </a:r>
-            <a:r>
-              <a:rPr lang="zh-CN" altLang="en-US" sz="3600">
-                <a:latin typeface="宋体" charset="0"/>
-                <a:ea typeface="宋体" charset="0"/>
-              </a:rPr>
-              <a:t>数据结构之服务端</a:t>
-            </a:r>
-            <a:endParaRPr lang="zh-CN" altLang="en-US" sz="3600">
-              <a:latin typeface="宋体" charset="0"/>
-              <a:ea typeface="宋体" charset="0"/>
-            </a:endParaRPr>
-          </a:p>
-        </p:txBody>
-      </p:sp>
-      <p:sp>
-        <p:nvSpPr>
-          <p:cNvPr id="3" name="内容占位符 2"/>
-          <p:cNvSpPr>
-            <a:spLocks noGrp="1"/>
-          </p:cNvSpPr>
-          <p:nvPr>
-            <p:ph idx="1"/>
-          </p:nvPr>
-        </p:nvSpPr>
-        <p:spPr>
-          <a:xfrm>
-            <a:off x="838200" y="1905000"/>
-            <a:ext cx="7848600" cy="4105275"/>
-          </a:xfrm>
-        </p:spPr>
-        <p:txBody>
-          <a:bodyPr/>
-          <a:p>
-            <a:r>
-              <a:rPr lang="zh-CN" altLang="en-US" sz="2400">
-                <a:latin typeface="宋体" charset="0"/>
-                <a:ea typeface="宋体" charset="0"/>
-                <a:sym typeface="+mn-ea"/>
-              </a:rPr>
-              <a:t>Registry：注册表接口，提供远程服务注册表的行为定义。</a:t>
-            </a:r>
-            <a:endParaRPr lang="zh-CN" altLang="en-US" sz="2400">
-              <a:latin typeface="宋体" charset="0"/>
-              <a:ea typeface="宋体" charset="0"/>
-              <a:sym typeface="+mn-ea"/>
-            </a:endParaRPr>
-          </a:p>
-          <a:p>
-            <a:r>
-              <a:rPr lang="zh-CN" altLang="en-US" sz="2400">
-                <a:latin typeface="宋体" charset="0"/>
-                <a:ea typeface="宋体" charset="0"/>
-                <a:sym typeface="+mn-ea"/>
-              </a:rPr>
-              <a:t>LocateRegistry：创建注册表。</a:t>
-            </a:r>
-            <a:endParaRPr lang="zh-CN" altLang="en-US" sz="2400">
-              <a:latin typeface="宋体" charset="0"/>
-              <a:ea typeface="宋体" charset="0"/>
-              <a:sym typeface="+mn-ea"/>
-            </a:endParaRPr>
-          </a:p>
-          <a:p>
-            <a:r>
-              <a:rPr lang="zh-CN" altLang="en-US" sz="2400">
-                <a:latin typeface="宋体" charset="0"/>
-                <a:ea typeface="宋体" charset="0"/>
-                <a:sym typeface="+mn-ea"/>
-              </a:rPr>
-              <a:t>RegistryImpl：实现了</a:t>
-            </a:r>
-            <a:r>
-              <a:rPr lang="zh-CN" altLang="en-US" sz="2400">
-                <a:latin typeface="宋体" charset="0"/>
-                <a:ea typeface="宋体" charset="0"/>
-                <a:sym typeface="+mn-ea"/>
-              </a:rPr>
-              <a:t>Registry，提供远程服务注册表的具体实现，并提供导出注册表服务的实现。</a:t>
-            </a:r>
-            <a:endParaRPr lang="zh-CN" altLang="en-US" sz="2400">
-              <a:latin typeface="宋体" charset="0"/>
-              <a:ea typeface="宋体" charset="0"/>
-              <a:sym typeface="+mn-ea"/>
-            </a:endParaRPr>
-          </a:p>
-          <a:p>
-            <a:endParaRPr lang="zh-CN" altLang="en-US" sz="2400">
-              <a:latin typeface="宋体" charset="0"/>
-              <a:ea typeface="宋体" charset="0"/>
-              <a:sym typeface="+mn-ea"/>
-            </a:endParaRPr>
-          </a:p>
-        </p:txBody>
-      </p:sp>
-    </p:spTree>
-  </p:cSld>
-  <p:clrMapOvr>
-    <a:masterClrMapping/>
-  </p:clrMapOvr>
-</p:sld>
-</file>
-
-<file path=ppt/slides/slide8.xml><?xml version="1.0" encoding="utf-8"?>
-<p:sld xmlns:a="http://schemas.openxmlformats.org/drawingml/2006/main" xmlns:r="http://schemas.openxmlformats.org/officeDocument/2006/relationships" xmlns:p="http://schemas.openxmlformats.org/presentationml/2006/main">
-  <p:cSld>
-    <p:spTree>
-      <p:nvGrpSpPr>
-        <p:cNvPr id="1" name=""/>
-        <p:cNvGrpSpPr/>
-        <p:nvPr/>
-      </p:nvGrpSpPr>
-      <p:grpSpPr/>
-      <p:sp>
-        <p:nvSpPr>
-          <p:cNvPr id="2" name="标题 1"/>
-          <p:cNvSpPr>
-            <a:spLocks noGrp="1"/>
-          </p:cNvSpPr>
-          <p:nvPr>
-            <p:ph type="title"/>
-          </p:nvPr>
-        </p:nvSpPr>
-        <p:spPr/>
-        <p:txBody>
-          <a:bodyPr/>
-          <a:p>
-            <a:r>
-              <a:rPr lang="en-US" altLang="zh-CN" sz="3600">
-                <a:latin typeface="宋体" charset="0"/>
-                <a:ea typeface="宋体" charset="0"/>
-              </a:rPr>
-              <a:t>RMI</a:t>
-            </a:r>
-            <a:r>
-              <a:rPr lang="zh-CN" altLang="en-US" sz="3600">
-                <a:latin typeface="宋体" charset="0"/>
-                <a:ea typeface="宋体" charset="0"/>
-              </a:rPr>
-              <a:t>数据结构之通信</a:t>
-            </a:r>
-            <a:endParaRPr lang="zh-CN" altLang="en-US" sz="3600">
-              <a:latin typeface="宋体" charset="0"/>
-              <a:ea typeface="宋体" charset="0"/>
-            </a:endParaRPr>
-          </a:p>
-        </p:txBody>
-      </p:sp>
-      <p:sp>
-        <p:nvSpPr>
-          <p:cNvPr id="3" name="内容占位符 2"/>
-          <p:cNvSpPr>
-            <a:spLocks noGrp="1"/>
-          </p:cNvSpPr>
-          <p:nvPr>
-            <p:ph idx="1"/>
-          </p:nvPr>
-        </p:nvSpPr>
-        <p:spPr>
-          <a:xfrm>
-            <a:off x="838200" y="1905000"/>
-            <a:ext cx="7848600" cy="4105275"/>
-          </a:xfrm>
-        </p:spPr>
-        <p:txBody>
-          <a:bodyPr/>
-          <a:p>
-            <a:r>
-              <a:rPr lang="zh-CN" altLang="en-US" sz="2400">
-                <a:latin typeface="宋体" charset="0"/>
-                <a:ea typeface="宋体" charset="0"/>
-                <a:sym typeface="+mn-ea"/>
-              </a:rPr>
-              <a:t>Endpoint：抽象终端（地址、端口、服务器</a:t>
-            </a:r>
-            <a:r>
-              <a:rPr lang="en-US" altLang="zh-CN" sz="2400">
-                <a:latin typeface="宋体" charset="0"/>
-                <a:ea typeface="宋体" charset="0"/>
-                <a:sym typeface="+mn-ea"/>
-              </a:rPr>
-              <a:t>socket</a:t>
-            </a:r>
-            <a:r>
-              <a:rPr lang="zh-CN" altLang="en-US" sz="2400">
-                <a:latin typeface="宋体" charset="0"/>
-                <a:ea typeface="宋体" charset="0"/>
-                <a:sym typeface="+mn-ea"/>
-              </a:rPr>
-              <a:t>工厂、客户端</a:t>
-            </a:r>
-            <a:r>
-              <a:rPr lang="en-US" altLang="zh-CN" sz="2400">
-                <a:latin typeface="宋体" charset="0"/>
-                <a:ea typeface="宋体" charset="0"/>
-                <a:sym typeface="+mn-ea"/>
-              </a:rPr>
-              <a:t>socket</a:t>
-            </a:r>
-            <a:r>
-              <a:rPr lang="zh-CN" altLang="en-US" sz="2400">
-                <a:latin typeface="宋体" charset="0"/>
-                <a:ea typeface="宋体" charset="0"/>
-                <a:sym typeface="+mn-ea"/>
-              </a:rPr>
-              <a:t>工厂</a:t>
-            </a:r>
-            <a:r>
-              <a:rPr lang="zh-CN" altLang="en-US" sz="2400">
-                <a:latin typeface="宋体" charset="0"/>
-                <a:ea typeface="宋体" charset="0"/>
-                <a:sym typeface="+mn-ea"/>
-              </a:rPr>
-              <a:t>）。</a:t>
-            </a:r>
-            <a:endParaRPr lang="zh-CN" altLang="en-US" sz="2400">
-              <a:latin typeface="宋体" charset="0"/>
-              <a:ea typeface="宋体" charset="0"/>
-              <a:sym typeface="+mn-ea"/>
-            </a:endParaRPr>
-          </a:p>
-          <a:p>
-            <a:r>
-              <a:rPr lang="zh-CN" altLang="en-US" sz="2400">
-                <a:latin typeface="宋体" charset="0"/>
-                <a:ea typeface="宋体" charset="0"/>
-                <a:sym typeface="+mn-ea"/>
-              </a:rPr>
-              <a:t>Transport：管理终端之间的通信。</a:t>
-            </a:r>
-            <a:endParaRPr lang="zh-CN" altLang="en-US" sz="2400">
-              <a:latin typeface="宋体" charset="0"/>
-              <a:ea typeface="宋体" charset="0"/>
-              <a:sym typeface="+mn-ea"/>
-            </a:endParaRPr>
-          </a:p>
-          <a:p>
-            <a:r>
-              <a:rPr lang="zh-CN" altLang="en-US" sz="2400">
-                <a:latin typeface="宋体" charset="0"/>
-                <a:ea typeface="宋体" charset="0"/>
-                <a:sym typeface="+mn-ea"/>
-              </a:rPr>
-              <a:t>Channel：两终端之间的通信管道。</a:t>
-            </a:r>
-            <a:endParaRPr lang="zh-CN" altLang="en-US" sz="2400">
-              <a:latin typeface="宋体" charset="0"/>
-              <a:ea typeface="宋体" charset="0"/>
-              <a:sym typeface="+mn-ea"/>
-            </a:endParaRPr>
-          </a:p>
-          <a:p>
-            <a:r>
-              <a:rPr lang="zh-CN" altLang="en-US" sz="2400">
-                <a:latin typeface="宋体" charset="0"/>
-                <a:ea typeface="宋体" charset="0"/>
-                <a:sym typeface="+mn-ea"/>
-              </a:rPr>
-              <a:t>Connection：两终端之间的连接。</a:t>
-            </a:r>
-            <a:endParaRPr lang="zh-CN" altLang="en-US" sz="2400">
-              <a:latin typeface="宋体" charset="0"/>
-              <a:ea typeface="宋体" charset="0"/>
-              <a:sym typeface="+mn-ea"/>
-            </a:endParaRPr>
-          </a:p>
-          <a:p>
-            <a:endParaRPr lang="zh-CN" altLang="en-US" sz="2400">
-              <a:latin typeface="宋体" charset="0"/>
-              <a:ea typeface="宋体" charset="0"/>
-              <a:sym typeface="+mn-ea"/>
-            </a:endParaRPr>
-          </a:p>
-        </p:txBody>
-      </p:sp>
-    </p:spTree>
-  </p:cSld>
-  <p:clrMapOvr>
-    <a:masterClrMapping/>
-  </p:clrMapOvr>
-</p:sld>
-</file>
-
-<file path=ppt/slides/slide9.xml><?xml version="1.0" encoding="utf-8"?>
-<p:sld xmlns:a="http://schemas.openxmlformats.org/drawingml/2006/main" xmlns:r="http://schemas.openxmlformats.org/officeDocument/2006/relationships" xmlns:p="http://schemas.openxmlformats.org/presentationml/2006/main">
-  <p:cSld>
-    <p:bg>
-      <p:bgPr>
-        <a:blipFill dpi="0" rotWithShape="0">
-          <a:blip r:embed="rId1"/>
-          <a:srcRect/>
-          <a:stretch>
-            <a:fillRect/>
-          </a:stretch>
-        </a:blipFill>
-        <a:effectLst/>
-      </p:bgPr>
-    </p:bg>
     <p:spTree>
       <p:nvGrpSpPr>
         <p:cNvPr id="1" name=""/>
@@ -4602,9 +4623,9 @@
       </p:grpSpPr>
       <p:sp>
         <p:nvSpPr>
-          <p:cNvPr id="16386" name="Rectangle 2"/>
-          <p:cNvSpPr>
-            <a:spLocks noGrp="1" noChangeArrowheads="1"/>
+          <p:cNvPr id="2" name="标题 1"/>
+          <p:cNvSpPr>
+            <a:spLocks noGrp="1"/>
           </p:cNvSpPr>
           <p:nvPr>
             <p:ph type="title"/>
@@ -4616,25 +4637,262 @@
           <a:lstStyle/>
           <a:p>
             <a:r>
-              <a:rPr lang="en-US" altLang="zh-CN" smtClean="0">
-                <a:ea typeface="宋体" charset="-122"/>
-              </a:rPr>
-              <a:t>Q&amp;A</a:t>
-            </a:r>
-            <a:endParaRPr lang="en-US" altLang="zh-CN" smtClean="0">
-              <a:ea typeface="宋体" charset="-122"/>
+              <a:rPr lang="en-US" altLang="zh-CN" sz="3600">
+                <a:latin typeface="宋体" charset="0"/>
+                <a:ea typeface="宋体" charset="0"/>
+              </a:rPr>
+              <a:t>RMI</a:t>
+            </a:r>
+            <a:r>
+              <a:rPr lang="zh-CN" altLang="en-US" sz="3600">
+                <a:latin typeface="宋体" charset="0"/>
+                <a:ea typeface="宋体" charset="0"/>
+              </a:rPr>
+              <a:t>的知识点</a:t>
+            </a:r>
+          </a:p>
+        </p:txBody>
+      </p:sp>
+      <p:sp>
+        <p:nvSpPr>
+          <p:cNvPr id="3" name="内容占位符 2"/>
+          <p:cNvSpPr>
+            <a:spLocks noGrp="1"/>
+          </p:cNvSpPr>
+          <p:nvPr>
+            <p:ph idx="1"/>
+          </p:nvPr>
+        </p:nvSpPr>
+        <p:spPr/>
+        <p:txBody>
+          <a:bodyPr/>
+          <a:lstStyle/>
+          <a:p>
+            <a:r>
+              <a:rPr lang="zh-CN" altLang="en-US" sz="2400">
+                <a:latin typeface="宋体" charset="0"/>
+                <a:ea typeface="宋体" charset="0"/>
+              </a:rPr>
+              <a:t>数据结构</a:t>
+            </a:r>
+          </a:p>
+          <a:p>
+            <a:r>
+              <a:rPr lang="zh-CN" altLang="en-US" sz="2400">
+                <a:latin typeface="宋体" charset="0"/>
+                <a:ea typeface="宋体" charset="0"/>
+              </a:rPr>
+              <a:t>通信协议及线程模型</a:t>
+            </a:r>
+          </a:p>
+          <a:p>
+            <a:r>
+              <a:rPr lang="zh-CN" altLang="en-US" sz="2400">
+                <a:latin typeface="宋体" charset="0"/>
+                <a:ea typeface="宋体" charset="0"/>
+              </a:rPr>
+              <a:t>分布式垃圾回收</a:t>
+            </a:r>
+          </a:p>
+          <a:p>
+            <a:r>
+              <a:rPr lang="zh-CN" altLang="en-US" sz="2400">
+                <a:latin typeface="宋体" charset="0"/>
+                <a:ea typeface="宋体" charset="0"/>
+              </a:rPr>
+              <a:t>安全模型</a:t>
+            </a:r>
+          </a:p>
+        </p:txBody>
+      </p:sp>
+    </p:spTree>
+  </p:cSld>
+  <p:clrMapOvr>
+    <a:masterClrMapping/>
+  </p:clrMapOvr>
+  <p:timing>
+    <p:tnLst>
+      <p:par>
+        <p:cTn id="1" dur="indefinite" restart="never" nodeType="tmRoot"/>
+      </p:par>
+    </p:tnLst>
+  </p:timing>
+</p:sld>
+</file>
+
+<file path=ppt/slides/slide4.xml><?xml version="1.0" encoding="utf-8"?>
+<p:sld xmlns:a="http://schemas.openxmlformats.org/drawingml/2006/main" xmlns:r="http://schemas.openxmlformats.org/officeDocument/2006/relationships" xmlns:p="http://schemas.openxmlformats.org/presentationml/2006/main">
+  <p:cSld>
+    <p:spTree>
+      <p:nvGrpSpPr>
+        <p:cNvPr id="1" name=""/>
+        <p:cNvGrpSpPr/>
+        <p:nvPr/>
+      </p:nvGrpSpPr>
+      <p:grpSpPr>
+        <a:xfrm>
+          <a:off x="0" y="0"/>
+          <a:ext cx="0" cy="0"/>
+          <a:chOff x="0" y="0"/>
+          <a:chExt cx="0" cy="0"/>
+        </a:xfrm>
+      </p:grpSpPr>
+      <p:sp>
+        <p:nvSpPr>
+          <p:cNvPr id="2" name="标题 1"/>
+          <p:cNvSpPr>
+            <a:spLocks noGrp="1"/>
+          </p:cNvSpPr>
+          <p:nvPr>
+            <p:ph type="title"/>
+          </p:nvPr>
+        </p:nvSpPr>
+        <p:spPr/>
+        <p:txBody>
+          <a:bodyPr/>
+          <a:lstStyle/>
+          <a:p>
+            <a:r>
+              <a:rPr lang="en-US" altLang="zh-CN" sz="3600">
+                <a:latin typeface="宋体" charset="0"/>
+                <a:ea typeface="宋体" charset="0"/>
+              </a:rPr>
+              <a:t>RMI</a:t>
+            </a:r>
+            <a:r>
+              <a:rPr lang="zh-CN" altLang="en-US" sz="3600">
+                <a:latin typeface="宋体" charset="0"/>
+                <a:ea typeface="宋体" charset="0"/>
+              </a:rPr>
+              <a:t>数据结构之抽象</a:t>
+            </a:r>
+          </a:p>
+        </p:txBody>
+      </p:sp>
+      <p:sp>
+        <p:nvSpPr>
+          <p:cNvPr id="3" name="内容占位符 2"/>
+          <p:cNvSpPr>
+            <a:spLocks noGrp="1"/>
+          </p:cNvSpPr>
+          <p:nvPr>
+            <p:ph idx="1"/>
+          </p:nvPr>
+        </p:nvSpPr>
+        <p:spPr/>
+        <p:txBody>
+          <a:bodyPr/>
+          <a:lstStyle/>
+          <a:p>
+            <a:r>
+              <a:rPr lang="zh-CN" altLang="en-US" sz="2400" dirty="0">
+                <a:latin typeface="宋体" charset="0"/>
+                <a:ea typeface="宋体" charset="0"/>
+              </a:rPr>
+              <a:t>RemoteObject：继承</a:t>
+            </a:r>
+            <a:r>
+              <a:rPr lang="en-US" altLang="zh-CN" sz="2400" dirty="0">
+                <a:latin typeface="宋体" charset="0"/>
+                <a:ea typeface="宋体" charset="0"/>
+              </a:rPr>
+              <a:t>Object</a:t>
+            </a:r>
+            <a:r>
+              <a:rPr lang="zh-CN" altLang="en-US" sz="2400" dirty="0">
+                <a:latin typeface="宋体" charset="0"/>
+                <a:ea typeface="宋体" charset="0"/>
+              </a:rPr>
+              <a:t>，提供了远程对象有关于</a:t>
+            </a:r>
+            <a:r>
+              <a:rPr lang="en-US" altLang="zh-CN" sz="2400" dirty="0">
+                <a:latin typeface="宋体" charset="0"/>
+                <a:ea typeface="宋体" charset="0"/>
+              </a:rPr>
+              <a:t>Object</a:t>
+            </a:r>
+            <a:r>
+              <a:rPr lang="zh-CN" altLang="en-US" sz="2400" dirty="0">
+                <a:latin typeface="宋体" charset="0"/>
+                <a:ea typeface="宋体" charset="0"/>
+              </a:rPr>
+              <a:t>对象行为的远程实现</a:t>
+            </a:r>
+            <a:r>
+              <a:rPr lang="zh-CN" altLang="en-US" sz="2400" dirty="0" smtClean="0">
+                <a:latin typeface="宋体" charset="0"/>
+                <a:ea typeface="宋体" charset="0"/>
+              </a:rPr>
+              <a:t>。并提供可继承属性RemoteRef。</a:t>
+            </a:r>
+            <a:endParaRPr lang="zh-CN" altLang="en-US" sz="2400" dirty="0">
+              <a:latin typeface="宋体" charset="0"/>
+              <a:ea typeface="宋体" charset="0"/>
             </a:endParaRPr>
           </a:p>
-        </p:txBody>
-      </p:sp>
-      <p:sp>
-        <p:nvSpPr>
-          <p:cNvPr id="16387" name="Rectangle 3"/>
-          <p:cNvSpPr>
-            <a:spLocks noGrp="1" noChangeArrowheads="1"/>
-          </p:cNvSpPr>
-          <p:nvPr>
-            <p:ph type="body" idx="1"/>
+          <a:p>
+            <a:r>
+              <a:rPr lang="zh-CN" altLang="en-US" sz="2400" dirty="0">
+                <a:latin typeface="宋体" charset="0"/>
+                <a:ea typeface="宋体" charset="0"/>
+              </a:rPr>
+              <a:t>RemoteRef：远程句柄，提供了操作远程对象的定义。</a:t>
+            </a:r>
+            <a:endParaRPr lang="zh-CN" altLang="en-US" sz="2400" dirty="0">
+              <a:latin typeface="宋体" charset="0"/>
+              <a:ea typeface="宋体" charset="0"/>
+              <a:sym typeface="+mn-ea"/>
+            </a:endParaRPr>
+          </a:p>
+          <a:p>
+            <a:endParaRPr lang="zh-CN" altLang="en-US" sz="2400" dirty="0">
+              <a:latin typeface="宋体" charset="0"/>
+              <a:ea typeface="宋体" charset="0"/>
+            </a:endParaRPr>
+          </a:p>
+        </p:txBody>
+      </p:sp>
+    </p:spTree>
+  </p:cSld>
+  <p:clrMapOvr>
+    <a:masterClrMapping/>
+  </p:clrMapOvr>
+  <p:timing>
+    <p:tnLst>
+      <p:par>
+        <p:cTn id="1" dur="indefinite" restart="never" nodeType="tmRoot"/>
+      </p:par>
+    </p:tnLst>
+  </p:timing>
+</p:sld>
+</file>
+
+<file path=ppt/slides/slide5.xml><?xml version="1.0" encoding="utf-8"?>
+<p:sld xmlns:a="http://schemas.openxmlformats.org/drawingml/2006/main" xmlns:r="http://schemas.openxmlformats.org/officeDocument/2006/relationships" xmlns:p="http://schemas.openxmlformats.org/presentationml/2006/main">
+  <p:cSld>
+    <p:spTree>
+      <p:nvGrpSpPr>
+        <p:cNvPr id="1" name=""/>
+        <p:cNvGrpSpPr/>
+        <p:nvPr/>
+      </p:nvGrpSpPr>
+      <p:grpSpPr>
+        <a:xfrm>
+          <a:off x="0" y="0"/>
+          <a:ext cx="0" cy="0"/>
+          <a:chOff x="0" y="0"/>
+          <a:chExt cx="0" cy="0"/>
+        </a:xfrm>
+      </p:grpSpPr>
+      <p:sp>
+        <p:nvSpPr>
+          <p:cNvPr id="2" name="标题 1"/>
+          <p:cNvSpPr>
+            <a:spLocks noGrp="1"/>
+          </p:cNvSpPr>
+          <p:nvPr>
+            <p:ph type="title"/>
           </p:nvPr>
         </p:nvSpPr>
         <p:spPr/>
@@ -4642,8 +4900,761 @@
           <a:bodyPr/>
           <a:lstStyle/>
           <a:p>
-            <a:endParaRPr lang="en-US" altLang="zh-CN" smtClean="0">
-              <a:ea typeface="宋体" charset="-122"/>
+            <a:r>
+              <a:rPr lang="en-US" altLang="zh-CN" sz="3600">
+                <a:latin typeface="宋体" charset="0"/>
+                <a:ea typeface="宋体" charset="0"/>
+              </a:rPr>
+              <a:t>RMI</a:t>
+            </a:r>
+            <a:r>
+              <a:rPr lang="zh-CN" altLang="en-US" sz="3600">
+                <a:latin typeface="宋体" charset="0"/>
+                <a:ea typeface="宋体" charset="0"/>
+              </a:rPr>
+              <a:t>数据结构之客户端</a:t>
+            </a:r>
+          </a:p>
+        </p:txBody>
+      </p:sp>
+      <p:sp>
+        <p:nvSpPr>
+          <p:cNvPr id="3" name="内容占位符 2"/>
+          <p:cNvSpPr>
+            <a:spLocks noGrp="1"/>
+          </p:cNvSpPr>
+          <p:nvPr>
+            <p:ph idx="1"/>
+          </p:nvPr>
+        </p:nvSpPr>
+        <p:spPr/>
+        <p:txBody>
+          <a:bodyPr/>
+          <a:lstStyle/>
+          <a:p>
+            <a:r>
+              <a:rPr lang="en-US" altLang="zh-CN" sz="2400">
+                <a:latin typeface="宋体" charset="0"/>
+                <a:ea typeface="宋体" charset="0"/>
+              </a:rPr>
+              <a:t>Proxy</a:t>
+            </a:r>
+            <a:r>
+              <a:rPr lang="zh-CN" altLang="en-US" sz="2400">
+                <a:latin typeface="宋体" charset="0"/>
+                <a:ea typeface="宋体" charset="0"/>
+              </a:rPr>
+              <a:t>：一个实现了远程服务接口的动态代理。</a:t>
+            </a:r>
+          </a:p>
+          <a:p>
+            <a:r>
+              <a:rPr lang="zh-CN" altLang="en-US" sz="2400">
+                <a:latin typeface="宋体" charset="0"/>
+                <a:ea typeface="宋体" charset="0"/>
+              </a:rPr>
+              <a:t>RemoteObjectInvocationHandler：实现了InvocationHandler，动态代理的</a:t>
+            </a:r>
+            <a:r>
+              <a:rPr lang="en-US" altLang="zh-CN" sz="2400">
+                <a:latin typeface="宋体" charset="0"/>
+                <a:ea typeface="宋体" charset="0"/>
+              </a:rPr>
+              <a:t>Handler</a:t>
+            </a:r>
+            <a:r>
+              <a:rPr lang="zh-CN" altLang="en-US" sz="2400">
+                <a:latin typeface="宋体" charset="0"/>
+                <a:ea typeface="宋体" charset="0"/>
+              </a:rPr>
+              <a:t>类。</a:t>
+            </a:r>
+          </a:p>
+          <a:p>
+            <a:r>
+              <a:rPr lang="en-US" altLang="zh-CN" sz="2400">
+                <a:latin typeface="宋体" charset="0"/>
+                <a:ea typeface="宋体" charset="0"/>
+              </a:rPr>
+              <a:t>UnicastRef:</a:t>
+            </a:r>
+            <a:r>
+              <a:rPr lang="zh-CN" altLang="en-US" sz="2400">
+                <a:latin typeface="宋体" charset="0"/>
+                <a:ea typeface="宋体" charset="0"/>
+                <a:sym typeface="+mn-ea"/>
+              </a:rPr>
+              <a:t>实现了RemoteRef，是客户端对远程对象的句柄。提供了客户端远程句柄操作远程对象的具体实现。</a:t>
+            </a:r>
+            <a:endParaRPr lang="zh-CN" altLang="en-US" sz="2400">
+              <a:latin typeface="宋体" charset="0"/>
+              <a:ea typeface="宋体" charset="0"/>
+            </a:endParaRPr>
+          </a:p>
+          <a:p>
+            <a:r>
+              <a:rPr lang="en-US" altLang="zh-CN" sz="2400">
+                <a:latin typeface="宋体" charset="0"/>
+                <a:ea typeface="宋体" charset="0"/>
+              </a:rPr>
+              <a:t>LiveRef</a:t>
+            </a:r>
+            <a:r>
+              <a:rPr lang="zh-CN" altLang="en-US" sz="2400">
+                <a:latin typeface="宋体" charset="0"/>
+                <a:ea typeface="宋体" charset="0"/>
+              </a:rPr>
+              <a:t>：通信对象的包装类。</a:t>
+            </a:r>
+          </a:p>
+          <a:p>
+            <a:r>
+              <a:rPr lang="en-US" altLang="zh-CN" sz="2400">
+                <a:latin typeface="宋体" charset="0"/>
+                <a:ea typeface="宋体" charset="0"/>
+              </a:rPr>
+              <a:t>ObjID:</a:t>
+            </a:r>
+            <a:r>
+              <a:rPr lang="zh-CN" altLang="en-US" sz="2400">
+                <a:latin typeface="宋体" charset="0"/>
+                <a:ea typeface="宋体" charset="0"/>
+              </a:rPr>
+              <a:t>远程对象的唯一标识。</a:t>
+            </a:r>
+          </a:p>
+        </p:txBody>
+      </p:sp>
+    </p:spTree>
+  </p:cSld>
+  <p:clrMapOvr>
+    <a:masterClrMapping/>
+  </p:clrMapOvr>
+  <p:timing>
+    <p:tnLst>
+      <p:par>
+        <p:cTn id="1" dur="indefinite" restart="never" nodeType="tmRoot"/>
+      </p:par>
+    </p:tnLst>
+  </p:timing>
+</p:sld>
+</file>
+
+<file path=ppt/slides/slide6.xml><?xml version="1.0" encoding="utf-8"?>
+<p:sld xmlns:a="http://schemas.openxmlformats.org/drawingml/2006/main" xmlns:r="http://schemas.openxmlformats.org/officeDocument/2006/relationships" xmlns:p="http://schemas.openxmlformats.org/presentationml/2006/main">
+  <p:cSld>
+    <p:spTree>
+      <p:nvGrpSpPr>
+        <p:cNvPr id="1" name=""/>
+        <p:cNvGrpSpPr/>
+        <p:nvPr/>
+      </p:nvGrpSpPr>
+      <p:grpSpPr>
+        <a:xfrm>
+          <a:off x="0" y="0"/>
+          <a:ext cx="0" cy="0"/>
+          <a:chOff x="0" y="0"/>
+          <a:chExt cx="0" cy="0"/>
+        </a:xfrm>
+      </p:grpSpPr>
+      <p:sp>
+        <p:nvSpPr>
+          <p:cNvPr id="2" name="标题 1"/>
+          <p:cNvSpPr>
+            <a:spLocks noGrp="1"/>
+          </p:cNvSpPr>
+          <p:nvPr>
+            <p:ph type="title"/>
+          </p:nvPr>
+        </p:nvSpPr>
+        <p:spPr/>
+        <p:txBody>
+          <a:bodyPr/>
+          <a:lstStyle/>
+          <a:p>
+            <a:r>
+              <a:rPr lang="en-US" altLang="zh-CN" sz="3600">
+                <a:latin typeface="宋体" charset="0"/>
+                <a:ea typeface="宋体" charset="0"/>
+              </a:rPr>
+              <a:t>RMI</a:t>
+            </a:r>
+            <a:r>
+              <a:rPr lang="zh-CN" altLang="en-US" sz="3600">
+                <a:latin typeface="宋体" charset="0"/>
+                <a:ea typeface="宋体" charset="0"/>
+              </a:rPr>
+              <a:t>数据结构之服务端</a:t>
+            </a:r>
+          </a:p>
+        </p:txBody>
+      </p:sp>
+      <p:sp>
+        <p:nvSpPr>
+          <p:cNvPr id="3" name="内容占位符 2"/>
+          <p:cNvSpPr>
+            <a:spLocks noGrp="1"/>
+          </p:cNvSpPr>
+          <p:nvPr>
+            <p:ph idx="1"/>
+          </p:nvPr>
+        </p:nvSpPr>
+        <p:spPr>
+          <a:xfrm>
+            <a:off x="838200" y="1905000"/>
+            <a:ext cx="7848600" cy="4105275"/>
+          </a:xfrm>
+        </p:spPr>
+        <p:txBody>
+          <a:bodyPr/>
+          <a:lstStyle/>
+          <a:p>
+            <a:r>
+              <a:rPr lang="zh-CN" altLang="en-US" sz="2400">
+                <a:latin typeface="宋体" charset="0"/>
+                <a:ea typeface="宋体" charset="0"/>
+                <a:sym typeface="+mn-ea"/>
+              </a:rPr>
+              <a:t>ServerRef：继承了RemoteRef，是服务端对服务对象的句柄。提供了导出服务对象的定义。</a:t>
+            </a:r>
+          </a:p>
+          <a:p>
+            <a:r>
+              <a:rPr lang="zh-CN" altLang="en-US" sz="2400">
+                <a:latin typeface="宋体" charset="0"/>
+                <a:ea typeface="宋体" charset="0"/>
+                <a:sym typeface="+mn-ea"/>
+              </a:rPr>
+              <a:t>RemoteServer：继承</a:t>
+            </a:r>
+            <a:r>
+              <a:rPr lang="en-US" altLang="zh-CN" sz="2400">
+                <a:latin typeface="宋体" charset="0"/>
+                <a:ea typeface="宋体" charset="0"/>
+                <a:sym typeface="+mn-ea"/>
+              </a:rPr>
+              <a:t>RemoteObject</a:t>
+            </a:r>
+            <a:r>
+              <a:rPr lang="zh-CN" altLang="en-US" sz="2400">
+                <a:latin typeface="宋体" charset="0"/>
+                <a:ea typeface="宋体" charset="0"/>
+                <a:sym typeface="+mn-ea"/>
+              </a:rPr>
+              <a:t>，提供对远程引用语义的支持。</a:t>
+            </a:r>
+          </a:p>
+          <a:p>
+            <a:r>
+              <a:rPr lang="zh-CN" altLang="en-US" sz="2400">
+                <a:latin typeface="宋体" charset="0"/>
+                <a:ea typeface="宋体" charset="0"/>
+              </a:rPr>
+              <a:t>UnicastRemoteObject：继承</a:t>
+            </a:r>
+            <a:r>
+              <a:rPr lang="en-US" altLang="zh-CN" sz="2400">
+                <a:latin typeface="宋体" charset="0"/>
+                <a:ea typeface="宋体" charset="0"/>
+                <a:sym typeface="+mn-ea"/>
+              </a:rPr>
+              <a:t>RemoteObject</a:t>
+            </a:r>
+            <a:r>
+              <a:rPr lang="zh-CN" altLang="en-US" sz="2400">
+                <a:latin typeface="宋体" charset="0"/>
+                <a:ea typeface="宋体" charset="0"/>
+                <a:sym typeface="+mn-ea"/>
+              </a:rPr>
+              <a:t>，用于导出服务对象服务。</a:t>
+            </a:r>
+          </a:p>
+          <a:p>
+            <a:r>
+              <a:rPr lang="zh-CN" altLang="en-US" sz="2400">
+                <a:latin typeface="宋体" charset="0"/>
+                <a:ea typeface="宋体" charset="0"/>
+              </a:rPr>
+              <a:t>UnicastServerRef，实现了</a:t>
+            </a:r>
+            <a:r>
+              <a:rPr lang="zh-CN" altLang="en-US" sz="2400">
+                <a:latin typeface="宋体" charset="0"/>
+                <a:ea typeface="宋体" charset="0"/>
+                <a:sym typeface="+mn-ea"/>
+              </a:rPr>
+              <a:t>ServerRef，提供导出服务对象的实现，同时提供服务端句柄调用服务对象的实现。</a:t>
+            </a:r>
+          </a:p>
+          <a:p>
+            <a:r>
+              <a:rPr lang="en-US" altLang="zh-CN" sz="2400">
+                <a:latin typeface="宋体" charset="0"/>
+                <a:ea typeface="宋体" charset="0"/>
+                <a:sym typeface="+mn-ea"/>
+              </a:rPr>
+              <a:t>Target</a:t>
+            </a:r>
+            <a:r>
+              <a:rPr lang="zh-CN" altLang="en-US" sz="2400">
+                <a:latin typeface="宋体" charset="0"/>
+                <a:ea typeface="宋体" charset="0"/>
+                <a:sym typeface="+mn-ea"/>
+              </a:rPr>
+              <a:t>：远程对象被包装成一个</a:t>
+            </a:r>
+            <a:r>
+              <a:rPr lang="en-US" altLang="zh-CN" sz="2400">
+                <a:latin typeface="宋体" charset="0"/>
+                <a:ea typeface="宋体" charset="0"/>
+                <a:sym typeface="+mn-ea"/>
+              </a:rPr>
+              <a:t>target</a:t>
+            </a:r>
+            <a:r>
+              <a:rPr lang="zh-CN" altLang="en-US" sz="2400">
+                <a:latin typeface="宋体" charset="0"/>
+                <a:ea typeface="宋体" charset="0"/>
+                <a:sym typeface="+mn-ea"/>
+              </a:rPr>
+              <a:t>，长期（有客户端引用）驻留在服务端的内存中。</a:t>
+            </a:r>
+          </a:p>
+          <a:p>
+            <a:endParaRPr lang="zh-CN" altLang="en-US" sz="2400">
+              <a:latin typeface="宋体" charset="0"/>
+              <a:ea typeface="宋体" charset="0"/>
+              <a:sym typeface="+mn-ea"/>
+            </a:endParaRPr>
+          </a:p>
+        </p:txBody>
+      </p:sp>
+    </p:spTree>
+  </p:cSld>
+  <p:clrMapOvr>
+    <a:masterClrMapping/>
+  </p:clrMapOvr>
+  <p:timing>
+    <p:tnLst>
+      <p:par>
+        <p:cTn id="1" dur="indefinite" restart="never" nodeType="tmRoot"/>
+      </p:par>
+    </p:tnLst>
+  </p:timing>
+</p:sld>
+</file>
+
+<file path=ppt/slides/slide7.xml><?xml version="1.0" encoding="utf-8"?>
+<p:sld xmlns:a="http://schemas.openxmlformats.org/drawingml/2006/main" xmlns:r="http://schemas.openxmlformats.org/officeDocument/2006/relationships" xmlns:p="http://schemas.openxmlformats.org/presentationml/2006/main">
+  <p:cSld>
+    <p:spTree>
+      <p:nvGrpSpPr>
+        <p:cNvPr id="1" name=""/>
+        <p:cNvGrpSpPr/>
+        <p:nvPr/>
+      </p:nvGrpSpPr>
+      <p:grpSpPr>
+        <a:xfrm>
+          <a:off x="0" y="0"/>
+          <a:ext cx="0" cy="0"/>
+          <a:chOff x="0" y="0"/>
+          <a:chExt cx="0" cy="0"/>
+        </a:xfrm>
+      </p:grpSpPr>
+      <p:sp>
+        <p:nvSpPr>
+          <p:cNvPr id="2" name="标题 1"/>
+          <p:cNvSpPr>
+            <a:spLocks noGrp="1"/>
+          </p:cNvSpPr>
+          <p:nvPr>
+            <p:ph type="title"/>
+          </p:nvPr>
+        </p:nvSpPr>
+        <p:spPr/>
+        <p:txBody>
+          <a:bodyPr/>
+          <a:lstStyle/>
+          <a:p>
+            <a:r>
+              <a:rPr lang="en-US" altLang="zh-CN" sz="3600">
+                <a:latin typeface="宋体" charset="0"/>
+                <a:ea typeface="宋体" charset="0"/>
+              </a:rPr>
+              <a:t>RMI</a:t>
+            </a:r>
+            <a:r>
+              <a:rPr lang="zh-CN" altLang="en-US" sz="3600">
+                <a:latin typeface="宋体" charset="0"/>
+                <a:ea typeface="宋体" charset="0"/>
+              </a:rPr>
+              <a:t>数据结构之服务端</a:t>
+            </a:r>
+          </a:p>
+        </p:txBody>
+      </p:sp>
+      <p:sp>
+        <p:nvSpPr>
+          <p:cNvPr id="3" name="内容占位符 2"/>
+          <p:cNvSpPr>
+            <a:spLocks noGrp="1"/>
+          </p:cNvSpPr>
+          <p:nvPr>
+            <p:ph idx="1"/>
+          </p:nvPr>
+        </p:nvSpPr>
+        <p:spPr>
+          <a:xfrm>
+            <a:off x="838200" y="1905000"/>
+            <a:ext cx="7848600" cy="4105275"/>
+          </a:xfrm>
+        </p:spPr>
+        <p:txBody>
+          <a:bodyPr/>
+          <a:lstStyle/>
+          <a:p>
+            <a:r>
+              <a:rPr lang="zh-CN" altLang="en-US" sz="2400">
+                <a:latin typeface="宋体" charset="0"/>
+                <a:ea typeface="宋体" charset="0"/>
+                <a:sym typeface="+mn-ea"/>
+              </a:rPr>
+              <a:t>Registry：注册表接口，提供远程服务注册表的行为定义。</a:t>
+            </a:r>
+          </a:p>
+          <a:p>
+            <a:r>
+              <a:rPr lang="zh-CN" altLang="en-US" sz="2400">
+                <a:latin typeface="宋体" charset="0"/>
+                <a:ea typeface="宋体" charset="0"/>
+                <a:sym typeface="+mn-ea"/>
+              </a:rPr>
+              <a:t>LocateRegistry：创建注册表。</a:t>
+            </a:r>
+          </a:p>
+          <a:p>
+            <a:r>
+              <a:rPr lang="zh-CN" altLang="en-US" sz="2400">
+                <a:latin typeface="宋体" charset="0"/>
+                <a:ea typeface="宋体" charset="0"/>
+                <a:sym typeface="+mn-ea"/>
+              </a:rPr>
+              <a:t>RegistryImpl：实现了Registry，提供远程服务注册表的具体实现，并提供导出注册表服务的实现。</a:t>
+            </a:r>
+          </a:p>
+          <a:p>
+            <a:endParaRPr lang="zh-CN" altLang="en-US" sz="2400">
+              <a:latin typeface="宋体" charset="0"/>
+              <a:ea typeface="宋体" charset="0"/>
+              <a:sym typeface="+mn-ea"/>
+            </a:endParaRPr>
+          </a:p>
+        </p:txBody>
+      </p:sp>
+    </p:spTree>
+  </p:cSld>
+  <p:clrMapOvr>
+    <a:masterClrMapping/>
+  </p:clrMapOvr>
+  <p:timing>
+    <p:tnLst>
+      <p:par>
+        <p:cTn id="1" dur="indefinite" restart="never" nodeType="tmRoot"/>
+      </p:par>
+    </p:tnLst>
+  </p:timing>
+</p:sld>
+</file>
+
+<file path=ppt/slides/slide8.xml><?xml version="1.0" encoding="utf-8"?>
+<p:sld xmlns:a="http://schemas.openxmlformats.org/drawingml/2006/main" xmlns:r="http://schemas.openxmlformats.org/officeDocument/2006/relationships" xmlns:p="http://schemas.openxmlformats.org/presentationml/2006/main">
+  <p:cSld>
+    <p:spTree>
+      <p:nvGrpSpPr>
+        <p:cNvPr id="1" name=""/>
+        <p:cNvGrpSpPr/>
+        <p:nvPr/>
+      </p:nvGrpSpPr>
+      <p:grpSpPr>
+        <a:xfrm>
+          <a:off x="0" y="0"/>
+          <a:ext cx="0" cy="0"/>
+          <a:chOff x="0" y="0"/>
+          <a:chExt cx="0" cy="0"/>
+        </a:xfrm>
+      </p:grpSpPr>
+      <p:sp>
+        <p:nvSpPr>
+          <p:cNvPr id="2" name="标题 1"/>
+          <p:cNvSpPr>
+            <a:spLocks noGrp="1"/>
+          </p:cNvSpPr>
+          <p:nvPr>
+            <p:ph type="title"/>
+          </p:nvPr>
+        </p:nvSpPr>
+        <p:spPr/>
+        <p:txBody>
+          <a:bodyPr/>
+          <a:lstStyle/>
+          <a:p>
+            <a:r>
+              <a:rPr lang="en-US" altLang="zh-CN" sz="3600">
+                <a:latin typeface="宋体" charset="0"/>
+                <a:ea typeface="宋体" charset="0"/>
+              </a:rPr>
+              <a:t>RMI</a:t>
+            </a:r>
+            <a:r>
+              <a:rPr lang="zh-CN" altLang="en-US" sz="3600">
+                <a:latin typeface="宋体" charset="0"/>
+                <a:ea typeface="宋体" charset="0"/>
+              </a:rPr>
+              <a:t>数据结构之通信</a:t>
+            </a:r>
+          </a:p>
+        </p:txBody>
+      </p:sp>
+      <p:sp>
+        <p:nvSpPr>
+          <p:cNvPr id="3" name="内容占位符 2"/>
+          <p:cNvSpPr>
+            <a:spLocks noGrp="1"/>
+          </p:cNvSpPr>
+          <p:nvPr>
+            <p:ph idx="1"/>
+          </p:nvPr>
+        </p:nvSpPr>
+        <p:spPr>
+          <a:xfrm>
+            <a:off x="838200" y="1905000"/>
+            <a:ext cx="7848600" cy="4105275"/>
+          </a:xfrm>
+        </p:spPr>
+        <p:txBody>
+          <a:bodyPr/>
+          <a:lstStyle/>
+          <a:p>
+            <a:r>
+              <a:rPr lang="zh-CN" altLang="en-US" sz="2400">
+                <a:latin typeface="宋体" charset="0"/>
+                <a:ea typeface="宋体" charset="0"/>
+                <a:sym typeface="+mn-ea"/>
+              </a:rPr>
+              <a:t>Endpoint：抽象终端（地址、端口、服务器</a:t>
+            </a:r>
+            <a:r>
+              <a:rPr lang="en-US" altLang="zh-CN" sz="2400">
+                <a:latin typeface="宋体" charset="0"/>
+                <a:ea typeface="宋体" charset="0"/>
+                <a:sym typeface="+mn-ea"/>
+              </a:rPr>
+              <a:t>socket</a:t>
+            </a:r>
+            <a:r>
+              <a:rPr lang="zh-CN" altLang="en-US" sz="2400">
+                <a:latin typeface="宋体" charset="0"/>
+                <a:ea typeface="宋体" charset="0"/>
+                <a:sym typeface="+mn-ea"/>
+              </a:rPr>
+              <a:t>工厂、客户端</a:t>
+            </a:r>
+            <a:r>
+              <a:rPr lang="en-US" altLang="zh-CN" sz="2400">
+                <a:latin typeface="宋体" charset="0"/>
+                <a:ea typeface="宋体" charset="0"/>
+                <a:sym typeface="+mn-ea"/>
+              </a:rPr>
+              <a:t>socket</a:t>
+            </a:r>
+            <a:r>
+              <a:rPr lang="zh-CN" altLang="en-US" sz="2400">
+                <a:latin typeface="宋体" charset="0"/>
+                <a:ea typeface="宋体" charset="0"/>
+                <a:sym typeface="+mn-ea"/>
+              </a:rPr>
+              <a:t>工厂）。</a:t>
+            </a:r>
+          </a:p>
+          <a:p>
+            <a:r>
+              <a:rPr lang="zh-CN" altLang="en-US" sz="2400">
+                <a:latin typeface="宋体" charset="0"/>
+                <a:ea typeface="宋体" charset="0"/>
+                <a:sym typeface="+mn-ea"/>
+              </a:rPr>
+              <a:t>Transport：管理终端之间的通信。</a:t>
+            </a:r>
+          </a:p>
+          <a:p>
+            <a:r>
+              <a:rPr lang="zh-CN" altLang="en-US" sz="2400">
+                <a:latin typeface="宋体" charset="0"/>
+                <a:ea typeface="宋体" charset="0"/>
+                <a:sym typeface="+mn-ea"/>
+              </a:rPr>
+              <a:t>Channel：两终端之间的通信管道。</a:t>
+            </a:r>
+          </a:p>
+          <a:p>
+            <a:r>
+              <a:rPr lang="zh-CN" altLang="en-US" sz="2400">
+                <a:latin typeface="宋体" charset="0"/>
+                <a:ea typeface="宋体" charset="0"/>
+                <a:sym typeface="+mn-ea"/>
+              </a:rPr>
+              <a:t>Connection：两终端之间的连接。</a:t>
+            </a:r>
+          </a:p>
+          <a:p>
+            <a:endParaRPr lang="zh-CN" altLang="en-US" sz="2400">
+              <a:latin typeface="宋体" charset="0"/>
+              <a:ea typeface="宋体" charset="0"/>
+              <a:sym typeface="+mn-ea"/>
+            </a:endParaRPr>
+          </a:p>
+        </p:txBody>
+      </p:sp>
+    </p:spTree>
+  </p:cSld>
+  <p:clrMapOvr>
+    <a:masterClrMapping/>
+  </p:clrMapOvr>
+  <p:timing>
+    <p:tnLst>
+      <p:par>
+        <p:cTn id="1" dur="indefinite" restart="never" nodeType="tmRoot"/>
+      </p:par>
+    </p:tnLst>
+  </p:timing>
+</p:sld>
+</file>
+
+<file path=ppt/slides/slide9.xml><?xml version="1.0" encoding="utf-8"?>
+<p:sld xmlns:a="http://schemas.openxmlformats.org/drawingml/2006/main" xmlns:r="http://schemas.openxmlformats.org/officeDocument/2006/relationships" xmlns:p="http://schemas.openxmlformats.org/presentationml/2006/main">
+  <p:cSld>
+    <p:spTree>
+      <p:nvGrpSpPr>
+        <p:cNvPr id="1" name=""/>
+        <p:cNvGrpSpPr/>
+        <p:nvPr/>
+      </p:nvGrpSpPr>
+      <p:grpSpPr>
+        <a:xfrm>
+          <a:off x="0" y="0"/>
+          <a:ext cx="0" cy="0"/>
+          <a:chOff x="0" y="0"/>
+          <a:chExt cx="0" cy="0"/>
+        </a:xfrm>
+      </p:grpSpPr>
+      <p:sp>
+        <p:nvSpPr>
+          <p:cNvPr id="2" name="标题 1"/>
+          <p:cNvSpPr>
+            <a:spLocks noGrp="1"/>
+          </p:cNvSpPr>
+          <p:nvPr>
+            <p:ph type="title"/>
+          </p:nvPr>
+        </p:nvSpPr>
+        <p:spPr/>
+        <p:txBody>
+          <a:bodyPr/>
+          <a:lstStyle/>
+          <a:p>
+            <a:r>
+              <a:rPr lang="zh-CN" altLang="en-US" sz="3600" dirty="0" smtClean="0">
+                <a:latin typeface="宋体" charset="0"/>
+                <a:ea typeface="宋体" charset="0"/>
+              </a:rPr>
+              <a:t>创建</a:t>
+            </a:r>
+            <a:r>
+              <a:rPr lang="en-US" altLang="zh-CN" sz="3600" dirty="0" smtClean="0">
+                <a:latin typeface="宋体" charset="0"/>
+                <a:ea typeface="宋体" charset="0"/>
+              </a:rPr>
+              <a:t>RMI</a:t>
+            </a:r>
+            <a:r>
+              <a:rPr lang="zh-CN" altLang="en-US" sz="3600" dirty="0" smtClean="0">
+                <a:latin typeface="宋体" charset="0"/>
+                <a:ea typeface="宋体" charset="0"/>
+              </a:rPr>
+              <a:t>远程服务</a:t>
+            </a:r>
+            <a:endParaRPr lang="zh-CN" altLang="en-US" sz="3600" dirty="0">
+              <a:latin typeface="宋体" charset="0"/>
+              <a:ea typeface="宋体" charset="0"/>
+            </a:endParaRPr>
+          </a:p>
+        </p:txBody>
+      </p:sp>
+      <p:sp>
+        <p:nvSpPr>
+          <p:cNvPr id="3" name="内容占位符 2"/>
+          <p:cNvSpPr>
+            <a:spLocks noGrp="1"/>
+          </p:cNvSpPr>
+          <p:nvPr>
+            <p:ph idx="1"/>
+          </p:nvPr>
+        </p:nvSpPr>
+        <p:spPr>
+          <a:xfrm>
+            <a:off x="838200" y="1905000"/>
+            <a:ext cx="7848600" cy="4105275"/>
+          </a:xfrm>
+        </p:spPr>
+        <p:txBody>
+          <a:bodyPr/>
+          <a:lstStyle/>
+          <a:p>
+            <a:r>
+              <a:rPr lang="zh-CN" altLang="en-US" sz="2400" dirty="0" smtClean="0">
+                <a:latin typeface="宋体" charset="0"/>
+                <a:ea typeface="宋体" charset="0"/>
+                <a:sym typeface="+mn-ea"/>
+              </a:rPr>
+              <a:t>创建客户端代理</a:t>
+            </a:r>
+            <a:endParaRPr lang="en-US" altLang="zh-CN" sz="2400" dirty="0" smtClean="0">
+              <a:latin typeface="宋体" charset="0"/>
+              <a:ea typeface="宋体" charset="0"/>
+              <a:sym typeface="+mn-ea"/>
+            </a:endParaRPr>
+          </a:p>
+          <a:p>
+            <a:r>
+              <a:rPr lang="zh-CN" altLang="en-US" sz="2400" dirty="0" smtClean="0">
+                <a:latin typeface="宋体" charset="0"/>
+                <a:ea typeface="宋体" charset="0"/>
+                <a:sym typeface="+mn-ea"/>
+              </a:rPr>
+              <a:t>创建在服务端驻留的</a:t>
+            </a:r>
+            <a:r>
+              <a:rPr lang="en-US" altLang="zh-CN" sz="2400" dirty="0" smtClean="0">
+                <a:latin typeface="宋体" charset="0"/>
+                <a:ea typeface="宋体" charset="0"/>
+                <a:sym typeface="+mn-ea"/>
+              </a:rPr>
+              <a:t>Target</a:t>
+            </a:r>
+          </a:p>
+          <a:p>
+            <a:r>
+              <a:rPr lang="zh-CN" altLang="en-US" sz="2400" dirty="0" smtClean="0">
+                <a:latin typeface="宋体" charset="0"/>
+                <a:ea typeface="宋体" charset="0"/>
+                <a:sym typeface="+mn-ea"/>
+              </a:rPr>
+              <a:t>在服务发布的终端上导出</a:t>
+            </a:r>
+            <a:endParaRPr lang="zh-CN" altLang="en-US" sz="2400" dirty="0">
+              <a:latin typeface="宋体" charset="0"/>
+              <a:ea typeface="宋体" charset="0"/>
+              <a:sym typeface="+mn-ea"/>
             </a:endParaRPr>
           </a:p>
         </p:txBody>
@@ -5380,7 +6391,7 @@
   </a:extraClrSchemeLst>
   <a:extLst>
     <a:ext uri="{05A4C25C-085E-4340-85A3-A5531E510DB2}">
-      <thm15:themeFamily xmlns:thm15="http://schemas.microsoft.com/office/thememl/2012/main" name="Office Theme" id="{62F939B6-93AF-4DB8-9C6B-D6C7DFDC589F}" vid="{4A3C46E8-61CC-4603-A589-7422A47A8E4A}"/>
+      <thm15:themeFamily xmlns="" xmlns:thm15="http://schemas.microsoft.com/office/thememl/2012/main" name="Office Theme" id="{62F939B6-93AF-4DB8-9C6B-D6C7DFDC589F}" vid="{4A3C46E8-61CC-4603-A589-7422A47A8E4A}"/>
     </a:ext>
   </a:extLst>
 </a:theme>

</xml_diff>

<commit_message>
modified RMI学习分享.pptx in 20160715
</commit_message>
<xml_diff>
--- a/RMI学习分享.pptx
+++ b/RMI学习分享.pptx
@@ -8,18 +8,17 @@
     <p:sldId id="256" r:id="rId2"/>
     <p:sldId id="262" r:id="rId3"/>
     <p:sldId id="263" r:id="rId4"/>
-    <p:sldId id="266" r:id="rId5"/>
-    <p:sldId id="264" r:id="rId6"/>
-    <p:sldId id="265" r:id="rId7"/>
-    <p:sldId id="267" r:id="rId8"/>
-    <p:sldId id="268" r:id="rId9"/>
-    <p:sldId id="269" r:id="rId10"/>
-    <p:sldId id="270" r:id="rId11"/>
-    <p:sldId id="271" r:id="rId12"/>
-    <p:sldId id="272" r:id="rId13"/>
-    <p:sldId id="273" r:id="rId14"/>
-    <p:sldId id="274" r:id="rId15"/>
-    <p:sldId id="259" r:id="rId16"/>
+    <p:sldId id="275" r:id="rId5"/>
+    <p:sldId id="276" r:id="rId6"/>
+    <p:sldId id="277" r:id="rId7"/>
+    <p:sldId id="279" r:id="rId8"/>
+    <p:sldId id="281" r:id="rId9"/>
+    <p:sldId id="280" r:id="rId10"/>
+    <p:sldId id="278" r:id="rId11"/>
+    <p:sldId id="273" r:id="rId12"/>
+    <p:sldId id="274" r:id="rId13"/>
+    <p:sldId id="282" r:id="rId14"/>
+    <p:sldId id="259" r:id="rId15"/>
   </p:sldIdLst>
   <p:sldSz cx="9144000" cy="6858000" type="screen4x3"/>
   <p:notesSz cx="6858000" cy="9144000"/>
@@ -3373,7 +3372,7 @@
           <a:lstStyle/>
           <a:p>
             <a:r>
-              <a:rPr lang="en-US" altLang="zh-CN" smtClean="0">
+              <a:rPr lang="en-US" altLang="zh-CN" dirty="0" smtClean="0">
                 <a:latin typeface="宋体" charset="0"/>
                 <a:ea typeface="宋体" charset="0"/>
               </a:rPr>
@@ -3461,25 +3460,18 @@
           <a:lstStyle/>
           <a:p>
             <a:r>
+              <a:rPr lang="en-US" altLang="zh-CN" sz="3600" dirty="0" smtClean="0">
+                <a:latin typeface="宋体" charset="0"/>
+                <a:ea typeface="宋体" charset="0"/>
+              </a:rPr>
+              <a:t>RMI</a:t>
+            </a:r>
+            <a:r>
               <a:rPr lang="zh-CN" altLang="en-US" sz="3600" dirty="0" smtClean="0">
                 <a:latin typeface="宋体" charset="0"/>
                 <a:ea typeface="宋体" charset="0"/>
               </a:rPr>
-              <a:t>创建</a:t>
-            </a:r>
-            <a:r>
-              <a:rPr lang="en-US" altLang="zh-CN" sz="3600" dirty="0" smtClean="0">
-                <a:latin typeface="宋体" charset="0"/>
-                <a:ea typeface="宋体" charset="0"/>
-              </a:rPr>
-              <a:t>RMI</a:t>
-            </a:r>
-            <a:r>
-              <a:rPr lang="zh-CN" altLang="en-US" sz="3600" dirty="0" smtClean="0">
-                <a:latin typeface="宋体" charset="0"/>
-                <a:ea typeface="宋体" charset="0"/>
-              </a:rPr>
-              <a:t>远程服务之客户端代理</a:t>
+              <a:t>数据结构之通信</a:t>
             </a:r>
             <a:endParaRPr lang="zh-CN" altLang="en-US" sz="3600" dirty="0">
               <a:latin typeface="宋体" charset="0"/>
@@ -3488,29 +3480,154 @@
           </a:p>
         </p:txBody>
       </p:sp>
-      <p:pic>
-        <p:nvPicPr>
-          <p:cNvPr id="4" name="内容占位符 3" descr="client.png"/>
-          <p:cNvPicPr>
-            <a:picLocks noGrp="1" noChangeAspect="1"/>
-          </p:cNvPicPr>
+      <p:sp>
+        <p:nvSpPr>
+          <p:cNvPr id="3" name="内容占位符 2"/>
+          <p:cNvSpPr>
+            <a:spLocks noGrp="1"/>
+          </p:cNvSpPr>
           <p:nvPr>
             <p:ph idx="1"/>
           </p:nvPr>
-        </p:nvPicPr>
-        <p:blipFill>
-          <a:blip r:embed="rId2" cstate="print"/>
-          <a:stretch>
-            <a:fillRect/>
-          </a:stretch>
-        </p:blipFill>
-        <p:spPr>
-          <a:xfrm>
-            <a:off x="838200" y="2464025"/>
-            <a:ext cx="7848600" cy="2987224"/>
-          </a:xfrm>
-        </p:spPr>
-      </p:pic>
+        </p:nvSpPr>
+        <p:spPr/>
+        <p:txBody>
+          <a:bodyPr/>
+          <a:lstStyle/>
+          <a:p>
+            <a:r>
+              <a:rPr lang="en-US" altLang="zh-CN" sz="2400" dirty="0" err="1" smtClean="0">
+                <a:latin typeface="宋体" charset="0"/>
+                <a:ea typeface="宋体" charset="0"/>
+              </a:rPr>
+              <a:t>EndPoint</a:t>
+            </a:r>
+            <a:endParaRPr lang="en-US" altLang="zh-CN" sz="2400" dirty="0" smtClean="0">
+              <a:latin typeface="宋体" charset="0"/>
+              <a:ea typeface="宋体" charset="0"/>
+            </a:endParaRPr>
+          </a:p>
+          <a:p>
+            <a:pPr>
+              <a:buNone/>
+            </a:pPr>
+            <a:r>
+              <a:rPr lang="en-US" altLang="zh-CN" sz="2400" dirty="0" smtClean="0">
+                <a:latin typeface="宋体" charset="0"/>
+                <a:ea typeface="宋体" charset="0"/>
+              </a:rPr>
+              <a:t>	</a:t>
+            </a:r>
+            <a:r>
+              <a:rPr lang="zh-CN" altLang="en-US" sz="1800" dirty="0" smtClean="0">
+                <a:latin typeface="宋体" charset="0"/>
+                <a:ea typeface="宋体" charset="0"/>
+              </a:rPr>
+              <a:t>抽象通信终端</a:t>
+            </a:r>
+            <a:endParaRPr lang="en-US" altLang="zh-CN" sz="1800" dirty="0" smtClean="0">
+              <a:latin typeface="宋体" charset="0"/>
+              <a:ea typeface="宋体" charset="0"/>
+            </a:endParaRPr>
+          </a:p>
+          <a:p>
+            <a:r>
+              <a:rPr lang="en-US" altLang="zh-CN" sz="2400" dirty="0" smtClean="0">
+                <a:latin typeface="宋体" charset="0"/>
+                <a:ea typeface="宋体" charset="0"/>
+              </a:rPr>
+              <a:t>Transport</a:t>
+            </a:r>
+          </a:p>
+          <a:p>
+            <a:pPr>
+              <a:buNone/>
+            </a:pPr>
+            <a:r>
+              <a:rPr lang="en-US" altLang="zh-CN" sz="2400" dirty="0" smtClean="0">
+                <a:latin typeface="宋体" charset="0"/>
+                <a:ea typeface="宋体" charset="0"/>
+              </a:rPr>
+              <a:t>	</a:t>
+            </a:r>
+            <a:r>
+              <a:rPr lang="zh-CN" altLang="en-US" sz="1800" dirty="0" smtClean="0">
+                <a:latin typeface="宋体" charset="0"/>
+                <a:ea typeface="宋体" charset="0"/>
+              </a:rPr>
+              <a:t>两终端的传输通信抽象（更大意义上是通信管理类）</a:t>
+            </a:r>
+            <a:endParaRPr lang="en-US" altLang="zh-CN" sz="1800" dirty="0" smtClean="0">
+              <a:latin typeface="宋体" charset="0"/>
+              <a:ea typeface="宋体" charset="0"/>
+            </a:endParaRPr>
+          </a:p>
+          <a:p>
+            <a:r>
+              <a:rPr lang="en-US" altLang="zh-CN" sz="2400" dirty="0" smtClean="0">
+                <a:latin typeface="宋体" charset="0"/>
+                <a:ea typeface="宋体" charset="0"/>
+              </a:rPr>
+              <a:t>Channel</a:t>
+            </a:r>
+          </a:p>
+          <a:p>
+            <a:pPr>
+              <a:buNone/>
+            </a:pPr>
+            <a:r>
+              <a:rPr lang="en-US" altLang="zh-CN" sz="2400" dirty="0" smtClean="0">
+                <a:latin typeface="宋体" charset="0"/>
+                <a:ea typeface="宋体" charset="0"/>
+              </a:rPr>
+              <a:t>	</a:t>
+            </a:r>
+            <a:r>
+              <a:rPr lang="zh-CN" altLang="en-US" sz="1800" dirty="0" smtClean="0">
+                <a:latin typeface="宋体" charset="0"/>
+                <a:ea typeface="宋体" charset="0"/>
+              </a:rPr>
+              <a:t>通信通道</a:t>
+            </a:r>
+            <a:endParaRPr lang="en-US" altLang="zh-CN" sz="1800" dirty="0" smtClean="0">
+              <a:latin typeface="宋体" charset="0"/>
+              <a:ea typeface="宋体" charset="0"/>
+            </a:endParaRPr>
+          </a:p>
+          <a:p>
+            <a:r>
+              <a:rPr lang="en-US" altLang="zh-CN" sz="2400" dirty="0" smtClean="0">
+                <a:latin typeface="宋体" charset="0"/>
+                <a:ea typeface="宋体" charset="0"/>
+              </a:rPr>
+              <a:t>Connection</a:t>
+            </a:r>
+          </a:p>
+          <a:p>
+            <a:pPr>
+              <a:buNone/>
+            </a:pPr>
+            <a:r>
+              <a:rPr lang="en-US" altLang="zh-CN" sz="1800" dirty="0" smtClean="0">
+                <a:latin typeface="宋体" charset="0"/>
+                <a:ea typeface="宋体" charset="0"/>
+              </a:rPr>
+              <a:t>	</a:t>
+            </a:r>
+            <a:r>
+              <a:rPr lang="zh-CN" altLang="en-US" sz="1800" dirty="0" smtClean="0">
+                <a:latin typeface="宋体" charset="0"/>
+                <a:ea typeface="宋体" charset="0"/>
+              </a:rPr>
+              <a:t>通道内连接</a:t>
+            </a:r>
+            <a:endParaRPr lang="en-US" altLang="zh-CN" sz="1800" dirty="0" smtClean="0">
+              <a:latin typeface="宋体" charset="0"/>
+              <a:ea typeface="宋体" charset="0"/>
+            </a:endParaRPr>
+          </a:p>
+        </p:txBody>
+      </p:sp>
     </p:spTree>
   </p:cSld>
   <p:clrMapOvr>
@@ -3559,25 +3676,18 @@
           <a:lstStyle/>
           <a:p>
             <a:r>
+              <a:rPr lang="en-US" altLang="zh-CN" sz="3600" dirty="0" smtClean="0">
+                <a:latin typeface="宋体" charset="0"/>
+                <a:ea typeface="宋体" charset="0"/>
+              </a:rPr>
+              <a:t>RMI</a:t>
+            </a:r>
+            <a:r>
               <a:rPr lang="zh-CN" altLang="en-US" sz="3600" dirty="0" smtClean="0">
                 <a:latin typeface="宋体" charset="0"/>
                 <a:ea typeface="宋体" charset="0"/>
               </a:rPr>
-              <a:t>创建</a:t>
-            </a:r>
-            <a:r>
-              <a:rPr lang="en-US" altLang="zh-CN" sz="3600" dirty="0" smtClean="0">
-                <a:latin typeface="宋体" charset="0"/>
-                <a:ea typeface="宋体" charset="0"/>
-              </a:rPr>
-              <a:t>RMI</a:t>
-            </a:r>
-            <a:r>
-              <a:rPr lang="zh-CN" altLang="en-US" sz="3600" dirty="0" smtClean="0">
-                <a:latin typeface="宋体" charset="0"/>
-                <a:ea typeface="宋体" charset="0"/>
-              </a:rPr>
-              <a:t>远程服务之服务端</a:t>
+              <a:t>通信协议</a:t>
             </a:r>
             <a:endParaRPr lang="zh-CN" altLang="en-US" sz="3600" dirty="0">
               <a:latin typeface="宋体" charset="0"/>
@@ -3586,29 +3696,177 @@
           </a:p>
         </p:txBody>
       </p:sp>
-      <p:pic>
-        <p:nvPicPr>
-          <p:cNvPr id="4" name="内容占位符 3" descr="server.png"/>
-          <p:cNvPicPr>
-            <a:picLocks noGrp="1" noChangeAspect="1"/>
-          </p:cNvPicPr>
+      <p:sp>
+        <p:nvSpPr>
+          <p:cNvPr id="3" name="内容占位符 2"/>
+          <p:cNvSpPr>
+            <a:spLocks noGrp="1"/>
+          </p:cNvSpPr>
           <p:nvPr>
             <p:ph idx="1"/>
           </p:nvPr>
-        </p:nvPicPr>
-        <p:blipFill>
-          <a:blip r:embed="rId2" cstate="print"/>
-          <a:stretch>
-            <a:fillRect/>
-          </a:stretch>
-        </p:blipFill>
+        </p:nvSpPr>
         <p:spPr>
           <a:xfrm>
-            <a:off x="838200" y="2702589"/>
-            <a:ext cx="7848600" cy="2510097"/>
+            <a:off x="838200" y="1905000"/>
+            <a:ext cx="7848600" cy="4105275"/>
           </a:xfrm>
         </p:spPr>
-      </p:pic>
+        <p:txBody>
+          <a:bodyPr/>
+          <a:lstStyle/>
+          <a:p>
+            <a:r>
+              <a:rPr lang="en-US" altLang="zh-CN" sz="2400" dirty="0" err="1" smtClean="0">
+                <a:latin typeface="宋体" pitchFamily="2" charset="-122"/>
+                <a:ea typeface="宋体" pitchFamily="2" charset="-122"/>
+              </a:rPr>
+              <a:t>SingleOpProtocol</a:t>
+            </a:r>
+            <a:endParaRPr lang="en-US" altLang="zh-CN" sz="2400" dirty="0" smtClean="0">
+              <a:latin typeface="宋体" pitchFamily="2" charset="-122"/>
+              <a:ea typeface="宋体" pitchFamily="2" charset="-122"/>
+            </a:endParaRPr>
+          </a:p>
+          <a:p>
+            <a:pPr>
+              <a:buNone/>
+            </a:pPr>
+            <a:r>
+              <a:rPr lang="en-US" altLang="zh-CN" sz="2400" dirty="0" smtClean="0">
+                <a:latin typeface="宋体" pitchFamily="2" charset="-122"/>
+                <a:ea typeface="宋体" pitchFamily="2" charset="-122"/>
+              </a:rPr>
+              <a:t>	</a:t>
+            </a:r>
+            <a:r>
+              <a:rPr lang="zh-CN" altLang="en-US" sz="1800" dirty="0" smtClean="0">
+                <a:latin typeface="宋体" pitchFamily="2" charset="-122"/>
+                <a:ea typeface="宋体" pitchFamily="2" charset="-122"/>
+              </a:rPr>
+              <a:t>本次建立的</a:t>
+            </a:r>
+            <a:r>
+              <a:rPr lang="en-US" altLang="zh-CN" sz="1800" dirty="0" err="1" smtClean="0">
+                <a:latin typeface="宋体" pitchFamily="2" charset="-122"/>
+                <a:ea typeface="宋体" pitchFamily="2" charset="-122"/>
+              </a:rPr>
+              <a:t>sokcet</a:t>
+            </a:r>
+            <a:r>
+              <a:rPr lang="zh-CN" altLang="en-US" sz="1800" dirty="0" smtClean="0">
+                <a:latin typeface="宋体" pitchFamily="2" charset="-122"/>
+                <a:ea typeface="宋体" pitchFamily="2" charset="-122"/>
+              </a:rPr>
+              <a:t>连接只为一次操作服务，操作完成关闭</a:t>
+            </a:r>
+            <a:r>
+              <a:rPr lang="en-US" altLang="zh-CN" sz="1800" dirty="0" smtClean="0">
+                <a:latin typeface="宋体" pitchFamily="2" charset="-122"/>
+                <a:ea typeface="宋体" pitchFamily="2" charset="-122"/>
+              </a:rPr>
+              <a:t>socket</a:t>
+            </a:r>
+            <a:r>
+              <a:rPr lang="zh-CN" altLang="en-US" sz="1800" dirty="0" smtClean="0">
+                <a:latin typeface="宋体" pitchFamily="2" charset="-122"/>
+                <a:ea typeface="宋体" pitchFamily="2" charset="-122"/>
+              </a:rPr>
+              <a:t>连接。</a:t>
+            </a:r>
+            <a:endParaRPr lang="en-US" altLang="zh-CN" sz="2400" dirty="0" smtClean="0">
+              <a:latin typeface="宋体" pitchFamily="2" charset="-122"/>
+              <a:ea typeface="宋体" pitchFamily="2" charset="-122"/>
+            </a:endParaRPr>
+          </a:p>
+          <a:p>
+            <a:r>
+              <a:rPr lang="en-US" altLang="zh-CN" sz="2400" dirty="0" err="1" smtClean="0">
+                <a:latin typeface="宋体" pitchFamily="2" charset="-122"/>
+                <a:ea typeface="宋体" pitchFamily="2" charset="-122"/>
+              </a:rPr>
+              <a:t>StreamProtocol</a:t>
+            </a:r>
+            <a:endParaRPr lang="en-US" altLang="zh-CN" sz="2400" dirty="0" smtClean="0">
+              <a:latin typeface="宋体" pitchFamily="2" charset="-122"/>
+              <a:ea typeface="宋体" pitchFamily="2" charset="-122"/>
+            </a:endParaRPr>
+          </a:p>
+          <a:p>
+            <a:pPr>
+              <a:buNone/>
+            </a:pPr>
+            <a:r>
+              <a:rPr lang="en-US" altLang="zh-CN" sz="2400" dirty="0" smtClean="0">
+                <a:latin typeface="宋体" pitchFamily="2" charset="-122"/>
+                <a:ea typeface="宋体" pitchFamily="2" charset="-122"/>
+              </a:rPr>
+              <a:t>	</a:t>
+            </a:r>
+            <a:r>
+              <a:rPr lang="en-US" altLang="zh-CN" sz="1800" dirty="0" smtClean="0">
+                <a:latin typeface="宋体" pitchFamily="2" charset="-122"/>
+                <a:ea typeface="宋体" pitchFamily="2" charset="-122"/>
+              </a:rPr>
+              <a:t>socket</a:t>
+            </a:r>
+            <a:r>
+              <a:rPr lang="zh-CN" altLang="en-US" sz="1800" dirty="0" smtClean="0">
+                <a:latin typeface="宋体" pitchFamily="2" charset="-122"/>
+                <a:ea typeface="宋体" pitchFamily="2" charset="-122"/>
+              </a:rPr>
+              <a:t>连接为多次操作服务，直到某种异常发生</a:t>
+            </a:r>
+            <a:endParaRPr lang="en-US" altLang="zh-CN" sz="2400" dirty="0" smtClean="0">
+              <a:latin typeface="宋体" pitchFamily="2" charset="-122"/>
+              <a:ea typeface="宋体" pitchFamily="2" charset="-122"/>
+            </a:endParaRPr>
+          </a:p>
+          <a:p>
+            <a:r>
+              <a:rPr lang="en-US" altLang="zh-CN" sz="2400" dirty="0" err="1" smtClean="0">
+                <a:latin typeface="宋体" pitchFamily="2" charset="-122"/>
+                <a:ea typeface="宋体" pitchFamily="2" charset="-122"/>
+              </a:rPr>
+              <a:t>MultiplexProtocol</a:t>
+            </a:r>
+            <a:endParaRPr lang="en-US" altLang="zh-CN" sz="2400" dirty="0" smtClean="0">
+              <a:latin typeface="宋体" pitchFamily="2" charset="-122"/>
+              <a:ea typeface="宋体" pitchFamily="2" charset="-122"/>
+            </a:endParaRPr>
+          </a:p>
+          <a:p>
+            <a:pPr>
+              <a:buNone/>
+            </a:pPr>
+            <a:r>
+              <a:rPr lang="en-US" altLang="zh-CN" sz="2400" dirty="0" smtClean="0">
+                <a:latin typeface="宋体" pitchFamily="2" charset="-122"/>
+                <a:ea typeface="宋体" pitchFamily="2" charset="-122"/>
+              </a:rPr>
+              <a:t>	</a:t>
+            </a:r>
+            <a:r>
+              <a:rPr lang="en-US" altLang="zh-CN" sz="1800" dirty="0" smtClean="0">
+                <a:latin typeface="宋体" pitchFamily="2" charset="-122"/>
+                <a:ea typeface="宋体" pitchFamily="2" charset="-122"/>
+              </a:rPr>
+              <a:t>socket</a:t>
+            </a:r>
+            <a:r>
+              <a:rPr lang="zh-CN" altLang="en-US" sz="1800" dirty="0" smtClean="0">
+                <a:latin typeface="宋体" pitchFamily="2" charset="-122"/>
+                <a:ea typeface="宋体" pitchFamily="2" charset="-122"/>
+              </a:rPr>
+              <a:t>使用多路复用，建立多个虚拟连接</a:t>
+            </a:r>
+            <a:endParaRPr lang="en-US" altLang="zh-CN" sz="1800" dirty="0" smtClean="0">
+              <a:latin typeface="宋体" pitchFamily="2" charset="-122"/>
+              <a:ea typeface="宋体" pitchFamily="2" charset="-122"/>
+            </a:endParaRPr>
+          </a:p>
+        </p:txBody>
+      </p:sp>
     </p:spTree>
   </p:cSld>
   <p:clrMapOvr>
@@ -3657,25 +3915,18 @@
           <a:lstStyle/>
           <a:p>
             <a:r>
+              <a:rPr lang="en-US" altLang="zh-CN" sz="3600" dirty="0" smtClean="0">
+                <a:latin typeface="宋体" charset="0"/>
+                <a:ea typeface="宋体" charset="0"/>
+              </a:rPr>
+              <a:t>RMI</a:t>
+            </a:r>
+            <a:r>
               <a:rPr lang="zh-CN" altLang="en-US" sz="3600" dirty="0" smtClean="0">
                 <a:latin typeface="宋体" charset="0"/>
                 <a:ea typeface="宋体" charset="0"/>
               </a:rPr>
-              <a:t>创建</a:t>
-            </a:r>
-            <a:r>
-              <a:rPr lang="en-US" altLang="zh-CN" sz="3600" dirty="0" smtClean="0">
-                <a:latin typeface="宋体" charset="0"/>
-                <a:ea typeface="宋体" charset="0"/>
-              </a:rPr>
-              <a:t>RMI</a:t>
-            </a:r>
-            <a:r>
-              <a:rPr lang="zh-CN" altLang="en-US" sz="3600" dirty="0" smtClean="0">
-                <a:latin typeface="宋体" charset="0"/>
-                <a:ea typeface="宋体" charset="0"/>
-              </a:rPr>
-              <a:t>远程服务之导出服务</a:t>
+              <a:t>线程模型</a:t>
             </a:r>
             <a:endParaRPr lang="zh-CN" altLang="en-US" sz="3600" dirty="0">
               <a:latin typeface="宋体" charset="0"/>
@@ -3705,113 +3956,195 @@
           <a:lstStyle/>
           <a:p>
             <a:r>
-              <a:rPr lang="zh-CN" altLang="en-US" sz="2400" dirty="0" smtClean="0">
-                <a:latin typeface="宋体" charset="0"/>
-                <a:ea typeface="宋体" charset="0"/>
-                <a:sym typeface="+mn-ea"/>
-              </a:rPr>
-              <a:t>这一步其实相对简单，通过</a:t>
-            </a:r>
-            <a:r>
-              <a:rPr lang="en-US" altLang="zh-CN" sz="2400" dirty="0" err="1" smtClean="0">
-                <a:latin typeface="宋体" charset="0"/>
-                <a:ea typeface="宋体" charset="0"/>
-                <a:sym typeface="+mn-ea"/>
-              </a:rPr>
-              <a:t>LiveRef</a:t>
-            </a:r>
-            <a:r>
-              <a:rPr lang="zh-CN" altLang="en-US" sz="2400" dirty="0" smtClean="0">
-                <a:latin typeface="宋体" charset="0"/>
-                <a:ea typeface="宋体" charset="0"/>
-                <a:sym typeface="+mn-ea"/>
-              </a:rPr>
-              <a:t>推导出终端对应的通信管理类</a:t>
-            </a:r>
-            <a:r>
-              <a:rPr lang="en-US" altLang="zh-CN" sz="2400" dirty="0" smtClean="0">
-                <a:latin typeface="宋体" charset="0"/>
-                <a:ea typeface="宋体" charset="0"/>
-                <a:sym typeface="+mn-ea"/>
+              <a:rPr lang="en-US" altLang="zh-CN" sz="1800" dirty="0" smtClean="0">
+                <a:latin typeface="宋体" pitchFamily="2" charset="-122"/>
+                <a:ea typeface="宋体" pitchFamily="2" charset="-122"/>
+              </a:rPr>
+              <a:t>Jdk1.5</a:t>
+            </a:r>
+            <a:r>
+              <a:rPr lang="zh-CN" altLang="en-US" sz="1800" dirty="0" smtClean="0">
+                <a:latin typeface="宋体" pitchFamily="2" charset="-122"/>
+                <a:ea typeface="宋体" pitchFamily="2" charset="-122"/>
+              </a:rPr>
+              <a:t>之后</a:t>
+            </a:r>
+            <a:r>
+              <a:rPr lang="en-US" altLang="zh-CN" sz="1800" dirty="0" smtClean="0">
+                <a:latin typeface="宋体" pitchFamily="2" charset="-122"/>
+                <a:ea typeface="宋体" pitchFamily="2" charset="-122"/>
+              </a:rPr>
+              <a:t>RMI</a:t>
+            </a:r>
+            <a:r>
+              <a:rPr lang="zh-CN" altLang="en-US" sz="1800" dirty="0" smtClean="0">
+                <a:latin typeface="宋体" pitchFamily="2" charset="-122"/>
+                <a:ea typeface="宋体" pitchFamily="2" charset="-122"/>
+              </a:rPr>
+              <a:t>使用线程池处理客户端的请求。具体的做法每个</a:t>
+            </a:r>
+            <a:r>
+              <a:rPr lang="en-US" altLang="zh-CN" sz="1800" dirty="0" smtClean="0">
+                <a:latin typeface="宋体" pitchFamily="2" charset="-122"/>
+                <a:ea typeface="宋体" pitchFamily="2" charset="-122"/>
               </a:rPr>
               <a:t>Transport</a:t>
             </a:r>
             <a:r>
-              <a:rPr lang="zh-CN" altLang="en-US" sz="2400" dirty="0" smtClean="0">
-                <a:latin typeface="宋体" charset="0"/>
-                <a:ea typeface="宋体" charset="0"/>
-                <a:sym typeface="+mn-ea"/>
-              </a:rPr>
-              <a:t>，然后如果该</a:t>
-            </a:r>
-            <a:r>
-              <a:rPr lang="en-US" altLang="zh-CN" sz="2400" dirty="0" smtClean="0">
-                <a:latin typeface="宋体" charset="0"/>
-                <a:ea typeface="宋体" charset="0"/>
-                <a:sym typeface="+mn-ea"/>
-              </a:rPr>
-              <a:t>Transport</a:t>
-            </a:r>
-            <a:r>
-              <a:rPr lang="zh-CN" altLang="en-US" sz="2400" dirty="0" smtClean="0">
-                <a:latin typeface="宋体" charset="0"/>
-                <a:ea typeface="宋体" charset="0"/>
-                <a:sym typeface="+mn-ea"/>
-              </a:rPr>
-              <a:t>没有开启</a:t>
-            </a:r>
-            <a:r>
-              <a:rPr lang="en-US" altLang="zh-CN" sz="2400" dirty="0" err="1" smtClean="0">
-                <a:latin typeface="宋体" charset="0"/>
-                <a:ea typeface="宋体" charset="0"/>
-                <a:sym typeface="+mn-ea"/>
+              <a:rPr lang="zh-CN" altLang="en-US" sz="1800" dirty="0" smtClean="0">
+                <a:latin typeface="宋体" pitchFamily="2" charset="-122"/>
+                <a:ea typeface="宋体" pitchFamily="2" charset="-122"/>
+              </a:rPr>
+              <a:t>对象独占一个在线程池之外的线程进行</a:t>
+            </a:r>
+            <a:r>
+              <a:rPr lang="en-US" altLang="zh-CN" sz="1800" dirty="0" err="1" smtClean="0">
+                <a:latin typeface="宋体" pitchFamily="2" charset="-122"/>
+                <a:ea typeface="宋体" pitchFamily="2" charset="-122"/>
               </a:rPr>
               <a:t>SocketServer</a:t>
             </a:r>
             <a:r>
-              <a:rPr lang="zh-CN" altLang="en-US" sz="2400" dirty="0" smtClean="0">
-                <a:latin typeface="宋体" charset="0"/>
-                <a:ea typeface="宋体" charset="0"/>
-                <a:sym typeface="+mn-ea"/>
-              </a:rPr>
-              <a:t>监听连接，开启之。否则直接把</a:t>
-            </a:r>
-            <a:r>
-              <a:rPr lang="en-US" altLang="zh-CN" sz="2400" dirty="0" smtClean="0">
-                <a:latin typeface="宋体" charset="0"/>
-                <a:ea typeface="宋体" charset="0"/>
-                <a:sym typeface="+mn-ea"/>
-              </a:rPr>
-              <a:t>target</a:t>
-            </a:r>
-            <a:r>
-              <a:rPr lang="zh-CN" altLang="en-US" sz="2400" dirty="0" smtClean="0">
-                <a:latin typeface="宋体" charset="0"/>
-                <a:ea typeface="宋体" charset="0"/>
-                <a:sym typeface="+mn-ea"/>
-              </a:rPr>
-              <a:t>放入</a:t>
-            </a:r>
-            <a:r>
-              <a:rPr lang="en-US" altLang="zh-CN" sz="2400" dirty="0" err="1" smtClean="0">
-                <a:latin typeface="宋体" charset="0"/>
-                <a:ea typeface="宋体" charset="0"/>
-                <a:sym typeface="+mn-ea"/>
-              </a:rPr>
-              <a:t>ObjectTable</a:t>
-            </a:r>
-            <a:r>
-              <a:rPr lang="zh-CN" altLang="en-US" sz="2400" dirty="0" smtClean="0">
-                <a:latin typeface="宋体" charset="0"/>
-                <a:ea typeface="宋体" charset="0"/>
-                <a:sym typeface="+mn-ea"/>
-              </a:rPr>
-              <a:t>中长期驻留。</a:t>
-            </a:r>
-            <a:endParaRPr lang="zh-CN" altLang="en-US" sz="2400" dirty="0">
-              <a:latin typeface="宋体" charset="0"/>
-              <a:ea typeface="宋体" charset="0"/>
-              <a:sym typeface="+mn-ea"/>
+              <a:rPr lang="zh-CN" altLang="en-US" sz="1800" dirty="0" smtClean="0">
+                <a:latin typeface="宋体" pitchFamily="2" charset="-122"/>
+                <a:ea typeface="宋体" pitchFamily="2" charset="-122"/>
+              </a:rPr>
+              <a:t>的</a:t>
+            </a:r>
+            <a:r>
+              <a:rPr lang="en-US" altLang="zh-CN" sz="1800" dirty="0" smtClean="0">
+                <a:latin typeface="宋体" pitchFamily="2" charset="-122"/>
+                <a:ea typeface="宋体" pitchFamily="2" charset="-122"/>
+              </a:rPr>
+              <a:t>accept</a:t>
+            </a:r>
+            <a:r>
+              <a:rPr lang="zh-CN" altLang="en-US" sz="1800" dirty="0" smtClean="0">
+                <a:latin typeface="宋体" pitchFamily="2" charset="-122"/>
+                <a:ea typeface="宋体" pitchFamily="2" charset="-122"/>
+              </a:rPr>
+              <a:t>方法，接受客户端建立</a:t>
+            </a:r>
+            <a:r>
+              <a:rPr lang="en-US" altLang="zh-CN" sz="1800" dirty="0" smtClean="0">
+                <a:latin typeface="宋体" pitchFamily="2" charset="-122"/>
+                <a:ea typeface="宋体" pitchFamily="2" charset="-122"/>
+              </a:rPr>
+              <a:t>socket</a:t>
+            </a:r>
+            <a:r>
+              <a:rPr lang="zh-CN" altLang="en-US" sz="1800" dirty="0" smtClean="0">
+                <a:latin typeface="宋体" pitchFamily="2" charset="-122"/>
+                <a:ea typeface="宋体" pitchFamily="2" charset="-122"/>
+              </a:rPr>
+              <a:t>连接，建立连接后把</a:t>
+            </a:r>
+            <a:r>
+              <a:rPr lang="en-US" altLang="zh-CN" sz="1800" dirty="0" smtClean="0">
+                <a:latin typeface="宋体" pitchFamily="2" charset="-122"/>
+                <a:ea typeface="宋体" pitchFamily="2" charset="-122"/>
+              </a:rPr>
+              <a:t>socket</a:t>
+            </a:r>
+            <a:r>
+              <a:rPr lang="zh-CN" altLang="en-US" sz="1800" dirty="0" smtClean="0">
+                <a:latin typeface="宋体" pitchFamily="2" charset="-122"/>
+                <a:ea typeface="宋体" pitchFamily="2" charset="-122"/>
+              </a:rPr>
+              <a:t>转交给线程池处理。</a:t>
+            </a:r>
+            <a:endParaRPr lang="en-US" altLang="zh-CN" sz="1800" dirty="0" smtClean="0">
+              <a:latin typeface="宋体" pitchFamily="2" charset="-122"/>
+              <a:ea typeface="宋体" pitchFamily="2" charset="-122"/>
+            </a:endParaRPr>
+          </a:p>
+          <a:p>
+            <a:r>
+              <a:rPr lang="zh-CN" altLang="en-US" sz="1800" dirty="0" smtClean="0">
+                <a:latin typeface="宋体" pitchFamily="2" charset="-122"/>
+                <a:ea typeface="宋体" pitchFamily="2" charset="-122"/>
+              </a:rPr>
+              <a:t>使用之前提及的</a:t>
+            </a:r>
+            <a:r>
+              <a:rPr lang="en-US" altLang="zh-CN" sz="1800" dirty="0" err="1" smtClean="0">
+                <a:latin typeface="宋体" pitchFamily="2" charset="-122"/>
+                <a:ea typeface="宋体" pitchFamily="2" charset="-122"/>
+              </a:rPr>
+              <a:t>SingleOpProtocol</a:t>
+            </a:r>
+            <a:r>
+              <a:rPr lang="zh-CN" altLang="en-US" sz="1800" dirty="0" smtClean="0">
+                <a:latin typeface="宋体" pitchFamily="2" charset="-122"/>
+                <a:ea typeface="宋体" pitchFamily="2" charset="-122"/>
+              </a:rPr>
+              <a:t>协议、</a:t>
+            </a:r>
+            <a:r>
+              <a:rPr lang="en-US" altLang="zh-CN" sz="1800" dirty="0" smtClean="0">
+                <a:latin typeface="宋体" pitchFamily="2" charset="-122"/>
+                <a:ea typeface="宋体" pitchFamily="2" charset="-122"/>
+              </a:rPr>
+              <a:t> </a:t>
+            </a:r>
+            <a:r>
+              <a:rPr lang="en-US" altLang="zh-CN" sz="1800" dirty="0" err="1" smtClean="0">
+                <a:latin typeface="宋体" pitchFamily="2" charset="-122"/>
+                <a:ea typeface="宋体" pitchFamily="2" charset="-122"/>
+              </a:rPr>
+              <a:t>StreamProtocol</a:t>
+            </a:r>
+            <a:r>
+              <a:rPr lang="zh-CN" altLang="en-US" sz="1800" dirty="0" smtClean="0">
+                <a:latin typeface="宋体" pitchFamily="2" charset="-122"/>
+                <a:ea typeface="宋体" pitchFamily="2" charset="-122"/>
+              </a:rPr>
+              <a:t>协议都是直接使用线程池线程。但如果使用</a:t>
+            </a:r>
+            <a:r>
+              <a:rPr lang="en-US" altLang="zh-CN" sz="1800" dirty="0" err="1" smtClean="0">
+                <a:latin typeface="宋体" pitchFamily="2" charset="-122"/>
+                <a:ea typeface="宋体" pitchFamily="2" charset="-122"/>
+              </a:rPr>
+              <a:t>MultiplexProtocol</a:t>
+            </a:r>
+            <a:r>
+              <a:rPr lang="zh-CN" altLang="en-US" sz="1800" dirty="0" smtClean="0">
+                <a:latin typeface="宋体" pitchFamily="2" charset="-122"/>
+                <a:ea typeface="宋体" pitchFamily="2" charset="-122"/>
+              </a:rPr>
+              <a:t>协议就会有一些不同。</a:t>
+            </a:r>
+            <a:endParaRPr lang="en-US" altLang="zh-CN" sz="1800" dirty="0" smtClean="0">
+              <a:latin typeface="宋体" pitchFamily="2" charset="-122"/>
+              <a:ea typeface="宋体" pitchFamily="2" charset="-122"/>
+            </a:endParaRPr>
+          </a:p>
+          <a:p>
+            <a:r>
+              <a:rPr lang="zh-CN" altLang="en-US" sz="1800" dirty="0" smtClean="0">
+                <a:latin typeface="宋体" pitchFamily="2" charset="-122"/>
+                <a:ea typeface="宋体" pitchFamily="2" charset="-122"/>
+              </a:rPr>
+              <a:t>使用</a:t>
+            </a:r>
+            <a:r>
+              <a:rPr lang="en-US" altLang="zh-CN" sz="1800" dirty="0" err="1" smtClean="0">
+                <a:latin typeface="宋体" pitchFamily="2" charset="-122"/>
+                <a:ea typeface="宋体" pitchFamily="2" charset="-122"/>
+              </a:rPr>
+              <a:t>MultiplexProtocol</a:t>
+            </a:r>
+            <a:r>
+              <a:rPr lang="zh-CN" altLang="en-US" sz="1800" dirty="0" smtClean="0">
+                <a:latin typeface="宋体" pitchFamily="2" charset="-122"/>
+                <a:ea typeface="宋体" pitchFamily="2" charset="-122"/>
+              </a:rPr>
+              <a:t>协议除了占用一个线程池的线程进行不断消息接收，还会建立与虚拟连接数量等值的额外线程进行消息处理以及写出。</a:t>
+            </a:r>
+            <a:endParaRPr lang="en-US" altLang="zh-CN" sz="1800" dirty="0" smtClean="0">
+              <a:latin typeface="宋体" pitchFamily="2" charset="-122"/>
+              <a:ea typeface="宋体" pitchFamily="2" charset="-122"/>
             </a:endParaRPr>
           </a:p>
         </p:txBody>
@@ -3875,7 +4208,7 @@
                 <a:latin typeface="宋体" charset="0"/>
                 <a:ea typeface="宋体" charset="0"/>
               </a:rPr>
-              <a:t>通信协议</a:t>
+              <a:t>线程模型</a:t>
             </a:r>
             <a:endParaRPr lang="zh-CN" altLang="en-US" sz="3600" dirty="0">
               <a:latin typeface="宋体" charset="0"/>
@@ -3884,177 +4217,29 @@
           </a:p>
         </p:txBody>
       </p:sp>
-      <p:sp>
-        <p:nvSpPr>
-          <p:cNvPr id="3" name="内容占位符 2"/>
-          <p:cNvSpPr>
-            <a:spLocks noGrp="1"/>
-          </p:cNvSpPr>
+      <p:pic>
+        <p:nvPicPr>
+          <p:cNvPr id="4" name="内容占位符 3" descr="线程模型.png"/>
+          <p:cNvPicPr>
+            <a:picLocks noGrp="1" noChangeAspect="1"/>
+          </p:cNvPicPr>
           <p:nvPr>
             <p:ph idx="1"/>
           </p:nvPr>
-        </p:nvSpPr>
+        </p:nvPicPr>
+        <p:blipFill>
+          <a:blip r:embed="rId2" cstate="print"/>
+          <a:stretch>
+            <a:fillRect/>
+          </a:stretch>
+        </p:blipFill>
         <p:spPr>
           <a:xfrm>
-            <a:off x="838200" y="1905000"/>
-            <a:ext cx="7848600" cy="4105275"/>
+            <a:off x="1294092" y="1905000"/>
+            <a:ext cx="6936815" cy="4105275"/>
           </a:xfrm>
         </p:spPr>
-        <p:txBody>
-          <a:bodyPr/>
-          <a:lstStyle/>
-          <a:p>
-            <a:r>
-              <a:rPr lang="en-US" altLang="zh-CN" sz="2400" dirty="0" err="1" smtClean="0">
-                <a:latin typeface="宋体" pitchFamily="2" charset="-122"/>
-                <a:ea typeface="宋体" pitchFamily="2" charset="-122"/>
-              </a:rPr>
-              <a:t>SingleOpProtocol</a:t>
-            </a:r>
-            <a:endParaRPr lang="en-US" altLang="zh-CN" sz="2400" dirty="0" smtClean="0">
-              <a:latin typeface="宋体" pitchFamily="2" charset="-122"/>
-              <a:ea typeface="宋体" pitchFamily="2" charset="-122"/>
-            </a:endParaRPr>
-          </a:p>
-          <a:p>
-            <a:pPr>
-              <a:buNone/>
-            </a:pPr>
-            <a:r>
-              <a:rPr lang="en-US" altLang="zh-CN" sz="2400" dirty="0" smtClean="0">
-                <a:latin typeface="宋体" pitchFamily="2" charset="-122"/>
-                <a:ea typeface="宋体" pitchFamily="2" charset="-122"/>
-              </a:rPr>
-              <a:t>	</a:t>
-            </a:r>
-            <a:r>
-              <a:rPr lang="zh-CN" altLang="en-US" sz="1800" dirty="0" smtClean="0">
-                <a:latin typeface="宋体" pitchFamily="2" charset="-122"/>
-                <a:ea typeface="宋体" pitchFamily="2" charset="-122"/>
-              </a:rPr>
-              <a:t>本次建立的</a:t>
-            </a:r>
-            <a:r>
-              <a:rPr lang="en-US" altLang="zh-CN" sz="1800" dirty="0" err="1" smtClean="0">
-                <a:latin typeface="宋体" pitchFamily="2" charset="-122"/>
-                <a:ea typeface="宋体" pitchFamily="2" charset="-122"/>
-              </a:rPr>
-              <a:t>sokcet</a:t>
-            </a:r>
-            <a:r>
-              <a:rPr lang="zh-CN" altLang="en-US" sz="1800" dirty="0" smtClean="0">
-                <a:latin typeface="宋体" pitchFamily="2" charset="-122"/>
-                <a:ea typeface="宋体" pitchFamily="2" charset="-122"/>
-              </a:rPr>
-              <a:t>连接只为一次操作服务，操作完成关闭</a:t>
-            </a:r>
-            <a:r>
-              <a:rPr lang="en-US" altLang="zh-CN" sz="1800" dirty="0" smtClean="0">
-                <a:latin typeface="宋体" pitchFamily="2" charset="-122"/>
-                <a:ea typeface="宋体" pitchFamily="2" charset="-122"/>
-              </a:rPr>
-              <a:t>socket</a:t>
-            </a:r>
-            <a:r>
-              <a:rPr lang="zh-CN" altLang="en-US" sz="1800" dirty="0" smtClean="0">
-                <a:latin typeface="宋体" pitchFamily="2" charset="-122"/>
-                <a:ea typeface="宋体" pitchFamily="2" charset="-122"/>
-              </a:rPr>
-              <a:t>连接。</a:t>
-            </a:r>
-            <a:endParaRPr lang="en-US" altLang="zh-CN" sz="2400" dirty="0" smtClean="0">
-              <a:latin typeface="宋体" pitchFamily="2" charset="-122"/>
-              <a:ea typeface="宋体" pitchFamily="2" charset="-122"/>
-            </a:endParaRPr>
-          </a:p>
-          <a:p>
-            <a:r>
-              <a:rPr lang="en-US" altLang="zh-CN" sz="2400" dirty="0" err="1" smtClean="0">
-                <a:latin typeface="宋体" pitchFamily="2" charset="-122"/>
-                <a:ea typeface="宋体" pitchFamily="2" charset="-122"/>
-              </a:rPr>
-              <a:t>StreamProtocol</a:t>
-            </a:r>
-            <a:endParaRPr lang="en-US" altLang="zh-CN" sz="2400" dirty="0" smtClean="0">
-              <a:latin typeface="宋体" pitchFamily="2" charset="-122"/>
-              <a:ea typeface="宋体" pitchFamily="2" charset="-122"/>
-            </a:endParaRPr>
-          </a:p>
-          <a:p>
-            <a:pPr>
-              <a:buNone/>
-            </a:pPr>
-            <a:r>
-              <a:rPr lang="en-US" altLang="zh-CN" sz="2400" dirty="0" smtClean="0">
-                <a:latin typeface="宋体" pitchFamily="2" charset="-122"/>
-                <a:ea typeface="宋体" pitchFamily="2" charset="-122"/>
-              </a:rPr>
-              <a:t>	</a:t>
-            </a:r>
-            <a:r>
-              <a:rPr lang="en-US" altLang="zh-CN" sz="1800" dirty="0" smtClean="0">
-                <a:latin typeface="宋体" pitchFamily="2" charset="-122"/>
-                <a:ea typeface="宋体" pitchFamily="2" charset="-122"/>
-              </a:rPr>
-              <a:t>socket</a:t>
-            </a:r>
-            <a:r>
-              <a:rPr lang="zh-CN" altLang="en-US" sz="1800" dirty="0" smtClean="0">
-                <a:latin typeface="宋体" pitchFamily="2" charset="-122"/>
-                <a:ea typeface="宋体" pitchFamily="2" charset="-122"/>
-              </a:rPr>
-              <a:t>连接为多次操作服务，直到某种异常发生</a:t>
-            </a:r>
-            <a:endParaRPr lang="en-US" altLang="zh-CN" sz="2400" dirty="0" smtClean="0">
-              <a:latin typeface="宋体" pitchFamily="2" charset="-122"/>
-              <a:ea typeface="宋体" pitchFamily="2" charset="-122"/>
-            </a:endParaRPr>
-          </a:p>
-          <a:p>
-            <a:r>
-              <a:rPr lang="en-US" altLang="zh-CN" sz="2400" dirty="0" err="1" smtClean="0">
-                <a:latin typeface="宋体" pitchFamily="2" charset="-122"/>
-                <a:ea typeface="宋体" pitchFamily="2" charset="-122"/>
-              </a:rPr>
-              <a:t>MultiplexProtocol</a:t>
-            </a:r>
-            <a:endParaRPr lang="en-US" altLang="zh-CN" sz="2400" dirty="0" smtClean="0">
-              <a:latin typeface="宋体" pitchFamily="2" charset="-122"/>
-              <a:ea typeface="宋体" pitchFamily="2" charset="-122"/>
-            </a:endParaRPr>
-          </a:p>
-          <a:p>
-            <a:pPr>
-              <a:buNone/>
-            </a:pPr>
-            <a:r>
-              <a:rPr lang="en-US" altLang="zh-CN" sz="2400" dirty="0" smtClean="0">
-                <a:latin typeface="宋体" pitchFamily="2" charset="-122"/>
-                <a:ea typeface="宋体" pitchFamily="2" charset="-122"/>
-              </a:rPr>
-              <a:t>	</a:t>
-            </a:r>
-            <a:r>
-              <a:rPr lang="en-US" altLang="zh-CN" sz="1800" dirty="0" smtClean="0">
-                <a:latin typeface="宋体" pitchFamily="2" charset="-122"/>
-                <a:ea typeface="宋体" pitchFamily="2" charset="-122"/>
-              </a:rPr>
-              <a:t>socket</a:t>
-            </a:r>
-            <a:r>
-              <a:rPr lang="zh-CN" altLang="en-US" sz="1800" dirty="0" smtClean="0">
-                <a:latin typeface="宋体" pitchFamily="2" charset="-122"/>
-                <a:ea typeface="宋体" pitchFamily="2" charset="-122"/>
-              </a:rPr>
-              <a:t>使用多路复用，建立多个虚拟连接</a:t>
-            </a:r>
-            <a:endParaRPr lang="en-US" altLang="zh-CN" sz="1800" dirty="0" smtClean="0">
-              <a:latin typeface="宋体" pitchFamily="2" charset="-122"/>
-              <a:ea typeface="宋体" pitchFamily="2" charset="-122"/>
-            </a:endParaRPr>
-          </a:p>
-        </p:txBody>
-      </p:sp>
+      </p:pic>
     </p:spTree>
   </p:cSld>
   <p:clrMapOvr>
@@ -4071,288 +4256,6 @@
 </file>
 
 <file path=ppt/slides/slide14.xml><?xml version="1.0" encoding="utf-8"?>
-<p:sld xmlns:a="http://schemas.openxmlformats.org/drawingml/2006/main" xmlns:r="http://schemas.openxmlformats.org/officeDocument/2006/relationships" xmlns:p="http://schemas.openxmlformats.org/presentationml/2006/main">
-  <p:cSld>
-    <p:spTree>
-      <p:nvGrpSpPr>
-        <p:cNvPr id="1" name=""/>
-        <p:cNvGrpSpPr/>
-        <p:nvPr/>
-      </p:nvGrpSpPr>
-      <p:grpSpPr>
-        <a:xfrm>
-          <a:off x="0" y="0"/>
-          <a:ext cx="0" cy="0"/>
-          <a:chOff x="0" y="0"/>
-          <a:chExt cx="0" cy="0"/>
-        </a:xfrm>
-      </p:grpSpPr>
-      <p:sp>
-        <p:nvSpPr>
-          <p:cNvPr id="2" name="标题 1"/>
-          <p:cNvSpPr>
-            <a:spLocks noGrp="1"/>
-          </p:cNvSpPr>
-          <p:nvPr>
-            <p:ph type="title"/>
-          </p:nvPr>
-        </p:nvSpPr>
-        <p:spPr/>
-        <p:txBody>
-          <a:bodyPr/>
-          <a:lstStyle/>
-          <a:p>
-            <a:r>
-              <a:rPr lang="en-US" altLang="zh-CN" sz="3600" dirty="0" smtClean="0">
-                <a:latin typeface="宋体" charset="0"/>
-                <a:ea typeface="宋体" charset="0"/>
-              </a:rPr>
-              <a:t>RMI</a:t>
-            </a:r>
-            <a:r>
-              <a:rPr lang="zh-CN" altLang="en-US" sz="3600" dirty="0" smtClean="0">
-                <a:latin typeface="宋体" charset="0"/>
-                <a:ea typeface="宋体" charset="0"/>
-              </a:rPr>
-              <a:t>线程模型</a:t>
-            </a:r>
-            <a:endParaRPr lang="zh-CN" altLang="en-US" sz="3600" dirty="0">
-              <a:latin typeface="宋体" charset="0"/>
-              <a:ea typeface="宋体" charset="0"/>
-            </a:endParaRPr>
-          </a:p>
-        </p:txBody>
-      </p:sp>
-      <p:sp>
-        <p:nvSpPr>
-          <p:cNvPr id="3" name="内容占位符 2"/>
-          <p:cNvSpPr>
-            <a:spLocks noGrp="1"/>
-          </p:cNvSpPr>
-          <p:nvPr>
-            <p:ph idx="1"/>
-          </p:nvPr>
-        </p:nvSpPr>
-        <p:spPr>
-          <a:xfrm>
-            <a:off x="838200" y="1905000"/>
-            <a:ext cx="7848600" cy="4105275"/>
-          </a:xfrm>
-        </p:spPr>
-        <p:txBody>
-          <a:bodyPr/>
-          <a:lstStyle/>
-          <a:p>
-            <a:r>
-              <a:rPr lang="en-US" altLang="zh-CN" sz="1800" dirty="0" smtClean="0">
-                <a:latin typeface="宋体" pitchFamily="2" charset="-122"/>
-                <a:ea typeface="宋体" pitchFamily="2" charset="-122"/>
-              </a:rPr>
-              <a:t>Jdk1.5</a:t>
-            </a:r>
-            <a:r>
-              <a:rPr lang="zh-CN" altLang="en-US" sz="1800" dirty="0" smtClean="0">
-                <a:latin typeface="宋体" pitchFamily="2" charset="-122"/>
-                <a:ea typeface="宋体" pitchFamily="2" charset="-122"/>
-              </a:rPr>
-              <a:t>之后</a:t>
-            </a:r>
-            <a:r>
-              <a:rPr lang="en-US" altLang="zh-CN" sz="1800" dirty="0" smtClean="0">
-                <a:latin typeface="宋体" pitchFamily="2" charset="-122"/>
-                <a:ea typeface="宋体" pitchFamily="2" charset="-122"/>
-              </a:rPr>
-              <a:t>RMI</a:t>
-            </a:r>
-            <a:r>
-              <a:rPr lang="zh-CN" altLang="en-US" sz="1800" dirty="0" smtClean="0">
-                <a:latin typeface="宋体" pitchFamily="2" charset="-122"/>
-                <a:ea typeface="宋体" pitchFamily="2" charset="-122"/>
-              </a:rPr>
-              <a:t>使用线程池处理客户端的请求。具体的做法每个</a:t>
-            </a:r>
-            <a:r>
-              <a:rPr lang="en-US" altLang="zh-CN" sz="1800" dirty="0" smtClean="0">
-                <a:latin typeface="宋体" pitchFamily="2" charset="-122"/>
-                <a:ea typeface="宋体" pitchFamily="2" charset="-122"/>
-              </a:rPr>
-              <a:t>Transport</a:t>
-            </a:r>
-            <a:r>
-              <a:rPr lang="zh-CN" altLang="en-US" sz="1800" dirty="0" smtClean="0">
-                <a:latin typeface="宋体" pitchFamily="2" charset="-122"/>
-                <a:ea typeface="宋体" pitchFamily="2" charset="-122"/>
-              </a:rPr>
-              <a:t>对象独占一个在线程池之外的线程进行</a:t>
-            </a:r>
-            <a:r>
-              <a:rPr lang="en-US" altLang="zh-CN" sz="1800" dirty="0" err="1" smtClean="0">
-                <a:latin typeface="宋体" pitchFamily="2" charset="-122"/>
-                <a:ea typeface="宋体" pitchFamily="2" charset="-122"/>
-              </a:rPr>
-              <a:t>SocketServer</a:t>
-            </a:r>
-            <a:r>
-              <a:rPr lang="zh-CN" altLang="en-US" sz="1800" dirty="0" smtClean="0">
-                <a:latin typeface="宋体" pitchFamily="2" charset="-122"/>
-                <a:ea typeface="宋体" pitchFamily="2" charset="-122"/>
-              </a:rPr>
-              <a:t>的</a:t>
-            </a:r>
-            <a:r>
-              <a:rPr lang="en-US" altLang="zh-CN" sz="1800" dirty="0" smtClean="0">
-                <a:latin typeface="宋体" pitchFamily="2" charset="-122"/>
-                <a:ea typeface="宋体" pitchFamily="2" charset="-122"/>
-              </a:rPr>
-              <a:t>accept</a:t>
-            </a:r>
-            <a:r>
-              <a:rPr lang="zh-CN" altLang="en-US" sz="1800" dirty="0" smtClean="0">
-                <a:latin typeface="宋体" pitchFamily="2" charset="-122"/>
-                <a:ea typeface="宋体" pitchFamily="2" charset="-122"/>
-              </a:rPr>
-              <a:t>方法，接受客户端建立</a:t>
-            </a:r>
-            <a:r>
-              <a:rPr lang="en-US" altLang="zh-CN" sz="1800" dirty="0" smtClean="0">
-                <a:latin typeface="宋体" pitchFamily="2" charset="-122"/>
-                <a:ea typeface="宋体" pitchFamily="2" charset="-122"/>
-              </a:rPr>
-              <a:t>socket</a:t>
-            </a:r>
-            <a:r>
-              <a:rPr lang="zh-CN" altLang="en-US" sz="1800" dirty="0" smtClean="0">
-                <a:latin typeface="宋体" pitchFamily="2" charset="-122"/>
-                <a:ea typeface="宋体" pitchFamily="2" charset="-122"/>
-              </a:rPr>
-              <a:t>连接，建立连接后把</a:t>
-            </a:r>
-            <a:r>
-              <a:rPr lang="en-US" altLang="zh-CN" sz="1800" dirty="0" smtClean="0">
-                <a:latin typeface="宋体" pitchFamily="2" charset="-122"/>
-                <a:ea typeface="宋体" pitchFamily="2" charset="-122"/>
-              </a:rPr>
-              <a:t>socket</a:t>
-            </a:r>
-            <a:r>
-              <a:rPr lang="zh-CN" altLang="en-US" sz="1800" dirty="0" smtClean="0">
-                <a:latin typeface="宋体" pitchFamily="2" charset="-122"/>
-                <a:ea typeface="宋体" pitchFamily="2" charset="-122"/>
-              </a:rPr>
-              <a:t>转交给线程池处理。</a:t>
-            </a:r>
-            <a:endParaRPr lang="en-US" altLang="zh-CN" sz="1800" dirty="0" smtClean="0">
-              <a:latin typeface="宋体" pitchFamily="2" charset="-122"/>
-              <a:ea typeface="宋体" pitchFamily="2" charset="-122"/>
-            </a:endParaRPr>
-          </a:p>
-          <a:p>
-            <a:r>
-              <a:rPr lang="zh-CN" altLang="en-US" sz="1800" dirty="0" smtClean="0">
-                <a:latin typeface="宋体" pitchFamily="2" charset="-122"/>
-                <a:ea typeface="宋体" pitchFamily="2" charset="-122"/>
-              </a:rPr>
-              <a:t>使用之前提及的</a:t>
-            </a:r>
-            <a:r>
-              <a:rPr lang="en-US" altLang="zh-CN" sz="1800" dirty="0" err="1" smtClean="0">
-                <a:latin typeface="宋体" pitchFamily="2" charset="-122"/>
-                <a:ea typeface="宋体" pitchFamily="2" charset="-122"/>
-              </a:rPr>
-              <a:t>SingleOpProtocol</a:t>
-            </a:r>
-            <a:r>
-              <a:rPr lang="zh-CN" altLang="en-US" sz="1800" dirty="0" smtClean="0">
-                <a:latin typeface="宋体" pitchFamily="2" charset="-122"/>
-                <a:ea typeface="宋体" pitchFamily="2" charset="-122"/>
-              </a:rPr>
-              <a:t>协议、</a:t>
-            </a:r>
-            <a:r>
-              <a:rPr lang="en-US" altLang="zh-CN" sz="1800" dirty="0" smtClean="0">
-                <a:latin typeface="宋体" pitchFamily="2" charset="-122"/>
-                <a:ea typeface="宋体" pitchFamily="2" charset="-122"/>
-              </a:rPr>
-              <a:t> </a:t>
-            </a:r>
-            <a:r>
-              <a:rPr lang="en-US" altLang="zh-CN" sz="1800" dirty="0" err="1" smtClean="0">
-                <a:latin typeface="宋体" pitchFamily="2" charset="-122"/>
-                <a:ea typeface="宋体" pitchFamily="2" charset="-122"/>
-              </a:rPr>
-              <a:t>StreamProtocol</a:t>
-            </a:r>
-            <a:r>
-              <a:rPr lang="zh-CN" altLang="en-US" sz="1800" dirty="0" smtClean="0">
-                <a:latin typeface="宋体" pitchFamily="2" charset="-122"/>
-                <a:ea typeface="宋体" pitchFamily="2" charset="-122"/>
-              </a:rPr>
-              <a:t>协议都是直接使用线程池线程。但如果使用</a:t>
-            </a:r>
-            <a:r>
-              <a:rPr lang="en-US" altLang="zh-CN" sz="1800" dirty="0" err="1" smtClean="0">
-                <a:latin typeface="宋体" pitchFamily="2" charset="-122"/>
-                <a:ea typeface="宋体" pitchFamily="2" charset="-122"/>
-              </a:rPr>
-              <a:t>MultiplexProtocol</a:t>
-            </a:r>
-            <a:r>
-              <a:rPr lang="zh-CN" altLang="en-US" sz="1800" dirty="0" smtClean="0">
-                <a:latin typeface="宋体" pitchFamily="2" charset="-122"/>
-                <a:ea typeface="宋体" pitchFamily="2" charset="-122"/>
-              </a:rPr>
-              <a:t>协议就会有一些不同。</a:t>
-            </a:r>
-            <a:endParaRPr lang="en-US" altLang="zh-CN" sz="1800" dirty="0" smtClean="0">
-              <a:latin typeface="宋体" pitchFamily="2" charset="-122"/>
-              <a:ea typeface="宋体" pitchFamily="2" charset="-122"/>
-            </a:endParaRPr>
-          </a:p>
-          <a:p>
-            <a:r>
-              <a:rPr lang="zh-CN" altLang="en-US" sz="1800" dirty="0" smtClean="0">
-                <a:latin typeface="宋体" pitchFamily="2" charset="-122"/>
-                <a:ea typeface="宋体" pitchFamily="2" charset="-122"/>
-              </a:rPr>
-              <a:t>使用</a:t>
-            </a:r>
-            <a:r>
-              <a:rPr lang="en-US" altLang="zh-CN" sz="1800" dirty="0" err="1" smtClean="0">
-                <a:latin typeface="宋体" pitchFamily="2" charset="-122"/>
-                <a:ea typeface="宋体" pitchFamily="2" charset="-122"/>
-              </a:rPr>
-              <a:t>MultiplexProtocol</a:t>
-            </a:r>
-            <a:r>
-              <a:rPr lang="zh-CN" altLang="en-US" sz="1800" dirty="0" smtClean="0">
-                <a:latin typeface="宋体" pitchFamily="2" charset="-122"/>
-                <a:ea typeface="宋体" pitchFamily="2" charset="-122"/>
-              </a:rPr>
-              <a:t>协议除了占用一个线程池的线程进行不断消息接收，还会建立与虚拟连接数量等值的额外线程进行消息处理以及写出。</a:t>
-            </a:r>
-            <a:endParaRPr lang="en-US" altLang="zh-CN" sz="1800" dirty="0" smtClean="0">
-              <a:latin typeface="宋体" pitchFamily="2" charset="-122"/>
-              <a:ea typeface="宋体" pitchFamily="2" charset="-122"/>
-            </a:endParaRPr>
-          </a:p>
-        </p:txBody>
-      </p:sp>
-    </p:spTree>
-  </p:cSld>
-  <p:clrMapOvr>
-    <a:masterClrMapping/>
-  </p:clrMapOvr>
-  <p:timing>
-    <p:tnLst>
-      <p:par>
-        <p:cTn id="1" dur="indefinite" restart="never" nodeType="tmRoot"/>
-      </p:par>
-    </p:tnLst>
-  </p:timing>
-</p:sld>
-</file>
-
-<file path=ppt/slides/slide15.xml><?xml version="1.0" encoding="utf-8"?>
 <p:sld xmlns:a="http://schemas.openxmlformats.org/drawingml/2006/main" xmlns:r="http://schemas.openxmlformats.org/officeDocument/2006/relationships" xmlns:p="http://schemas.openxmlformats.org/presentationml/2006/main">
   <p:cSld>
     <p:bg>
@@ -4481,7 +4384,7 @@
               <a:t>什么是</a:t>
             </a:r>
             <a:r>
-              <a:rPr lang="en-US" altLang="zh-CN" sz="3600">
+              <a:rPr lang="en-US" altLang="zh-CN" sz="3600" dirty="0">
                 <a:latin typeface="宋体" charset="0"/>
                 <a:ea typeface="宋体" charset="0"/>
               </a:rPr>
@@ -4506,11 +4409,18 @@
           <a:lstStyle/>
           <a:p>
             <a:r>
+              <a:rPr sz="2400" dirty="0" err="1">
+                <a:latin typeface="宋体" charset="0"/>
+                <a:ea typeface="宋体" charset="0"/>
+              </a:rPr>
+              <a:t>RMI（Remote</a:t>
+            </a:r>
+            <a:r>
               <a:rPr sz="2400">
                 <a:latin typeface="宋体" charset="0"/>
                 <a:ea typeface="宋体" charset="0"/>
               </a:rPr>
-              <a:t>RMI（Remote Method Invocation，远程方法调用）</a:t>
+              <a:t> Method Invocation，远程方法调用）</a:t>
             </a:r>
             <a:r>
               <a:rPr lang="zh-CN" sz="2400">
@@ -4753,100 +4663,88 @@
           <a:lstStyle/>
           <a:p>
             <a:r>
-              <a:rPr lang="en-US" altLang="zh-CN" sz="3600">
+              <a:rPr lang="en-US" altLang="zh-CN" sz="3600" dirty="0" smtClean="0">
                 <a:latin typeface="宋体" charset="0"/>
                 <a:ea typeface="宋体" charset="0"/>
               </a:rPr>
               <a:t>RMI</a:t>
             </a:r>
             <a:r>
-              <a:rPr lang="zh-CN" altLang="en-US" sz="3600">
-                <a:latin typeface="宋体" charset="0"/>
-                <a:ea typeface="宋体" charset="0"/>
-              </a:rPr>
-              <a:t>数据结构之抽象</a:t>
-            </a:r>
-          </a:p>
-        </p:txBody>
-      </p:sp>
-      <p:sp>
-        <p:nvSpPr>
-          <p:cNvPr id="3" name="内容占位符 2"/>
-          <p:cNvSpPr>
-            <a:spLocks noGrp="1"/>
-          </p:cNvSpPr>
-          <p:nvPr>
-            <p:ph idx="1"/>
-          </p:nvPr>
-        </p:nvSpPr>
-        <p:spPr/>
-        <p:txBody>
-          <a:bodyPr/>
-          <a:lstStyle/>
-          <a:p>
-            <a:r>
-              <a:rPr lang="zh-CN" altLang="en-US" sz="2400" dirty="0">
-                <a:latin typeface="宋体" charset="0"/>
-                <a:ea typeface="宋体" charset="0"/>
-              </a:rPr>
-              <a:t>RemoteObject：继承</a:t>
-            </a:r>
-            <a:r>
-              <a:rPr lang="en-US" altLang="zh-CN" sz="2400" dirty="0">
-                <a:latin typeface="宋体" charset="0"/>
-                <a:ea typeface="宋体" charset="0"/>
-              </a:rPr>
-              <a:t>Object</a:t>
-            </a:r>
-            <a:r>
-              <a:rPr lang="zh-CN" altLang="en-US" sz="2400" dirty="0">
-                <a:latin typeface="宋体" charset="0"/>
-                <a:ea typeface="宋体" charset="0"/>
-              </a:rPr>
-              <a:t>，提供了远程对象有关于</a:t>
-            </a:r>
-            <a:r>
-              <a:rPr lang="en-US" altLang="zh-CN" sz="2400" dirty="0">
-                <a:latin typeface="宋体" charset="0"/>
-                <a:ea typeface="宋体" charset="0"/>
-              </a:rPr>
-              <a:t>Object</a:t>
-            </a:r>
-            <a:r>
-              <a:rPr lang="zh-CN" altLang="en-US" sz="2400" dirty="0">
-                <a:latin typeface="宋体" charset="0"/>
-                <a:ea typeface="宋体" charset="0"/>
-              </a:rPr>
-              <a:t>对象行为的远程实现</a:t>
-            </a:r>
-            <a:r>
-              <a:rPr lang="zh-CN" altLang="en-US" sz="2400" dirty="0" smtClean="0">
-                <a:latin typeface="宋体" charset="0"/>
-                <a:ea typeface="宋体" charset="0"/>
-              </a:rPr>
-              <a:t>。并提供可继承属性RemoteRef。</a:t>
-            </a:r>
-            <a:endParaRPr lang="zh-CN" altLang="en-US" sz="2400" dirty="0">
+              <a:rPr lang="zh-CN" altLang="en-US" sz="3600" dirty="0" smtClean="0">
+                <a:latin typeface="宋体" charset="0"/>
+                <a:ea typeface="宋体" charset="0"/>
+              </a:rPr>
+              <a:t>数据结构</a:t>
+            </a:r>
+            <a:endParaRPr lang="zh-CN" altLang="en-US" sz="3600" dirty="0">
               <a:latin typeface="宋体" charset="0"/>
               <a:ea typeface="宋体" charset="0"/>
             </a:endParaRPr>
           </a:p>
-          <a:p>
-            <a:r>
-              <a:rPr lang="zh-CN" altLang="en-US" sz="2400" dirty="0">
-                <a:latin typeface="宋体" charset="0"/>
-                <a:ea typeface="宋体" charset="0"/>
-              </a:rPr>
-              <a:t>RemoteRef：远程句柄，提供了操作远程对象的定义。</a:t>
-            </a:r>
-            <a:endParaRPr lang="zh-CN" altLang="en-US" sz="2400" dirty="0">
+        </p:txBody>
+      </p:sp>
+      <p:sp>
+        <p:nvSpPr>
+          <p:cNvPr id="3" name="内容占位符 2"/>
+          <p:cNvSpPr>
+            <a:spLocks noGrp="1"/>
+          </p:cNvSpPr>
+          <p:nvPr>
+            <p:ph idx="1"/>
+          </p:nvPr>
+        </p:nvSpPr>
+        <p:spPr/>
+        <p:txBody>
+          <a:bodyPr/>
+          <a:lstStyle/>
+          <a:p>
+            <a:r>
+              <a:rPr lang="zh-CN" altLang="en-US" sz="2400" dirty="0" smtClean="0">
+                <a:latin typeface="宋体" charset="0"/>
+                <a:ea typeface="宋体" charset="0"/>
+              </a:rPr>
+              <a:t>远程对象</a:t>
+            </a:r>
+            <a:endParaRPr lang="en-US" altLang="zh-CN" sz="2400" dirty="0" smtClean="0">
               <a:latin typeface="宋体" charset="0"/>
               <a:ea typeface="宋体" charset="0"/>
-              <a:sym typeface="+mn-ea"/>
             </a:endParaRPr>
           </a:p>
           <a:p>
-            <a:endParaRPr lang="zh-CN" altLang="en-US" sz="2400" dirty="0">
+            <a:r>
+              <a:rPr lang="zh-CN" altLang="en-US" sz="2400" dirty="0" smtClean="0">
+                <a:latin typeface="宋体" charset="0"/>
+                <a:ea typeface="宋体" charset="0"/>
+              </a:rPr>
+              <a:t>句柄</a:t>
+            </a:r>
+            <a:endParaRPr lang="en-US" altLang="zh-CN" sz="2400" dirty="0" smtClean="0">
+              <a:latin typeface="宋体" charset="0"/>
+              <a:ea typeface="宋体" charset="0"/>
+            </a:endParaRPr>
+          </a:p>
+          <a:p>
+            <a:r>
+              <a:rPr lang="zh-CN" altLang="en-US" sz="2400" dirty="0" smtClean="0">
+                <a:latin typeface="宋体" charset="0"/>
+                <a:ea typeface="宋体" charset="0"/>
+              </a:rPr>
+              <a:t>服务驻留集合</a:t>
+            </a:r>
+            <a:endParaRPr lang="en-US" altLang="zh-CN" sz="2400" dirty="0" smtClean="0">
+              <a:latin typeface="宋体" charset="0"/>
+              <a:ea typeface="宋体" charset="0"/>
+            </a:endParaRPr>
+          </a:p>
+          <a:p>
+            <a:r>
+              <a:rPr lang="zh-CN" altLang="en-US" sz="2400" dirty="0" smtClean="0">
+                <a:latin typeface="宋体" charset="0"/>
+                <a:ea typeface="宋体" charset="0"/>
+              </a:rPr>
+              <a:t>通信</a:t>
+            </a:r>
+            <a:endParaRPr lang="en-US" altLang="zh-CN" sz="2400" dirty="0" smtClean="0">
               <a:latin typeface="宋体" charset="0"/>
               <a:ea typeface="宋体" charset="0"/>
             </a:endParaRPr>
@@ -4901,127 +4799,203 @@
           <a:lstStyle/>
           <a:p>
             <a:r>
-              <a:rPr lang="en-US" altLang="zh-CN" sz="3600">
+              <a:rPr lang="en-US" altLang="zh-CN" sz="3600" dirty="0" smtClean="0">
                 <a:latin typeface="宋体" charset="0"/>
                 <a:ea typeface="宋体" charset="0"/>
               </a:rPr>
               <a:t>RMI</a:t>
             </a:r>
             <a:r>
-              <a:rPr lang="zh-CN" altLang="en-US" sz="3600">
-                <a:latin typeface="宋体" charset="0"/>
-                <a:ea typeface="宋体" charset="0"/>
-              </a:rPr>
-              <a:t>数据结构之客户端</a:t>
-            </a:r>
-          </a:p>
-        </p:txBody>
-      </p:sp>
-      <p:sp>
-        <p:nvSpPr>
-          <p:cNvPr id="3" name="内容占位符 2"/>
-          <p:cNvSpPr>
-            <a:spLocks noGrp="1"/>
-          </p:cNvSpPr>
-          <p:nvPr>
-            <p:ph idx="1"/>
-          </p:nvPr>
-        </p:nvSpPr>
-        <p:spPr/>
-        <p:txBody>
-          <a:bodyPr/>
-          <a:lstStyle/>
-          <a:p>
-            <a:r>
-              <a:rPr lang="en-US" altLang="zh-CN" sz="2400">
-                <a:latin typeface="宋体" charset="0"/>
-                <a:ea typeface="宋体" charset="0"/>
-              </a:rPr>
-              <a:t>Proxy</a:t>
-            </a:r>
-            <a:r>
-              <a:rPr lang="zh-CN" altLang="en-US" sz="2400">
-                <a:latin typeface="宋体" charset="0"/>
-                <a:ea typeface="宋体" charset="0"/>
-              </a:rPr>
-              <a:t>：一个实现了远程服务接口的动态代理。</a:t>
-            </a:r>
-          </a:p>
-          <a:p>
-            <a:r>
-              <a:rPr lang="zh-CN" altLang="en-US" sz="2400">
-                <a:latin typeface="宋体" charset="0"/>
-                <a:ea typeface="宋体" charset="0"/>
-              </a:rPr>
-              <a:t>RemoteObjectInvocationHandler：实现了InvocationHandler，动态代理的</a:t>
-            </a:r>
-            <a:r>
-              <a:rPr lang="en-US" altLang="zh-CN" sz="2400">
-                <a:latin typeface="宋体" charset="0"/>
-                <a:ea typeface="宋体" charset="0"/>
-              </a:rPr>
-              <a:t>Handler</a:t>
-            </a:r>
-            <a:r>
-              <a:rPr lang="zh-CN" altLang="en-US" sz="2400">
-                <a:latin typeface="宋体" charset="0"/>
-                <a:ea typeface="宋体" charset="0"/>
-              </a:rPr>
-              <a:t>类。</a:t>
-            </a:r>
-          </a:p>
-          <a:p>
-            <a:r>
-              <a:rPr lang="en-US" altLang="zh-CN" sz="2400">
-                <a:latin typeface="宋体" charset="0"/>
-                <a:ea typeface="宋体" charset="0"/>
-              </a:rPr>
-              <a:t>UnicastRef:</a:t>
-            </a:r>
-            <a:r>
-              <a:rPr lang="zh-CN" altLang="en-US" sz="2400">
-                <a:latin typeface="宋体" charset="0"/>
-                <a:ea typeface="宋体" charset="0"/>
-                <a:sym typeface="+mn-ea"/>
-              </a:rPr>
-              <a:t>实现了RemoteRef，是客户端对远程对象的句柄。提供了客户端远程句柄操作远程对象的具体实现。</a:t>
-            </a:r>
-            <a:endParaRPr lang="zh-CN" altLang="en-US" sz="2400">
+              <a:rPr lang="zh-CN" altLang="en-US" sz="3600" dirty="0" smtClean="0">
+                <a:latin typeface="宋体" charset="0"/>
+                <a:ea typeface="宋体" charset="0"/>
+              </a:rPr>
+              <a:t>数据结构之远程对象</a:t>
+            </a:r>
+            <a:endParaRPr lang="zh-CN" altLang="en-US" sz="3600" dirty="0">
               <a:latin typeface="宋体" charset="0"/>
               <a:ea typeface="宋体" charset="0"/>
             </a:endParaRPr>
           </a:p>
-          <a:p>
-            <a:r>
-              <a:rPr lang="en-US" altLang="zh-CN" sz="2400">
-                <a:latin typeface="宋体" charset="0"/>
-                <a:ea typeface="宋体" charset="0"/>
-              </a:rPr>
-              <a:t>LiveRef</a:t>
-            </a:r>
-            <a:r>
-              <a:rPr lang="zh-CN" altLang="en-US" sz="2400">
-                <a:latin typeface="宋体" charset="0"/>
-                <a:ea typeface="宋体" charset="0"/>
-              </a:rPr>
-              <a:t>：通信对象的包装类。</a:t>
-            </a:r>
-          </a:p>
-          <a:p>
-            <a:r>
-              <a:rPr lang="en-US" altLang="zh-CN" sz="2400">
-                <a:latin typeface="宋体" charset="0"/>
-                <a:ea typeface="宋体" charset="0"/>
-              </a:rPr>
-              <a:t>ObjID:</a:t>
-            </a:r>
-            <a:r>
-              <a:rPr lang="zh-CN" altLang="en-US" sz="2400">
-                <a:latin typeface="宋体" charset="0"/>
-                <a:ea typeface="宋体" charset="0"/>
-              </a:rPr>
-              <a:t>远程对象的唯一标识。</a:t>
-            </a:r>
+        </p:txBody>
+      </p:sp>
+      <p:sp>
+        <p:nvSpPr>
+          <p:cNvPr id="3" name="内容占位符 2"/>
+          <p:cNvSpPr>
+            <a:spLocks noGrp="1"/>
+          </p:cNvSpPr>
+          <p:nvPr>
+            <p:ph idx="1"/>
+          </p:nvPr>
+        </p:nvSpPr>
+        <p:spPr/>
+        <p:txBody>
+          <a:bodyPr/>
+          <a:lstStyle/>
+          <a:p>
+            <a:r>
+              <a:rPr lang="en-US" altLang="zh-CN" sz="2400" dirty="0" err="1" smtClean="0">
+                <a:latin typeface="宋体" charset="0"/>
+                <a:ea typeface="宋体" charset="0"/>
+              </a:rPr>
+              <a:t>RemoteObject</a:t>
+            </a:r>
+            <a:endParaRPr lang="en-US" altLang="zh-CN" sz="2400" dirty="0" smtClean="0">
+              <a:latin typeface="宋体" charset="0"/>
+              <a:ea typeface="宋体" charset="0"/>
+            </a:endParaRPr>
+          </a:p>
+          <a:p>
+            <a:pPr>
+              <a:buNone/>
+            </a:pPr>
+            <a:r>
+              <a:rPr lang="en-US" altLang="zh-CN" sz="2400" dirty="0" smtClean="0">
+                <a:latin typeface="宋体" charset="0"/>
+                <a:ea typeface="宋体" charset="0"/>
+              </a:rPr>
+              <a:t>	</a:t>
+            </a:r>
+            <a:r>
+              <a:rPr lang="en-US" altLang="zh-CN" sz="1800" dirty="0" smtClean="0">
+                <a:latin typeface="宋体" charset="0"/>
+                <a:ea typeface="宋体" charset="0"/>
+              </a:rPr>
+              <a:t>Object</a:t>
+            </a:r>
+            <a:r>
+              <a:rPr lang="zh-CN" altLang="en-US" sz="1800" dirty="0" smtClean="0">
+                <a:latin typeface="宋体" charset="0"/>
+                <a:ea typeface="宋体" charset="0"/>
+              </a:rPr>
+              <a:t>方法</a:t>
+            </a:r>
+            <a:r>
+              <a:rPr lang="en-US" altLang="zh-CN" sz="1800" dirty="0" err="1" smtClean="0">
+                <a:latin typeface="宋体" charset="0"/>
+                <a:ea typeface="宋体" charset="0"/>
+              </a:rPr>
+              <a:t>hasCode</a:t>
+            </a:r>
+            <a:r>
+              <a:rPr lang="zh-CN" altLang="en-US" sz="1800" dirty="0" smtClean="0">
+                <a:latin typeface="宋体" charset="0"/>
+                <a:ea typeface="宋体" charset="0"/>
+              </a:rPr>
+              <a:t>，</a:t>
+            </a:r>
+            <a:r>
+              <a:rPr lang="en-US" altLang="zh-CN" sz="1800" dirty="0" err="1" smtClean="0">
+                <a:latin typeface="宋体" charset="0"/>
+                <a:ea typeface="宋体" charset="0"/>
+              </a:rPr>
+              <a:t>toString</a:t>
+            </a:r>
+            <a:r>
+              <a:rPr lang="zh-CN" altLang="en-US" sz="1800" dirty="0" smtClean="0">
+                <a:latin typeface="宋体" charset="0"/>
+                <a:ea typeface="宋体" charset="0"/>
+              </a:rPr>
+              <a:t>，</a:t>
+            </a:r>
+            <a:r>
+              <a:rPr lang="en-US" altLang="zh-CN" sz="1800" dirty="0" smtClean="0">
+                <a:latin typeface="宋体" charset="0"/>
+                <a:ea typeface="宋体" charset="0"/>
+              </a:rPr>
+              <a:t>equals</a:t>
+            </a:r>
+            <a:r>
+              <a:rPr lang="zh-CN" altLang="en-US" sz="1800" dirty="0" smtClean="0">
+                <a:latin typeface="宋体" charset="0"/>
+                <a:ea typeface="宋体" charset="0"/>
+              </a:rPr>
+              <a:t>在远程对象上的实现</a:t>
+            </a:r>
+            <a:endParaRPr lang="en-US" altLang="zh-CN" sz="1800" dirty="0" smtClean="0">
+              <a:latin typeface="宋体" charset="0"/>
+              <a:ea typeface="宋体" charset="0"/>
+            </a:endParaRPr>
+          </a:p>
+          <a:p>
+            <a:r>
+              <a:rPr lang="en-US" altLang="zh-CN" sz="2400" dirty="0" err="1" smtClean="0">
+                <a:latin typeface="宋体" charset="0"/>
+                <a:ea typeface="宋体" charset="0"/>
+              </a:rPr>
+              <a:t>UnicastRemoteObject</a:t>
+            </a:r>
+            <a:endParaRPr lang="en-US" altLang="zh-CN" sz="2400" dirty="0" smtClean="0">
+              <a:latin typeface="宋体" charset="0"/>
+              <a:ea typeface="宋体" charset="0"/>
+            </a:endParaRPr>
+          </a:p>
+          <a:p>
+            <a:pPr>
+              <a:buNone/>
+            </a:pPr>
+            <a:r>
+              <a:rPr lang="en-US" altLang="zh-CN" sz="2400" dirty="0" smtClean="0">
+                <a:latin typeface="宋体" charset="0"/>
+                <a:ea typeface="宋体" charset="0"/>
+              </a:rPr>
+              <a:t>	</a:t>
+            </a:r>
+            <a:r>
+              <a:rPr lang="zh-CN" altLang="en-US" sz="1800" dirty="0" smtClean="0">
+                <a:latin typeface="宋体" charset="0"/>
+                <a:ea typeface="宋体" charset="0"/>
+              </a:rPr>
+              <a:t>导出服务</a:t>
+            </a:r>
+            <a:endParaRPr lang="en-US" altLang="zh-CN" sz="1800" dirty="0" smtClean="0">
+              <a:latin typeface="宋体" charset="0"/>
+              <a:ea typeface="宋体" charset="0"/>
+            </a:endParaRPr>
+          </a:p>
+          <a:p>
+            <a:r>
+              <a:rPr lang="en-US" altLang="zh-CN" sz="2400" dirty="0" err="1" smtClean="0">
+                <a:latin typeface="宋体" charset="0"/>
+                <a:ea typeface="宋体" charset="0"/>
+              </a:rPr>
+              <a:t>RemoteObjectInvocationHandler</a:t>
+            </a:r>
+            <a:endParaRPr lang="en-US" altLang="zh-CN" sz="2400" dirty="0" smtClean="0">
+              <a:latin typeface="宋体" charset="0"/>
+              <a:ea typeface="宋体" charset="0"/>
+            </a:endParaRPr>
+          </a:p>
+          <a:p>
+            <a:pPr>
+              <a:buNone/>
+            </a:pPr>
+            <a:r>
+              <a:rPr lang="en-US" altLang="zh-CN" sz="2400" dirty="0" smtClean="0">
+                <a:latin typeface="宋体" charset="0"/>
+                <a:ea typeface="宋体" charset="0"/>
+              </a:rPr>
+              <a:t>	</a:t>
+            </a:r>
+            <a:r>
+              <a:rPr lang="zh-CN" altLang="en-US" sz="1800" dirty="0" smtClean="0">
+                <a:latin typeface="宋体" charset="0"/>
+                <a:ea typeface="宋体" charset="0"/>
+              </a:rPr>
+              <a:t>远程对象桩代理的</a:t>
+            </a:r>
+            <a:r>
+              <a:rPr lang="en-US" altLang="zh-CN" sz="1800" dirty="0" err="1" smtClean="0">
+                <a:latin typeface="宋体" charset="0"/>
+                <a:ea typeface="宋体" charset="0"/>
+              </a:rPr>
+              <a:t>InvocationHandler</a:t>
+            </a:r>
+            <a:endParaRPr lang="en-US" altLang="zh-CN" sz="1800" dirty="0" smtClean="0">
+              <a:latin typeface="宋体" charset="0"/>
+              <a:ea typeface="宋体" charset="0"/>
+            </a:endParaRPr>
           </a:p>
         </p:txBody>
       </p:sp>
@@ -5073,158 +5047,218 @@
           <a:lstStyle/>
           <a:p>
             <a:r>
-              <a:rPr lang="en-US" altLang="zh-CN" sz="3600">
+              <a:rPr lang="en-US" altLang="zh-CN" sz="3600" dirty="0" smtClean="0">
                 <a:latin typeface="宋体" charset="0"/>
                 <a:ea typeface="宋体" charset="0"/>
               </a:rPr>
               <a:t>RMI</a:t>
             </a:r>
             <a:r>
-              <a:rPr lang="zh-CN" altLang="en-US" sz="3600">
-                <a:latin typeface="宋体" charset="0"/>
-                <a:ea typeface="宋体" charset="0"/>
-              </a:rPr>
-              <a:t>数据结构之服务端</a:t>
-            </a:r>
-          </a:p>
-        </p:txBody>
-      </p:sp>
-      <p:sp>
-        <p:nvSpPr>
-          <p:cNvPr id="3" name="内容占位符 2"/>
-          <p:cNvSpPr>
-            <a:spLocks noGrp="1"/>
-          </p:cNvSpPr>
-          <p:nvPr>
-            <p:ph idx="1"/>
-          </p:nvPr>
-        </p:nvSpPr>
-        <p:spPr>
-          <a:xfrm>
-            <a:off x="838200" y="1905000"/>
-            <a:ext cx="7848600" cy="4105275"/>
-          </a:xfrm>
-        </p:spPr>
-        <p:txBody>
-          <a:bodyPr/>
-          <a:lstStyle/>
-          <a:p>
-            <a:r>
-              <a:rPr lang="zh-CN" altLang="en-US" sz="2400">
-                <a:latin typeface="宋体" charset="0"/>
-                <a:ea typeface="宋体" charset="0"/>
-                <a:sym typeface="+mn-ea"/>
-              </a:rPr>
-              <a:t>ServerRef：继承了RemoteRef，是服务端对服务对象的句柄。提供了导出服务对象的定义。</a:t>
-            </a:r>
-          </a:p>
-          <a:p>
-            <a:r>
-              <a:rPr lang="zh-CN" altLang="en-US" sz="2400">
-                <a:latin typeface="宋体" charset="0"/>
-                <a:ea typeface="宋体" charset="0"/>
-                <a:sym typeface="+mn-ea"/>
-              </a:rPr>
-              <a:t>RemoteServer：继承</a:t>
-            </a:r>
-            <a:r>
-              <a:rPr lang="en-US" altLang="zh-CN" sz="2400">
-                <a:latin typeface="宋体" charset="0"/>
-                <a:ea typeface="宋体" charset="0"/>
-                <a:sym typeface="+mn-ea"/>
-              </a:rPr>
-              <a:t>RemoteObject</a:t>
-            </a:r>
-            <a:r>
-              <a:rPr lang="zh-CN" altLang="en-US" sz="2400">
-                <a:latin typeface="宋体" charset="0"/>
-                <a:ea typeface="宋体" charset="0"/>
-                <a:sym typeface="+mn-ea"/>
-              </a:rPr>
-              <a:t>，提供对远程引用语义的支持。</a:t>
-            </a:r>
-          </a:p>
-          <a:p>
-            <a:r>
-              <a:rPr lang="zh-CN" altLang="en-US" sz="2400">
-                <a:latin typeface="宋体" charset="0"/>
-                <a:ea typeface="宋体" charset="0"/>
-              </a:rPr>
-              <a:t>UnicastRemoteObject：继承</a:t>
-            </a:r>
-            <a:r>
-              <a:rPr lang="en-US" altLang="zh-CN" sz="2400">
-                <a:latin typeface="宋体" charset="0"/>
-                <a:ea typeface="宋体" charset="0"/>
-                <a:sym typeface="+mn-ea"/>
-              </a:rPr>
-              <a:t>RemoteObject</a:t>
-            </a:r>
-            <a:r>
-              <a:rPr lang="zh-CN" altLang="en-US" sz="2400">
-                <a:latin typeface="宋体" charset="0"/>
-                <a:ea typeface="宋体" charset="0"/>
-                <a:sym typeface="+mn-ea"/>
-              </a:rPr>
-              <a:t>，用于导出服务对象服务。</a:t>
-            </a:r>
-          </a:p>
-          <a:p>
-            <a:r>
-              <a:rPr lang="zh-CN" altLang="en-US" sz="2400">
-                <a:latin typeface="宋体" charset="0"/>
-                <a:ea typeface="宋体" charset="0"/>
-              </a:rPr>
-              <a:t>UnicastServerRef，实现了</a:t>
-            </a:r>
-            <a:r>
-              <a:rPr lang="zh-CN" altLang="en-US" sz="2400">
-                <a:latin typeface="宋体" charset="0"/>
-                <a:ea typeface="宋体" charset="0"/>
-                <a:sym typeface="+mn-ea"/>
-              </a:rPr>
-              <a:t>ServerRef，提供导出服务对象的实现，同时提供服务端句柄调用服务对象的实现。</a:t>
-            </a:r>
-          </a:p>
-          <a:p>
-            <a:r>
-              <a:rPr lang="en-US" altLang="zh-CN" sz="2400">
-                <a:latin typeface="宋体" charset="0"/>
-                <a:ea typeface="宋体" charset="0"/>
-                <a:sym typeface="+mn-ea"/>
-              </a:rPr>
-              <a:t>Target</a:t>
-            </a:r>
-            <a:r>
-              <a:rPr lang="zh-CN" altLang="en-US" sz="2400">
-                <a:latin typeface="宋体" charset="0"/>
-                <a:ea typeface="宋体" charset="0"/>
-                <a:sym typeface="+mn-ea"/>
-              </a:rPr>
-              <a:t>：远程对象被包装成一个</a:t>
-            </a:r>
-            <a:r>
-              <a:rPr lang="en-US" altLang="zh-CN" sz="2400">
-                <a:latin typeface="宋体" charset="0"/>
-                <a:ea typeface="宋体" charset="0"/>
-                <a:sym typeface="+mn-ea"/>
-              </a:rPr>
-              <a:t>target</a:t>
-            </a:r>
-            <a:r>
-              <a:rPr lang="zh-CN" altLang="en-US" sz="2400">
-                <a:latin typeface="宋体" charset="0"/>
-                <a:ea typeface="宋体" charset="0"/>
-                <a:sym typeface="+mn-ea"/>
-              </a:rPr>
-              <a:t>，长期（有客户端引用）驻留在服务端的内存中。</a:t>
-            </a:r>
-          </a:p>
-          <a:p>
-            <a:endParaRPr lang="zh-CN" altLang="en-US" sz="2400">
+              <a:rPr lang="zh-CN" altLang="en-US" sz="3600" dirty="0" smtClean="0">
+                <a:latin typeface="宋体" charset="0"/>
+                <a:ea typeface="宋体" charset="0"/>
+              </a:rPr>
+              <a:t>数据结构之句柄</a:t>
+            </a:r>
+            <a:endParaRPr lang="zh-CN" altLang="en-US" sz="3600" dirty="0">
               <a:latin typeface="宋体" charset="0"/>
               <a:ea typeface="宋体" charset="0"/>
-              <a:sym typeface="+mn-ea"/>
+            </a:endParaRPr>
+          </a:p>
+        </p:txBody>
+      </p:sp>
+      <p:sp>
+        <p:nvSpPr>
+          <p:cNvPr id="3" name="内容占位符 2"/>
+          <p:cNvSpPr>
+            <a:spLocks noGrp="1"/>
+          </p:cNvSpPr>
+          <p:nvPr>
+            <p:ph idx="1"/>
+          </p:nvPr>
+        </p:nvSpPr>
+        <p:spPr/>
+        <p:txBody>
+          <a:bodyPr/>
+          <a:lstStyle/>
+          <a:p>
+            <a:r>
+              <a:rPr lang="en-US" altLang="zh-CN" sz="2400" dirty="0" err="1" smtClean="0">
+                <a:latin typeface="宋体" charset="0"/>
+                <a:ea typeface="宋体" charset="0"/>
+              </a:rPr>
+              <a:t>RemoteRef</a:t>
+            </a:r>
+            <a:endParaRPr lang="en-US" altLang="zh-CN" sz="2400" dirty="0" smtClean="0">
+              <a:latin typeface="宋体" charset="0"/>
+              <a:ea typeface="宋体" charset="0"/>
+            </a:endParaRPr>
+          </a:p>
+          <a:p>
+            <a:pPr>
+              <a:buNone/>
+            </a:pPr>
+            <a:r>
+              <a:rPr lang="en-US" altLang="zh-CN" sz="2400" dirty="0" smtClean="0">
+                <a:latin typeface="宋体" charset="0"/>
+                <a:ea typeface="宋体" charset="0"/>
+              </a:rPr>
+              <a:t>	</a:t>
+            </a:r>
+            <a:r>
+              <a:rPr lang="zh-CN" altLang="en-US" sz="1800" dirty="0" smtClean="0">
+                <a:latin typeface="宋体" charset="0"/>
+                <a:ea typeface="宋体" charset="0"/>
+              </a:rPr>
+              <a:t>定义客户端调用以及服务端响应方法</a:t>
+            </a:r>
+            <a:endParaRPr lang="en-US" altLang="zh-CN" sz="1800" dirty="0" smtClean="0">
+              <a:latin typeface="宋体" charset="0"/>
+              <a:ea typeface="宋体" charset="0"/>
+            </a:endParaRPr>
+          </a:p>
+          <a:p>
+            <a:r>
+              <a:rPr lang="en-US" altLang="zh-CN" sz="2400" dirty="0" err="1" smtClean="0">
+                <a:latin typeface="宋体" charset="0"/>
+                <a:ea typeface="宋体" charset="0"/>
+              </a:rPr>
+              <a:t>UnicastRef</a:t>
+            </a:r>
+            <a:endParaRPr lang="en-US" altLang="zh-CN" sz="2400" dirty="0" smtClean="0">
+              <a:latin typeface="宋体" charset="0"/>
+              <a:ea typeface="宋体" charset="0"/>
+            </a:endParaRPr>
+          </a:p>
+          <a:p>
+            <a:pPr>
+              <a:buNone/>
+            </a:pPr>
+            <a:r>
+              <a:rPr lang="en-US" altLang="zh-CN" sz="2400" dirty="0" smtClean="0">
+                <a:latin typeface="宋体" charset="0"/>
+                <a:ea typeface="宋体" charset="0"/>
+              </a:rPr>
+              <a:t>	</a:t>
+            </a:r>
+            <a:r>
+              <a:rPr lang="zh-CN" altLang="en-US" sz="1800" dirty="0" smtClean="0">
+                <a:latin typeface="宋体" charset="0"/>
+                <a:ea typeface="宋体" charset="0"/>
+              </a:rPr>
+              <a:t>客户端句柄</a:t>
+            </a:r>
+            <a:endParaRPr lang="en-US" altLang="zh-CN" sz="1800" dirty="0" smtClean="0">
+              <a:latin typeface="宋体" charset="0"/>
+              <a:ea typeface="宋体" charset="0"/>
+            </a:endParaRPr>
+          </a:p>
+          <a:p>
+            <a:r>
+              <a:rPr lang="en-US" altLang="zh-CN" sz="2400" dirty="0" err="1" smtClean="0">
+                <a:latin typeface="宋体" charset="0"/>
+                <a:ea typeface="宋体" charset="0"/>
+              </a:rPr>
+              <a:t>UnicastServerRef</a:t>
+            </a:r>
+            <a:endParaRPr lang="en-US" altLang="zh-CN" sz="2400" dirty="0" smtClean="0">
+              <a:latin typeface="宋体" charset="0"/>
+              <a:ea typeface="宋体" charset="0"/>
+            </a:endParaRPr>
+          </a:p>
+          <a:p>
+            <a:pPr>
+              <a:buNone/>
+            </a:pPr>
+            <a:r>
+              <a:rPr lang="en-US" altLang="zh-CN" sz="2400" dirty="0" smtClean="0">
+                <a:latin typeface="宋体" charset="0"/>
+                <a:ea typeface="宋体" charset="0"/>
+              </a:rPr>
+              <a:t>	</a:t>
+            </a:r>
+            <a:r>
+              <a:rPr lang="zh-CN" altLang="en-US" sz="1800" dirty="0" smtClean="0">
+                <a:latin typeface="宋体" charset="0"/>
+                <a:ea typeface="宋体" charset="0"/>
+              </a:rPr>
+              <a:t>服务端句柄（远程访问事件抛出者）</a:t>
+            </a:r>
+            <a:endParaRPr lang="en-US" altLang="zh-CN" sz="1800" dirty="0" smtClean="0">
+              <a:latin typeface="宋体" charset="0"/>
+              <a:ea typeface="宋体" charset="0"/>
+            </a:endParaRPr>
+          </a:p>
+          <a:p>
+            <a:r>
+              <a:rPr lang="en-US" altLang="zh-CN" sz="2400" dirty="0" err="1" smtClean="0">
+                <a:latin typeface="宋体" charset="0"/>
+                <a:ea typeface="宋体" charset="0"/>
+              </a:rPr>
+              <a:t>LiveRef</a:t>
+            </a:r>
+            <a:endParaRPr lang="en-US" altLang="zh-CN" sz="2400" dirty="0" smtClean="0">
+              <a:latin typeface="宋体" charset="0"/>
+              <a:ea typeface="宋体" charset="0"/>
+            </a:endParaRPr>
+          </a:p>
+          <a:p>
+            <a:pPr>
+              <a:buNone/>
+            </a:pPr>
+            <a:r>
+              <a:rPr lang="en-US" altLang="zh-CN" sz="1800" dirty="0" smtClean="0">
+                <a:latin typeface="宋体" charset="0"/>
+                <a:ea typeface="宋体" charset="0"/>
+              </a:rPr>
+              <a:t>	</a:t>
+            </a:r>
+            <a:r>
+              <a:rPr lang="zh-CN" altLang="en-US" sz="1800" dirty="0" smtClean="0">
+                <a:latin typeface="宋体" charset="0"/>
+                <a:ea typeface="宋体" charset="0"/>
+              </a:rPr>
+              <a:t>保存与服务端通信的详细信息</a:t>
+            </a:r>
+            <a:endParaRPr lang="en-US" altLang="zh-CN" sz="1800" dirty="0" smtClean="0">
+              <a:latin typeface="宋体" charset="0"/>
+              <a:ea typeface="宋体" charset="0"/>
+            </a:endParaRPr>
+          </a:p>
+          <a:p>
+            <a:r>
+              <a:rPr lang="en-US" altLang="zh-CN" sz="2400" dirty="0" err="1" smtClean="0">
+                <a:latin typeface="宋体" charset="0"/>
+                <a:ea typeface="宋体" charset="0"/>
+              </a:rPr>
+              <a:t>ObjID</a:t>
+            </a:r>
+            <a:endParaRPr lang="en-US" altLang="zh-CN" sz="2400" dirty="0" smtClean="0">
+              <a:latin typeface="宋体" charset="0"/>
+              <a:ea typeface="宋体" charset="0"/>
+            </a:endParaRPr>
+          </a:p>
+          <a:p>
+            <a:pPr>
+              <a:buNone/>
+            </a:pPr>
+            <a:r>
+              <a:rPr lang="en-US" altLang="zh-CN" sz="1800" dirty="0" smtClean="0">
+                <a:latin typeface="宋体" charset="0"/>
+                <a:ea typeface="宋体" charset="0"/>
+              </a:rPr>
+              <a:t>	</a:t>
+            </a:r>
+            <a:r>
+              <a:rPr lang="zh-CN" altLang="en-US" sz="1800" dirty="0" smtClean="0">
+                <a:latin typeface="宋体" charset="0"/>
+                <a:ea typeface="宋体" charset="0"/>
+              </a:rPr>
+              <a:t>远程对象唯一标识</a:t>
+            </a:r>
+            <a:endParaRPr lang="en-US" altLang="zh-CN" sz="1800" dirty="0" smtClean="0">
+              <a:latin typeface="宋体" charset="0"/>
+              <a:ea typeface="宋体" charset="0"/>
             </a:endParaRPr>
           </a:p>
         </p:txBody>
@@ -5277,76 +5311,127 @@
           <a:lstStyle/>
           <a:p>
             <a:r>
-              <a:rPr lang="en-US" altLang="zh-CN" sz="3600">
+              <a:rPr lang="en-US" altLang="zh-CN" sz="3600" dirty="0" smtClean="0">
                 <a:latin typeface="宋体" charset="0"/>
                 <a:ea typeface="宋体" charset="0"/>
               </a:rPr>
               <a:t>RMI</a:t>
             </a:r>
             <a:r>
-              <a:rPr lang="zh-CN" altLang="en-US" sz="3600">
-                <a:latin typeface="宋体" charset="0"/>
-                <a:ea typeface="宋体" charset="0"/>
-              </a:rPr>
-              <a:t>数据结构之服务端</a:t>
-            </a:r>
-          </a:p>
-        </p:txBody>
-      </p:sp>
-      <p:sp>
-        <p:nvSpPr>
-          <p:cNvPr id="3" name="内容占位符 2"/>
-          <p:cNvSpPr>
-            <a:spLocks noGrp="1"/>
-          </p:cNvSpPr>
-          <p:nvPr>
-            <p:ph idx="1"/>
-          </p:nvPr>
-        </p:nvSpPr>
-        <p:spPr>
-          <a:xfrm>
-            <a:off x="838200" y="1905000"/>
-            <a:ext cx="7848600" cy="4105275"/>
-          </a:xfrm>
-        </p:spPr>
-        <p:txBody>
-          <a:bodyPr/>
-          <a:lstStyle/>
-          <a:p>
-            <a:r>
-              <a:rPr lang="zh-CN" altLang="en-US" sz="2400">
-                <a:latin typeface="宋体" charset="0"/>
-                <a:ea typeface="宋体" charset="0"/>
-                <a:sym typeface="+mn-ea"/>
-              </a:rPr>
-              <a:t>Registry：注册表接口，提供远程服务注册表的行为定义。</a:t>
-            </a:r>
-          </a:p>
-          <a:p>
-            <a:r>
-              <a:rPr lang="zh-CN" altLang="en-US" sz="2400">
-                <a:latin typeface="宋体" charset="0"/>
-                <a:ea typeface="宋体" charset="0"/>
-                <a:sym typeface="+mn-ea"/>
-              </a:rPr>
-              <a:t>LocateRegistry：创建注册表。</a:t>
-            </a:r>
-          </a:p>
-          <a:p>
-            <a:r>
-              <a:rPr lang="zh-CN" altLang="en-US" sz="2400">
-                <a:latin typeface="宋体" charset="0"/>
-                <a:ea typeface="宋体" charset="0"/>
-                <a:sym typeface="+mn-ea"/>
-              </a:rPr>
-              <a:t>RegistryImpl：实现了Registry，提供远程服务注册表的具体实现，并提供导出注册表服务的实现。</a:t>
-            </a:r>
-          </a:p>
-          <a:p>
-            <a:endParaRPr lang="zh-CN" altLang="en-US" sz="2400">
+              <a:rPr lang="zh-CN" altLang="en-US" sz="3600" dirty="0" smtClean="0">
+                <a:latin typeface="宋体" charset="0"/>
+                <a:ea typeface="宋体" charset="0"/>
+              </a:rPr>
+              <a:t>数据结构之服务驻留集合</a:t>
+            </a:r>
+            <a:endParaRPr lang="zh-CN" altLang="en-US" sz="3600" dirty="0">
               <a:latin typeface="宋体" charset="0"/>
               <a:ea typeface="宋体" charset="0"/>
-              <a:sym typeface="+mn-ea"/>
+            </a:endParaRPr>
+          </a:p>
+        </p:txBody>
+      </p:sp>
+      <p:sp>
+        <p:nvSpPr>
+          <p:cNvPr id="3" name="内容占位符 2"/>
+          <p:cNvSpPr>
+            <a:spLocks noGrp="1"/>
+          </p:cNvSpPr>
+          <p:nvPr>
+            <p:ph idx="1"/>
+          </p:nvPr>
+        </p:nvSpPr>
+        <p:spPr/>
+        <p:txBody>
+          <a:bodyPr/>
+          <a:lstStyle/>
+          <a:p>
+            <a:r>
+              <a:rPr lang="en-US" altLang="zh-CN" sz="2400" dirty="0" smtClean="0">
+                <a:latin typeface="宋体" charset="0"/>
+                <a:ea typeface="宋体" charset="0"/>
+              </a:rPr>
+              <a:t>Target</a:t>
+            </a:r>
+          </a:p>
+          <a:p>
+            <a:pPr>
+              <a:buNone/>
+            </a:pPr>
+            <a:r>
+              <a:rPr lang="en-US" altLang="zh-CN" sz="2400" dirty="0" smtClean="0">
+                <a:latin typeface="宋体" charset="0"/>
+                <a:ea typeface="宋体" charset="0"/>
+              </a:rPr>
+              <a:t>	</a:t>
+            </a:r>
+            <a:r>
+              <a:rPr lang="zh-CN" altLang="en-US" sz="1800" dirty="0" smtClean="0">
+                <a:latin typeface="宋体" charset="0"/>
+                <a:ea typeface="宋体" charset="0"/>
+              </a:rPr>
+              <a:t>服务、桩、调度者、</a:t>
+            </a:r>
+            <a:r>
+              <a:rPr lang="en-US" altLang="zh-CN" sz="1800" dirty="0" err="1" smtClean="0">
+                <a:latin typeface="宋体" charset="0"/>
+                <a:ea typeface="宋体" charset="0"/>
+              </a:rPr>
+              <a:t>ObjID</a:t>
+            </a:r>
+            <a:r>
+              <a:rPr lang="zh-CN" altLang="en-US" sz="1800" dirty="0" smtClean="0">
+                <a:latin typeface="宋体" charset="0"/>
+                <a:ea typeface="宋体" charset="0"/>
+              </a:rPr>
+              <a:t>组装的驻留对象</a:t>
+            </a:r>
+            <a:endParaRPr lang="en-US" altLang="zh-CN" sz="1800" dirty="0" smtClean="0">
+              <a:latin typeface="宋体" charset="0"/>
+              <a:ea typeface="宋体" charset="0"/>
+            </a:endParaRPr>
+          </a:p>
+          <a:p>
+            <a:r>
+              <a:rPr lang="en-US" altLang="zh-CN" sz="2400" dirty="0" err="1" smtClean="0">
+                <a:latin typeface="宋体" charset="0"/>
+                <a:ea typeface="宋体" charset="0"/>
+              </a:rPr>
+              <a:t>ObjectTable</a:t>
+            </a:r>
+            <a:endParaRPr lang="en-US" altLang="zh-CN" sz="2400" dirty="0" smtClean="0">
+              <a:latin typeface="宋体" charset="0"/>
+              <a:ea typeface="宋体" charset="0"/>
+            </a:endParaRPr>
+          </a:p>
+          <a:p>
+            <a:pPr>
+              <a:buNone/>
+            </a:pPr>
+            <a:r>
+              <a:rPr lang="en-US" altLang="zh-CN" sz="2400" dirty="0" smtClean="0">
+                <a:latin typeface="宋体" charset="0"/>
+                <a:ea typeface="宋体" charset="0"/>
+              </a:rPr>
+              <a:t>	</a:t>
+            </a:r>
+            <a:r>
+              <a:rPr lang="en-US" altLang="zh-CN" sz="1800" dirty="0" smtClean="0">
+                <a:latin typeface="宋体" charset="0"/>
+                <a:ea typeface="宋体" charset="0"/>
+              </a:rPr>
+              <a:t>Target</a:t>
+            </a:r>
+            <a:r>
+              <a:rPr lang="zh-CN" altLang="en-US" sz="1800" dirty="0" smtClean="0">
+                <a:latin typeface="宋体" charset="0"/>
+                <a:ea typeface="宋体" charset="0"/>
+              </a:rPr>
+              <a:t>集合类</a:t>
+            </a:r>
+            <a:endParaRPr lang="en-US" altLang="zh-CN" sz="1800" dirty="0" smtClean="0">
+              <a:latin typeface="宋体" charset="0"/>
+              <a:ea typeface="宋体" charset="0"/>
             </a:endParaRPr>
           </a:p>
         </p:txBody>
@@ -5399,122 +5484,49 @@
           <a:lstStyle/>
           <a:p>
             <a:r>
-              <a:rPr lang="en-US" altLang="zh-CN" sz="3600">
+              <a:rPr lang="en-US" altLang="zh-CN" sz="3600" dirty="0" smtClean="0">
                 <a:latin typeface="宋体" charset="0"/>
                 <a:ea typeface="宋体" charset="0"/>
               </a:rPr>
               <a:t>RMI</a:t>
             </a:r>
             <a:r>
-              <a:rPr lang="zh-CN" altLang="en-US" sz="3600">
-                <a:latin typeface="宋体" charset="0"/>
-                <a:ea typeface="宋体" charset="0"/>
-              </a:rPr>
-              <a:t>数据结构之通信</a:t>
-            </a:r>
-          </a:p>
-        </p:txBody>
-      </p:sp>
-      <p:sp>
-        <p:nvSpPr>
-          <p:cNvPr id="3" name="内容占位符 2"/>
-          <p:cNvSpPr>
-            <a:spLocks noGrp="1"/>
-          </p:cNvSpPr>
+              <a:rPr lang="zh-CN" altLang="en-US" sz="3600" dirty="0" smtClean="0">
+                <a:latin typeface="宋体" charset="0"/>
+                <a:ea typeface="宋体" charset="0"/>
+              </a:rPr>
+              <a:t>数据结构之服务端类图</a:t>
+            </a:r>
+            <a:endParaRPr lang="zh-CN" altLang="en-US" sz="3600" dirty="0">
+              <a:latin typeface="宋体" charset="0"/>
+              <a:ea typeface="宋体" charset="0"/>
+            </a:endParaRPr>
+          </a:p>
+        </p:txBody>
+      </p:sp>
+      <p:pic>
+        <p:nvPicPr>
+          <p:cNvPr id="4" name="内容占位符 3" descr="server.png"/>
+          <p:cNvPicPr>
+            <a:picLocks noGrp="1" noChangeAspect="1"/>
+          </p:cNvPicPr>
           <p:nvPr>
             <p:ph idx="1"/>
           </p:nvPr>
-        </p:nvSpPr>
+        </p:nvPicPr>
+        <p:blipFill>
+          <a:blip r:embed="rId2" cstate="print"/>
+          <a:stretch>
+            <a:fillRect/>
+          </a:stretch>
+        </p:blipFill>
         <p:spPr>
           <a:xfrm>
-            <a:off x="838200" y="1905000"/>
-            <a:ext cx="7848600" cy="4105275"/>
+            <a:off x="838200" y="2760533"/>
+            <a:ext cx="7848600" cy="2510097"/>
           </a:xfrm>
         </p:spPr>
-        <p:txBody>
-          <a:bodyPr/>
-          <a:lstStyle/>
-          <a:p>
-            <a:r>
-              <a:rPr lang="zh-CN" altLang="en-US" sz="2400">
-                <a:latin typeface="宋体" charset="0"/>
-                <a:ea typeface="宋体" charset="0"/>
-                <a:sym typeface="+mn-ea"/>
-              </a:rPr>
-              <a:t>Endpoint：抽象终端（地址、端口、服务器</a:t>
-            </a:r>
-            <a:r>
-              <a:rPr lang="en-US" altLang="zh-CN" sz="2400">
-                <a:latin typeface="宋体" charset="0"/>
-                <a:ea typeface="宋体" charset="0"/>
-                <a:sym typeface="+mn-ea"/>
-              </a:rPr>
-              <a:t>socket</a:t>
-            </a:r>
-            <a:r>
-              <a:rPr lang="zh-CN" altLang="en-US" sz="2400">
-                <a:latin typeface="宋体" charset="0"/>
-                <a:ea typeface="宋体" charset="0"/>
-                <a:sym typeface="+mn-ea"/>
-              </a:rPr>
-              <a:t>工厂、客户端</a:t>
-            </a:r>
-            <a:r>
-              <a:rPr lang="en-US" altLang="zh-CN" sz="2400">
-                <a:latin typeface="宋体" charset="0"/>
-                <a:ea typeface="宋体" charset="0"/>
-                <a:sym typeface="+mn-ea"/>
-              </a:rPr>
-              <a:t>socket</a:t>
-            </a:r>
-            <a:r>
-              <a:rPr lang="zh-CN" altLang="en-US" sz="2400">
-                <a:latin typeface="宋体" charset="0"/>
-                <a:ea typeface="宋体" charset="0"/>
-                <a:sym typeface="+mn-ea"/>
-              </a:rPr>
-              <a:t>工厂）。</a:t>
-            </a:r>
-          </a:p>
-          <a:p>
-            <a:r>
-              <a:rPr lang="zh-CN" altLang="en-US" sz="2400">
-                <a:latin typeface="宋体" charset="0"/>
-                <a:ea typeface="宋体" charset="0"/>
-                <a:sym typeface="+mn-ea"/>
-              </a:rPr>
-              <a:t>Transport：管理终端之间的通信。</a:t>
-            </a:r>
-          </a:p>
-          <a:p>
-            <a:r>
-              <a:rPr lang="zh-CN" altLang="en-US" sz="2400">
-                <a:latin typeface="宋体" charset="0"/>
-                <a:ea typeface="宋体" charset="0"/>
-                <a:sym typeface="+mn-ea"/>
-              </a:rPr>
-              <a:t>Channel：两终端之间的通信管道。</a:t>
-            </a:r>
-          </a:p>
-          <a:p>
-            <a:r>
-              <a:rPr lang="zh-CN" altLang="en-US" sz="2400">
-                <a:latin typeface="宋体" charset="0"/>
-                <a:ea typeface="宋体" charset="0"/>
-                <a:sym typeface="+mn-ea"/>
-              </a:rPr>
-              <a:t>Connection：两终端之间的连接。</a:t>
-            </a:r>
-          </a:p>
-          <a:p>
-            <a:endParaRPr lang="zh-CN" altLang="en-US" sz="2400">
-              <a:latin typeface="宋体" charset="0"/>
-              <a:ea typeface="宋体" charset="0"/>
-              <a:sym typeface="+mn-ea"/>
-            </a:endParaRPr>
-          </a:p>
-        </p:txBody>
-      </p:sp>
+      </p:pic>
     </p:spTree>
   </p:cSld>
   <p:clrMapOvr>
@@ -5563,25 +5575,18 @@
           <a:lstStyle/>
           <a:p>
             <a:r>
+              <a:rPr lang="en-US" altLang="zh-CN" sz="3600" dirty="0" smtClean="0">
+                <a:latin typeface="宋体" charset="0"/>
+                <a:ea typeface="宋体" charset="0"/>
+              </a:rPr>
+              <a:t>RMI</a:t>
+            </a:r>
+            <a:r>
               <a:rPr lang="zh-CN" altLang="en-US" sz="3600" dirty="0" smtClean="0">
                 <a:latin typeface="宋体" charset="0"/>
                 <a:ea typeface="宋体" charset="0"/>
               </a:rPr>
-              <a:t>创建</a:t>
-            </a:r>
-            <a:r>
-              <a:rPr lang="en-US" altLang="zh-CN" sz="3600" dirty="0" smtClean="0">
-                <a:latin typeface="宋体" charset="0"/>
-                <a:ea typeface="宋体" charset="0"/>
-              </a:rPr>
-              <a:t>RMI</a:t>
-            </a:r>
-            <a:r>
-              <a:rPr lang="zh-CN" altLang="en-US" sz="3600" dirty="0" smtClean="0">
-                <a:latin typeface="宋体" charset="0"/>
-                <a:ea typeface="宋体" charset="0"/>
-              </a:rPr>
-              <a:t>远程服务</a:t>
+              <a:t>数据结构之客户端类图</a:t>
             </a:r>
             <a:endParaRPr lang="zh-CN" altLang="en-US" sz="3600" dirty="0">
               <a:latin typeface="宋体" charset="0"/>
@@ -5590,75 +5595,29 @@
           </a:p>
         </p:txBody>
       </p:sp>
-      <p:sp>
-        <p:nvSpPr>
-          <p:cNvPr id="3" name="内容占位符 2"/>
-          <p:cNvSpPr>
-            <a:spLocks noGrp="1"/>
-          </p:cNvSpPr>
+      <p:pic>
+        <p:nvPicPr>
+          <p:cNvPr id="4" name="内容占位符 3" descr="client.png"/>
+          <p:cNvPicPr>
+            <a:picLocks noGrp="1" noChangeAspect="1"/>
+          </p:cNvPicPr>
           <p:nvPr>
             <p:ph idx="1"/>
           </p:nvPr>
-        </p:nvSpPr>
+        </p:nvPicPr>
+        <p:blipFill>
+          <a:blip r:embed="rId2" cstate="print"/>
+          <a:stretch>
+            <a:fillRect/>
+          </a:stretch>
+        </p:blipFill>
         <p:spPr>
           <a:xfrm>
-            <a:off x="838200" y="1905000"/>
-            <a:ext cx="7848600" cy="4105275"/>
+            <a:off x="838200" y="2521969"/>
+            <a:ext cx="7848600" cy="2987224"/>
           </a:xfrm>
         </p:spPr>
-        <p:txBody>
-          <a:bodyPr/>
-          <a:lstStyle/>
-          <a:p>
-            <a:r>
-              <a:rPr lang="zh-CN" altLang="en-US" sz="2400" dirty="0" smtClean="0">
-                <a:latin typeface="宋体" charset="0"/>
-                <a:ea typeface="宋体" charset="0"/>
-                <a:sym typeface="+mn-ea"/>
-              </a:rPr>
-              <a:t>创建客户端代理</a:t>
-            </a:r>
-            <a:endParaRPr lang="en-US" altLang="zh-CN" sz="2400" dirty="0" smtClean="0">
-              <a:latin typeface="宋体" charset="0"/>
-              <a:ea typeface="宋体" charset="0"/>
-              <a:sym typeface="+mn-ea"/>
-            </a:endParaRPr>
-          </a:p>
-          <a:p>
-            <a:r>
-              <a:rPr lang="zh-CN" altLang="en-US" sz="2400" dirty="0" smtClean="0">
-                <a:latin typeface="宋体" charset="0"/>
-                <a:ea typeface="宋体" charset="0"/>
-                <a:sym typeface="+mn-ea"/>
-              </a:rPr>
-              <a:t>创建在服务端驻留的</a:t>
-            </a:r>
-            <a:r>
-              <a:rPr lang="en-US" altLang="zh-CN" sz="2400" dirty="0" smtClean="0">
-                <a:latin typeface="宋体" charset="0"/>
-                <a:ea typeface="宋体" charset="0"/>
-                <a:sym typeface="+mn-ea"/>
-              </a:rPr>
-              <a:t>Target</a:t>
-            </a:r>
-          </a:p>
-          <a:p>
-            <a:r>
-              <a:rPr lang="zh-CN" altLang="en-US" sz="2400" dirty="0" smtClean="0">
-                <a:latin typeface="宋体" charset="0"/>
-                <a:ea typeface="宋体" charset="0"/>
-                <a:sym typeface="+mn-ea"/>
-              </a:rPr>
-              <a:t>在服务发布的终端上导出</a:t>
-            </a:r>
-            <a:endParaRPr lang="zh-CN" altLang="en-US" sz="2400" dirty="0">
-              <a:latin typeface="宋体" charset="0"/>
-              <a:ea typeface="宋体" charset="0"/>
-              <a:sym typeface="+mn-ea"/>
-            </a:endParaRPr>
-          </a:p>
-        </p:txBody>
-      </p:sp>
+      </p:pic>
     </p:spTree>
   </p:cSld>
   <p:clrMapOvr>

</xml_diff>